<commit_message>
05/09/22 Hymnal + Chinese Fonts Adjustments
</commit_message>
<xml_diff>
--- a/TJCPowerPoint/Resources/Service4to3.pptx
+++ b/TJCPowerPoint/Resources/Service4to3.pptx
@@ -5,17 +5,20 @@
     <p:sldMasterId id="2147483672" r:id="rId1"/>
   </p:sldMasterIdLst>
   <p:notesMasterIdLst>
-    <p:notesMasterId r:id="rId7"/>
+    <p:notesMasterId r:id="rId10"/>
   </p:notesMasterIdLst>
   <p:handoutMasterIdLst>
-    <p:handoutMasterId r:id="rId8"/>
+    <p:handoutMasterId r:id="rId11"/>
   </p:handoutMasterIdLst>
   <p:sldIdLst>
     <p:sldId id="357" r:id="rId2"/>
-    <p:sldId id="358" r:id="rId3"/>
-    <p:sldId id="360" r:id="rId4"/>
-    <p:sldId id="361" r:id="rId5"/>
-    <p:sldId id="359" r:id="rId6"/>
+    <p:sldId id="362" r:id="rId3"/>
+    <p:sldId id="358" r:id="rId4"/>
+    <p:sldId id="360" r:id="rId5"/>
+    <p:sldId id="361" r:id="rId6"/>
+    <p:sldId id="359" r:id="rId7"/>
+    <p:sldId id="363" r:id="rId8"/>
+    <p:sldId id="364" r:id="rId9"/>
   </p:sldIdLst>
   <p:sldSz cx="9144000" cy="6858000" type="screen4x3"/>
   <p:notesSz cx="6858000" cy="9144000"/>
@@ -1288,7 +1291,7 @@
     </p:spTree>
     <p:extLst>
       <p:ext uri="{BB962C8B-B14F-4D97-AF65-F5344CB8AC3E}">
-        <p14:creationId xmlns:p14="http://schemas.microsoft.com/office/powerpoint/2010/main" val="494895591"/>
+        <p14:creationId xmlns:p14="http://schemas.microsoft.com/office/powerpoint/2010/main" val="64867342"/>
       </p:ext>
     </p:extLst>
   </p:cSld>
@@ -1455,7 +1458,7 @@
     </p:spTree>
     <p:extLst>
       <p:ext uri="{BB962C8B-B14F-4D97-AF65-F5344CB8AC3E}">
-        <p14:creationId xmlns:p14="http://schemas.microsoft.com/office/powerpoint/2010/main" val="2013940454"/>
+        <p14:creationId xmlns:p14="http://schemas.microsoft.com/office/powerpoint/2010/main" val="1920349793"/>
       </p:ext>
     </p:extLst>
   </p:cSld>
@@ -1632,7 +1635,7 @@
     </p:spTree>
     <p:extLst>
       <p:ext uri="{BB962C8B-B14F-4D97-AF65-F5344CB8AC3E}">
-        <p14:creationId xmlns:p14="http://schemas.microsoft.com/office/powerpoint/2010/main" val="1961432256"/>
+        <p14:creationId xmlns:p14="http://schemas.microsoft.com/office/powerpoint/2010/main" val="307811383"/>
       </p:ext>
     </p:extLst>
   </p:cSld>
@@ -1799,7 +1802,7 @@
     </p:spTree>
     <p:extLst>
       <p:ext uri="{BB962C8B-B14F-4D97-AF65-F5344CB8AC3E}">
-        <p14:creationId xmlns:p14="http://schemas.microsoft.com/office/powerpoint/2010/main" val="831958710"/>
+        <p14:creationId xmlns:p14="http://schemas.microsoft.com/office/powerpoint/2010/main" val="3324782268"/>
       </p:ext>
     </p:extLst>
   </p:cSld>
@@ -2040,7 +2043,7 @@
     </p:spTree>
     <p:extLst>
       <p:ext uri="{BB962C8B-B14F-4D97-AF65-F5344CB8AC3E}">
-        <p14:creationId xmlns:p14="http://schemas.microsoft.com/office/powerpoint/2010/main" val="1615244823"/>
+        <p14:creationId xmlns:p14="http://schemas.microsoft.com/office/powerpoint/2010/main" val="2082673925"/>
       </p:ext>
     </p:extLst>
   </p:cSld>
@@ -2269,7 +2272,7 @@
     </p:spTree>
     <p:extLst>
       <p:ext uri="{BB962C8B-B14F-4D97-AF65-F5344CB8AC3E}">
-        <p14:creationId xmlns:p14="http://schemas.microsoft.com/office/powerpoint/2010/main" val="754941912"/>
+        <p14:creationId xmlns:p14="http://schemas.microsoft.com/office/powerpoint/2010/main" val="1728568226"/>
       </p:ext>
     </p:extLst>
   </p:cSld>
@@ -2633,7 +2636,7 @@
     </p:spTree>
     <p:extLst>
       <p:ext uri="{BB962C8B-B14F-4D97-AF65-F5344CB8AC3E}">
-        <p14:creationId xmlns:p14="http://schemas.microsoft.com/office/powerpoint/2010/main" val="2013927518"/>
+        <p14:creationId xmlns:p14="http://schemas.microsoft.com/office/powerpoint/2010/main" val="4194798018"/>
       </p:ext>
     </p:extLst>
   </p:cSld>
@@ -2748,7 +2751,7 @@
     </p:spTree>
     <p:extLst>
       <p:ext uri="{BB962C8B-B14F-4D97-AF65-F5344CB8AC3E}">
-        <p14:creationId xmlns:p14="http://schemas.microsoft.com/office/powerpoint/2010/main" val="2684499764"/>
+        <p14:creationId xmlns:p14="http://schemas.microsoft.com/office/powerpoint/2010/main" val="3951469358"/>
       </p:ext>
     </p:extLst>
   </p:cSld>
@@ -2840,7 +2843,7 @@
     </p:spTree>
     <p:extLst>
       <p:ext uri="{BB962C8B-B14F-4D97-AF65-F5344CB8AC3E}">
-        <p14:creationId xmlns:p14="http://schemas.microsoft.com/office/powerpoint/2010/main" val="2794224530"/>
+        <p14:creationId xmlns:p14="http://schemas.microsoft.com/office/powerpoint/2010/main" val="111258455"/>
       </p:ext>
     </p:extLst>
   </p:cSld>
@@ -3114,7 +3117,7 @@
     </p:spTree>
     <p:extLst>
       <p:ext uri="{BB962C8B-B14F-4D97-AF65-F5344CB8AC3E}">
-        <p14:creationId xmlns:p14="http://schemas.microsoft.com/office/powerpoint/2010/main" val="514292021"/>
+        <p14:creationId xmlns:p14="http://schemas.microsoft.com/office/powerpoint/2010/main" val="4248992088"/>
       </p:ext>
     </p:extLst>
   </p:cSld>
@@ -3368,7 +3371,7 @@
     </p:spTree>
     <p:extLst>
       <p:ext uri="{BB962C8B-B14F-4D97-AF65-F5344CB8AC3E}">
-        <p14:creationId xmlns:p14="http://schemas.microsoft.com/office/powerpoint/2010/main" val="3785358092"/>
+        <p14:creationId xmlns:p14="http://schemas.microsoft.com/office/powerpoint/2010/main" val="1603089462"/>
       </p:ext>
     </p:extLst>
   </p:cSld>
@@ -3382,12 +3385,9 @@
 <p:sldMaster xmlns:a="http://schemas.openxmlformats.org/drawingml/2006/main" xmlns:r="http://schemas.openxmlformats.org/officeDocument/2006/relationships" xmlns:p="http://schemas.openxmlformats.org/presentationml/2006/main">
   <p:cSld>
     <p:bg>
-      <p:bgPr>
-        <a:solidFill>
-          <a:schemeClr val="tx1"/>
-        </a:solidFill>
-        <a:effectLst/>
-      </p:bgPr>
+      <p:bgRef idx="1001">
+        <a:schemeClr val="bg1"/>
+      </p:bgRef>
     </p:bg>
     <p:spTree>
       <p:nvGrpSpPr>
@@ -3617,7 +3617,7 @@
     </p:spTree>
     <p:extLst>
       <p:ext uri="{BB962C8B-B14F-4D97-AF65-F5344CB8AC3E}">
-        <p14:creationId xmlns:p14="http://schemas.microsoft.com/office/powerpoint/2010/main" val="3940385184"/>
+        <p14:creationId xmlns:p14="http://schemas.microsoft.com/office/powerpoint/2010/main" val="29472362"/>
       </p:ext>
     </p:extLst>
   </p:cSld>
@@ -3921,6 +3921,14 @@
 <file path=ppt/slides/slide1.xml><?xml version="1.0" encoding="utf-8"?>
 <p:sld xmlns:a="http://schemas.openxmlformats.org/drawingml/2006/main" xmlns:r="http://schemas.openxmlformats.org/officeDocument/2006/relationships" xmlns:p="http://schemas.openxmlformats.org/presentationml/2006/main">
   <p:cSld>
+    <p:bg>
+      <p:bgPr>
+        <a:solidFill>
+          <a:schemeClr val="tx1"/>
+        </a:solidFill>
+        <a:effectLst/>
+      </p:bgPr>
+    </p:bg>
     <p:spTree>
       <p:nvGrpSpPr>
         <p:cNvPr id="1" name=""/>
@@ -3945,8 +3953,8 @@
         </p:nvSpPr>
         <p:spPr bwMode="auto">
           <a:xfrm>
-            <a:off x="0" y="211140"/>
-            <a:ext cx="9144000" cy="923330"/>
+            <a:off x="0" y="260648"/>
+            <a:ext cx="9144000" cy="707886"/>
           </a:xfrm>
           <a:prstGeom prst="rect">
             <a:avLst/>
@@ -3986,7 +3994,7 @@
           </a:extLst>
         </p:spPr>
         <p:txBody>
-          <a:bodyPr>
+          <a:bodyPr wrap="square">
             <a:spAutoFit/>
           </a:bodyPr>
           <a:lstStyle/>
@@ -3997,7 +4005,7 @@
               </a:spcBef>
             </a:pPr>
             <a:r>
-              <a:rPr lang="en-US" altLang="zh-CN" sz="5400" dirty="0">
+              <a:rPr lang="en-US" altLang="zh-CN" sz="4000" b="1" dirty="0">
                 <a:solidFill>
                   <a:schemeClr val="bg1"/>
                 </a:solidFill>
@@ -4019,8 +4027,8 @@
         </p:nvSpPr>
         <p:spPr bwMode="auto">
           <a:xfrm>
-            <a:off x="6569" y="1143063"/>
-            <a:ext cx="9144000" cy="1015663"/>
+            <a:off x="6572" y="1192573"/>
+            <a:ext cx="9137428" cy="769441"/>
           </a:xfrm>
           <a:prstGeom prst="rect">
             <a:avLst/>
@@ -4071,11 +4079,11 @@
               </a:spcBef>
             </a:pPr>
             <a:r>
-              <a:rPr lang="en-US" altLang="zh-CN" sz="6000" dirty="0">
+              <a:rPr lang="en-US" altLang="zh-CN" sz="4400" b="1" dirty="0">
                 <a:solidFill>
                   <a:schemeClr val="bg1"/>
                 </a:solidFill>
-                <a:latin typeface="Century Gothic" panose="020B0502020202020204" pitchFamily="34" charset="0"/>
+                <a:latin typeface="金梅新中楷全字體" panose="02010509060101010101" pitchFamily="49" charset="-120"/>
                 <a:ea typeface="金梅新中楷全字體" panose="02010509060101010101" pitchFamily="49" charset="-120"/>
               </a:rPr>
               <a:t>Chinese</a:t>
@@ -4093,8 +4101,8 @@
         </p:nvSpPr>
         <p:spPr bwMode="auto">
           <a:xfrm>
-            <a:off x="0" y="2743761"/>
-            <a:ext cx="9144000" cy="1477328"/>
+            <a:off x="0" y="2348882"/>
+            <a:ext cx="9144000" cy="1785104"/>
           </a:xfrm>
           <a:prstGeom prst="rect">
             <a:avLst/>
@@ -4120,25 +4128,16 @@
               </a:spcBef>
             </a:pPr>
             <a:r>
-              <a:rPr lang="en-GB" altLang="en-US" sz="3600" dirty="0">
+              <a:rPr lang="en-GB" altLang="en-US" sz="4400" b="1" dirty="0">
                 <a:solidFill>
                   <a:schemeClr val="bg1"/>
                 </a:solidFill>
                 <a:latin typeface="Century Gothic" panose="020B0502020202020204" pitchFamily="34" charset="0"/>
               </a:rPr>
-              <a:t>Hymn</a:t>
-            </a:r>
-            <a:r>
-              <a:rPr lang="en-GB" altLang="en-US" sz="3600" b="1" dirty="0">
-                <a:solidFill>
-                  <a:schemeClr val="bg1"/>
-                </a:solidFill>
-                <a:latin typeface="Century Gothic" panose="020B0502020202020204" pitchFamily="34" charset="0"/>
-              </a:rPr>
-              <a:t> </a:t>
-            </a:r>
-            <a:r>
-              <a:rPr lang="zh-TW" altLang="en-US" sz="3600" b="1" dirty="0">
+              <a:t>Hymns </a:t>
+            </a:r>
+            <a:r>
+              <a:rPr lang="zh-TW" altLang="en-US" sz="4400" b="1" dirty="0">
                 <a:solidFill>
                   <a:schemeClr val="bg1"/>
                 </a:solidFill>
@@ -4147,7 +4146,7 @@
               </a:rPr>
               <a:t>詩</a:t>
             </a:r>
-            <a:endParaRPr lang="en-US" altLang="en-US" sz="3600" b="1" dirty="0">
+            <a:endParaRPr lang="en-US" altLang="en-US" sz="4400" b="1" dirty="0">
               <a:solidFill>
                 <a:schemeClr val="bg1"/>
               </a:solidFill>
@@ -4161,7 +4160,7 @@
                 <a:spcPct val="50000"/>
               </a:spcBef>
             </a:pPr>
-            <a:endParaRPr lang="en-US" altLang="en-US" sz="3600" b="1" dirty="0">
+            <a:endParaRPr lang="en-US" altLang="en-US" sz="4400" b="1" dirty="0">
               <a:solidFill>
                 <a:srgbClr val="FFFFFF"/>
               </a:solidFill>
@@ -4180,8 +4179,8 @@
         </p:nvSpPr>
         <p:spPr bwMode="auto">
           <a:xfrm>
-            <a:off x="6574" y="3356997"/>
-            <a:ext cx="9137431" cy="461473"/>
+            <a:off x="6572" y="3356993"/>
+            <a:ext cx="9137431" cy="634020"/>
           </a:xfrm>
           <a:prstGeom prst="rect">
             <a:avLst/>
@@ -4235,22 +4234,13 @@
               </a:spcBef>
             </a:pPr>
             <a:r>
-              <a:rPr lang="en-US" altLang="en-US" sz="2900" dirty="0">
+              <a:rPr lang="en-US" altLang="en-US" sz="4400" dirty="0">
                 <a:solidFill>
                   <a:schemeClr val="bg1"/>
                 </a:solidFill>
                 <a:latin typeface="Century Gothic" panose="020B0502020202020204" pitchFamily="34" charset="0"/>
               </a:rPr>
-              <a:t>Hymn No</a:t>
-            </a:r>
-            <a:r>
-              <a:rPr lang="en-US" altLang="en-US" sz="2900" dirty="0">
-                <a:solidFill>
-                  <a:srgbClr val="FFFF99"/>
-                </a:solidFill>
-                <a:latin typeface="Century Gothic" panose="020B0502020202020204" pitchFamily="34" charset="0"/>
-              </a:rPr>
-              <a:t>.</a:t>
+              <a:t>Hymn No.</a:t>
             </a:r>
           </a:p>
         </p:txBody>
@@ -4265,8 +4255,8 @@
         </p:nvSpPr>
         <p:spPr bwMode="auto">
           <a:xfrm>
-            <a:off x="323528" y="2782674"/>
-            <a:ext cx="3744416" cy="646331"/>
+            <a:off x="-3" y="2503864"/>
+            <a:ext cx="3780584" cy="584775"/>
           </a:xfrm>
           <a:prstGeom prst="rect">
             <a:avLst/>
@@ -4311,7 +4301,7 @@
           </a:bodyPr>
           <a:lstStyle/>
           <a:p>
-            <a:pPr algn="ctr" eaLnBrk="1" hangingPunct="1">
+            <a:pPr eaLnBrk="1" hangingPunct="1">
               <a:spcBef>
                 <a:spcPct val="50000"/>
               </a:spcBef>
@@ -4319,7 +4309,7 @@
               <a:buNone/>
             </a:pPr>
             <a:r>
-              <a:rPr lang="en-GB" altLang="en-US" sz="3600" dirty="0">
+              <a:rPr lang="en-GB" altLang="en-US" sz="3200" b="1" dirty="0">
                 <a:solidFill>
                   <a:schemeClr val="bg1"/>
                 </a:solidFill>
@@ -4328,20 +4318,20 @@
               <a:t>Bible Verse </a:t>
             </a:r>
             <a:r>
-              <a:rPr lang="zh-TW" altLang="en-US" sz="3600" b="1" dirty="0">
+              <a:rPr lang="zh-TW" altLang="en-US" sz="3200" b="1" dirty="0">
                 <a:solidFill>
                   <a:schemeClr val="bg1"/>
                 </a:solidFill>
-                <a:latin typeface="Century Gothic" panose="020B0502020202020204" pitchFamily="34" charset="0"/>
+                <a:latin typeface="+mj-lt"/>
                 <a:ea typeface="金梅新中楷全字體" pitchFamily="49" charset="-120"/>
               </a:rPr>
               <a:t>經文</a:t>
             </a:r>
-            <a:endParaRPr lang="en-US" altLang="en-US" sz="3600" b="1" dirty="0">
+            <a:endParaRPr lang="en-US" altLang="en-US" sz="3200" b="1" dirty="0">
               <a:solidFill>
                 <a:schemeClr val="bg1"/>
               </a:solidFill>
-              <a:latin typeface="Century Gothic" panose="020B0502020202020204" pitchFamily="34" charset="0"/>
+              <a:latin typeface="+mj-lt"/>
               <a:ea typeface="金梅新中楷全字體" pitchFamily="49" charset="-120"/>
             </a:endParaRPr>
           </a:p>
@@ -4357,8 +4347,8 @@
         </p:nvSpPr>
         <p:spPr bwMode="auto">
           <a:xfrm>
-            <a:off x="-324542" y="3482145"/>
-            <a:ext cx="3816351" cy="600164"/>
+            <a:off x="0" y="3429003"/>
+            <a:ext cx="4247528" cy="584775"/>
           </a:xfrm>
           <a:prstGeom prst="rect">
             <a:avLst/>
@@ -4398,7 +4388,7 @@
           </a:extLst>
         </p:spPr>
         <p:txBody>
-          <a:bodyPr>
+          <a:bodyPr wrap="square">
             <a:spAutoFit/>
           </a:bodyPr>
           <a:lstStyle/>
@@ -4409,13 +4399,22 @@
               </a:spcBef>
             </a:pPr>
             <a:r>
-              <a:rPr lang="en-US" altLang="en-US" sz="3300" dirty="0">
+              <a:rPr lang="en-US" altLang="en-US" sz="3200" dirty="0">
+                <a:solidFill>
+                  <a:schemeClr val="bg1"/>
+                </a:solidFill>
+                <a:latin typeface="Book Antiqua" panose="02040602050305030304" pitchFamily="18" charset="0"/>
+              </a:rPr>
+              <a:t>English </a:t>
+            </a:r>
+            <a:r>
+              <a:rPr lang="en-US" altLang="en-US" sz="3200" dirty="0">
                 <a:solidFill>
                   <a:schemeClr val="bg1"/>
                 </a:solidFill>
                 <a:latin typeface="Century Gothic" panose="020B0502020202020204" pitchFamily="34" charset="0"/>
               </a:rPr>
-              <a:t>English Book</a:t>
+              <a:t>Book</a:t>
             </a:r>
           </a:p>
         </p:txBody>
@@ -4430,8 +4429,8 @@
         </p:nvSpPr>
         <p:spPr bwMode="auto">
           <a:xfrm>
-            <a:off x="-324469" y="4201840"/>
-            <a:ext cx="3816351" cy="600164"/>
+            <a:off x="-3" y="4365107"/>
+            <a:ext cx="4247531" cy="584775"/>
           </a:xfrm>
           <a:prstGeom prst="rect">
             <a:avLst/>
@@ -4471,7 +4470,7 @@
           </a:extLst>
         </p:spPr>
         <p:txBody>
-          <a:bodyPr>
+          <a:bodyPr wrap="square">
             <a:spAutoFit/>
           </a:bodyPr>
           <a:lstStyle/>
@@ -4482,11 +4481,11 @@
               </a:spcBef>
             </a:pPr>
             <a:r>
-              <a:rPr lang="en-US" altLang="en-US" sz="3300" dirty="0">
+              <a:rPr lang="en-US" altLang="en-US" sz="3200" dirty="0">
                 <a:solidFill>
                   <a:schemeClr val="bg1"/>
                 </a:solidFill>
-                <a:latin typeface="Century Gothic" panose="020B0502020202020204" pitchFamily="34" charset="0"/>
+                <a:latin typeface="金梅新中楷全字體" panose="02010509060101010101" pitchFamily="49" charset="-120"/>
                 <a:ea typeface="金梅新中楷全字體" panose="02010509060101010101" pitchFamily="49" charset="-120"/>
               </a:rPr>
               <a:t>Chinese Book</a:t>
@@ -4504,8 +4503,8 @@
         </p:nvSpPr>
         <p:spPr bwMode="auto">
           <a:xfrm>
-            <a:off x="4067946" y="3728260"/>
-            <a:ext cx="4392612" cy="1446550"/>
+            <a:off x="4428255" y="3819128"/>
+            <a:ext cx="4709174" cy="769441"/>
           </a:xfrm>
           <a:prstGeom prst="rect">
             <a:avLst/>
@@ -4545,7 +4544,7 @@
           </a:extLst>
         </p:spPr>
         <p:txBody>
-          <a:bodyPr>
+          <a:bodyPr wrap="square" lIns="0" rIns="0">
             <a:spAutoFit/>
           </a:bodyPr>
           <a:lstStyle/>
@@ -4590,7 +4589,9 @@
           <a:p>
             <a:r>
               <a:rPr lang="en-GB" dirty="0">
-                <a:latin typeface="Century Gothic" panose="020B0502020202020204" pitchFamily="34" charset="0"/>
+                <a:solidFill>
+                  <a:schemeClr val="bg1"/>
+                </a:solidFill>
               </a:rPr>
               <a:t>Service/Hymnal</a:t>
             </a:r>
@@ -4613,8 +4614,8 @@
         </p:nvSpPr>
         <p:spPr bwMode="auto">
           <a:xfrm>
-            <a:off x="4525727" y="6246421"/>
-            <a:ext cx="4464051" cy="400110"/>
+            <a:off x="35496" y="6004597"/>
+            <a:ext cx="4330867" cy="400110"/>
           </a:xfrm>
           <a:prstGeom prst="rect">
             <a:avLst/>
@@ -4654,42 +4655,509 @@
           </a:extLst>
         </p:spPr>
         <p:txBody>
-          <a:bodyPr>
+          <a:bodyPr wrap="square">
             <a:spAutoFit/>
           </a:bodyPr>
           <a:lstStyle/>
           <a:p>
-            <a:pPr algn="r">
+            <a:pPr>
               <a:spcBef>
                 <a:spcPct val="50000"/>
               </a:spcBef>
             </a:pPr>
             <a:r>
-              <a:rPr lang="en-US" altLang="zh-CN" sz="2000" b="1" dirty="0" err="1">
+              <a:rPr lang="en-US" altLang="zh-CN" sz="2000" dirty="0">
                 <a:solidFill>
                   <a:schemeClr val="bg1"/>
                 </a:solidFill>
                 <a:latin typeface="Century Gothic" panose="020B0502020202020204" pitchFamily="34" charset="0"/>
                 <a:ea typeface="宋体" panose="02010600030101010101" pitchFamily="2" charset="-122"/>
               </a:rPr>
-              <a:t>ServiceType</a:t>
-            </a:r>
-            <a:endParaRPr lang="en-US" altLang="zh-CN" sz="2000" b="1" dirty="0">
-              <a:solidFill>
-                <a:schemeClr val="bg1"/>
-              </a:solidFill>
-              <a:latin typeface="Century Gothic" panose="020B0502020202020204" pitchFamily="34" charset="0"/>
-              <a:ea typeface="宋体" panose="02010600030101010101" pitchFamily="2" charset="-122"/>
-            </a:endParaRPr>
-          </a:p>
-        </p:txBody>
-      </p:sp>
-      <p:sp>
-        <p:nvSpPr>
-          <p:cNvPr id="16" name="Text Box 11">
+              <a:t>Service Type</a:t>
+            </a:r>
+          </a:p>
+        </p:txBody>
+      </p:sp>
+      <p:pic>
+        <p:nvPicPr>
+          <p:cNvPr id="21" name="Picture 20" descr="Logo&#10;&#10;Description automatically generated with medium confidence">
             <a:extLst>
               <a:ext uri="{FF2B5EF4-FFF2-40B4-BE49-F238E27FC236}">
-                <a16:creationId xmlns:a16="http://schemas.microsoft.com/office/drawing/2014/main" id="{FD7E944A-711C-41E4-8491-C90508960074}"/>
+                <a16:creationId xmlns:a16="http://schemas.microsoft.com/office/drawing/2014/main" id="{DBC24699-ADC3-1E04-E310-3FA11B41F0DF}"/>
+              </a:ext>
+            </a:extLst>
+          </p:cNvPr>
+          <p:cNvPicPr>
+            <a:picLocks noChangeAspect="1"/>
+          </p:cNvPicPr>
+          <p:nvPr/>
+        </p:nvPicPr>
+        <p:blipFill>
+          <a:blip r:embed="rId3" cstate="print">
+            <a:extLst>
+              <a:ext uri="{28A0092B-C50C-407E-A947-70E740481C1C}">
+                <a14:useLocalDpi xmlns:a14="http://schemas.microsoft.com/office/drawing/2010/main" val="0"/>
+              </a:ext>
+            </a:extLst>
+          </a:blip>
+          <a:stretch>
+            <a:fillRect/>
+          </a:stretch>
+        </p:blipFill>
+        <p:spPr>
+          <a:xfrm>
+            <a:off x="117892" y="6396577"/>
+            <a:ext cx="2664297" cy="344791"/>
+          </a:xfrm>
+          <a:prstGeom prst="rect">
+            <a:avLst/>
+          </a:prstGeom>
+        </p:spPr>
+      </p:pic>
+      <p:grpSp>
+        <p:nvGrpSpPr>
+          <p:cNvPr id="22" name="Group 21">
+            <a:extLst>
+              <a:ext uri="{FF2B5EF4-FFF2-40B4-BE49-F238E27FC236}">
+                <a16:creationId xmlns:a16="http://schemas.microsoft.com/office/drawing/2014/main" id="{DCC0CD01-B0C7-17AF-454C-CAB88B5C80D6}"/>
+              </a:ext>
+            </a:extLst>
+          </p:cNvPr>
+          <p:cNvGrpSpPr/>
+          <p:nvPr/>
+        </p:nvGrpSpPr>
+        <p:grpSpPr>
+          <a:xfrm>
+            <a:off x="3275856" y="6427357"/>
+            <a:ext cx="5734763" cy="307777"/>
+            <a:chOff x="4799854" y="6300028"/>
+            <a:chExt cx="5734763" cy="307776"/>
+          </a:xfrm>
+        </p:grpSpPr>
+        <p:sp>
+          <p:nvSpPr>
+            <p:cNvPr id="23" name="TextBox 22">
+              <a:extLst>
+                <a:ext uri="{FF2B5EF4-FFF2-40B4-BE49-F238E27FC236}">
+                  <a16:creationId xmlns:a16="http://schemas.microsoft.com/office/drawing/2014/main" id="{05BB4C74-D38F-A3C1-A90A-E680D921BA2A}"/>
+                </a:ext>
+              </a:extLst>
+            </p:cNvPr>
+            <p:cNvSpPr txBox="1"/>
+            <p:nvPr/>
+          </p:nvSpPr>
+          <p:spPr>
+            <a:xfrm>
+              <a:off x="4799854" y="6300028"/>
+              <a:ext cx="5734763" cy="307776"/>
+            </a:xfrm>
+            <a:prstGeom prst="rect">
+              <a:avLst/>
+            </a:prstGeom>
+            <a:noFill/>
+            <a:ln w="19050">
+              <a:solidFill>
+                <a:srgbClr val="FF0000"/>
+              </a:solidFill>
+            </a:ln>
+          </p:spPr>
+          <p:txBody>
+            <a:bodyPr wrap="square" rtlCol="0" anchor="ctr">
+              <a:spAutoFit/>
+            </a:bodyPr>
+            <a:lstStyle/>
+            <a:p>
+              <a:r>
+                <a:rPr lang="en-GB" sz="1400" dirty="0">
+                  <a:solidFill>
+                    <a:schemeClr val="bg1"/>
+                  </a:solidFill>
+                  <a:latin typeface="Century Gothic" panose="020B0502020202020204" pitchFamily="34" charset="0"/>
+                </a:rPr>
+                <a:t>Please Turn Off/Silence Your Devices </a:t>
+              </a:r>
+              <a:r>
+                <a:rPr lang="ja-JP" altLang="en-US" sz="1400" dirty="0">
+                  <a:solidFill>
+                    <a:schemeClr val="bg1"/>
+                  </a:solidFill>
+                  <a:latin typeface="Century Gothic" panose="020B0502020202020204" pitchFamily="34" charset="0"/>
+                </a:rPr>
+                <a:t>請靜音或關閉所有電子設備</a:t>
+              </a:r>
+            </a:p>
+          </p:txBody>
+        </p:sp>
+        <p:pic>
+          <p:nvPicPr>
+            <p:cNvPr id="24" name="Picture 23" descr="Shape&#10;&#10;Description automatically generated with low confidence">
+              <a:extLst>
+                <a:ext uri="{FF2B5EF4-FFF2-40B4-BE49-F238E27FC236}">
+                  <a16:creationId xmlns:a16="http://schemas.microsoft.com/office/drawing/2014/main" id="{10B15791-20DE-9334-AE79-E03696114A61}"/>
+                </a:ext>
+              </a:extLst>
+            </p:cNvPr>
+            <p:cNvPicPr>
+              <a:picLocks noChangeAspect="1"/>
+            </p:cNvPicPr>
+            <p:nvPr/>
+          </p:nvPicPr>
+          <p:blipFill>
+            <a:blip r:embed="rId4" cstate="print">
+              <a:extLst>
+                <a:ext uri="{BEBA8EAE-BF5A-486C-A8C5-ECC9F3942E4B}">
+                  <a14:imgProps xmlns:a14="http://schemas.microsoft.com/office/drawing/2010/main">
+                    <a14:imgLayer r:embed="rId5">
+                      <a14:imgEffect>
+                        <a14:colorTemperature colorTemp="11500"/>
+                      </a14:imgEffect>
+                      <a14:imgEffect>
+                        <a14:saturation sat="400000"/>
+                      </a14:imgEffect>
+                      <a14:imgEffect>
+                        <a14:brightnessContrast bright="100000" contrast="100000"/>
+                      </a14:imgEffect>
+                    </a14:imgLayer>
+                  </a14:imgProps>
+                </a:ext>
+                <a:ext uri="{28A0092B-C50C-407E-A947-70E740481C1C}">
+                  <a14:useLocalDpi xmlns:a14="http://schemas.microsoft.com/office/drawing/2010/main" val="0"/>
+                </a:ext>
+              </a:extLst>
+            </a:blip>
+            <a:stretch>
+              <a:fillRect/>
+            </a:stretch>
+          </p:blipFill>
+          <p:spPr>
+            <a:xfrm>
+              <a:off x="10218327" y="6309320"/>
+              <a:ext cx="280267" cy="280267"/>
+            </a:xfrm>
+            <a:prstGeom prst="rect">
+              <a:avLst/>
+            </a:prstGeom>
+          </p:spPr>
+        </p:pic>
+      </p:grpSp>
+    </p:spTree>
+  </p:cSld>
+  <p:clrMapOvr>
+    <a:masterClrMapping/>
+  </p:clrMapOvr>
+</p:sld>
+</file>
+
+<file path=ppt/slides/slide2.xml><?xml version="1.0" encoding="utf-8"?>
+<p:sld xmlns:a="http://schemas.openxmlformats.org/drawingml/2006/main" xmlns:r="http://schemas.openxmlformats.org/officeDocument/2006/relationships" xmlns:p="http://schemas.openxmlformats.org/presentationml/2006/main">
+  <p:cSld>
+    <p:bg>
+      <p:bgPr>
+        <a:solidFill>
+          <a:schemeClr val="tx1"/>
+        </a:solidFill>
+        <a:effectLst/>
+      </p:bgPr>
+    </p:bg>
+    <p:spTree>
+      <p:nvGrpSpPr>
+        <p:cNvPr id="1" name=""/>
+        <p:cNvGrpSpPr/>
+        <p:nvPr/>
+      </p:nvGrpSpPr>
+      <p:grpSpPr>
+        <a:xfrm>
+          <a:off x="0" y="0"/>
+          <a:ext cx="0" cy="0"/>
+          <a:chOff x="0" y="0"/>
+          <a:chExt cx="0" cy="0"/>
+        </a:xfrm>
+      </p:grpSpPr>
+      <p:sp>
+        <p:nvSpPr>
+          <p:cNvPr id="8" name="Title 1">
+            <a:extLst>
+              <a:ext uri="{FF2B5EF4-FFF2-40B4-BE49-F238E27FC236}">
+                <a16:creationId xmlns:a16="http://schemas.microsoft.com/office/drawing/2014/main" id="{3DD2CCF3-660C-4B35-8262-BE8668E0E220}"/>
+              </a:ext>
+            </a:extLst>
+          </p:cNvPr>
+          <p:cNvSpPr>
+            <a:spLocks noGrp="1"/>
+          </p:cNvSpPr>
+          <p:nvPr>
+            <p:ph type="ctrTitle"/>
+          </p:nvPr>
+        </p:nvSpPr>
+        <p:spPr>
+          <a:xfrm>
+            <a:off x="-7741368" y="2619557"/>
+            <a:ext cx="6858000" cy="2387600"/>
+          </a:xfrm>
+        </p:spPr>
+        <p:txBody>
+          <a:bodyPr/>
+          <a:lstStyle/>
+          <a:p>
+            <a:r>
+              <a:rPr lang="en-GB" dirty="0">
+                <a:solidFill>
+                  <a:schemeClr val="bg1"/>
+                </a:solidFill>
+                <a:latin typeface="Century Gothic" panose="020B0502020202020204" pitchFamily="34" charset="0"/>
+              </a:rPr>
+              <a:t>Prayer Requests (Image)</a:t>
+            </a:r>
+          </a:p>
+        </p:txBody>
+      </p:sp>
+      <p:sp>
+        <p:nvSpPr>
+          <p:cNvPr id="2" name="TextBox 1">
+            <a:extLst>
+              <a:ext uri="{FF2B5EF4-FFF2-40B4-BE49-F238E27FC236}">
+                <a16:creationId xmlns:a16="http://schemas.microsoft.com/office/drawing/2014/main" id="{6EC0A171-41D3-4538-A3AA-95F4377BCA8B}"/>
+              </a:ext>
+            </a:extLst>
+          </p:cNvPr>
+          <p:cNvSpPr txBox="1"/>
+          <p:nvPr/>
+        </p:nvSpPr>
+        <p:spPr>
+          <a:xfrm>
+            <a:off x="2051720" y="3105836"/>
+            <a:ext cx="5040560" cy="646331"/>
+          </a:xfrm>
+          <a:prstGeom prst="rect">
+            <a:avLst/>
+          </a:prstGeom>
+          <a:noFill/>
+        </p:spPr>
+        <p:txBody>
+          <a:bodyPr wrap="square" rtlCol="0">
+            <a:spAutoFit/>
+          </a:bodyPr>
+          <a:lstStyle/>
+          <a:p>
+            <a:pPr algn="ctr"/>
+            <a:r>
+              <a:rPr lang="en-GB" sz="3600" b="1" dirty="0">
+                <a:solidFill>
+                  <a:schemeClr val="bg1"/>
+                </a:solidFill>
+                <a:latin typeface="Century Gothic" panose="020B0502020202020204" pitchFamily="34" charset="0"/>
+              </a:rPr>
+              <a:t>IMAGE PLACEHOLDER</a:t>
+            </a:r>
+          </a:p>
+        </p:txBody>
+      </p:sp>
+      <p:pic>
+        <p:nvPicPr>
+          <p:cNvPr id="9" name="Picture 8" descr="Logo&#10;&#10;Description automatically generated with medium confidence">
+            <a:extLst>
+              <a:ext uri="{FF2B5EF4-FFF2-40B4-BE49-F238E27FC236}">
+                <a16:creationId xmlns:a16="http://schemas.microsoft.com/office/drawing/2014/main" id="{F8A2D7E0-0F5E-3E3A-4686-BF45195BA314}"/>
+              </a:ext>
+            </a:extLst>
+          </p:cNvPr>
+          <p:cNvPicPr>
+            <a:picLocks noChangeAspect="1"/>
+          </p:cNvPicPr>
+          <p:nvPr/>
+        </p:nvPicPr>
+        <p:blipFill>
+          <a:blip r:embed="rId2" cstate="print">
+            <a:extLst>
+              <a:ext uri="{28A0092B-C50C-407E-A947-70E740481C1C}">
+                <a14:useLocalDpi xmlns:a14="http://schemas.microsoft.com/office/drawing/2010/main" val="0"/>
+              </a:ext>
+            </a:extLst>
+          </a:blip>
+          <a:stretch>
+            <a:fillRect/>
+          </a:stretch>
+        </p:blipFill>
+        <p:spPr>
+          <a:xfrm>
+            <a:off x="117892" y="6396577"/>
+            <a:ext cx="2664297" cy="344791"/>
+          </a:xfrm>
+          <a:prstGeom prst="rect">
+            <a:avLst/>
+          </a:prstGeom>
+        </p:spPr>
+      </p:pic>
+      <p:grpSp>
+        <p:nvGrpSpPr>
+          <p:cNvPr id="13" name="Group 12">
+            <a:extLst>
+              <a:ext uri="{FF2B5EF4-FFF2-40B4-BE49-F238E27FC236}">
+                <a16:creationId xmlns:a16="http://schemas.microsoft.com/office/drawing/2014/main" id="{5DA3655D-701E-54DA-28AF-38159A68B3C8}"/>
+              </a:ext>
+            </a:extLst>
+          </p:cNvPr>
+          <p:cNvGrpSpPr/>
+          <p:nvPr/>
+        </p:nvGrpSpPr>
+        <p:grpSpPr>
+          <a:xfrm>
+            <a:off x="3275856" y="6427357"/>
+            <a:ext cx="5734763" cy="307777"/>
+            <a:chOff x="4799854" y="6300028"/>
+            <a:chExt cx="5734763" cy="307776"/>
+          </a:xfrm>
+        </p:grpSpPr>
+        <p:sp>
+          <p:nvSpPr>
+            <p:cNvPr id="14" name="TextBox 13">
+              <a:extLst>
+                <a:ext uri="{FF2B5EF4-FFF2-40B4-BE49-F238E27FC236}">
+                  <a16:creationId xmlns:a16="http://schemas.microsoft.com/office/drawing/2014/main" id="{BFED2922-64A6-AD45-DDD0-2982AA603F62}"/>
+                </a:ext>
+              </a:extLst>
+            </p:cNvPr>
+            <p:cNvSpPr txBox="1"/>
+            <p:nvPr/>
+          </p:nvSpPr>
+          <p:spPr>
+            <a:xfrm>
+              <a:off x="4799854" y="6300028"/>
+              <a:ext cx="5734763" cy="307776"/>
+            </a:xfrm>
+            <a:prstGeom prst="rect">
+              <a:avLst/>
+            </a:prstGeom>
+            <a:noFill/>
+            <a:ln w="19050">
+              <a:solidFill>
+                <a:srgbClr val="FF0000"/>
+              </a:solidFill>
+            </a:ln>
+          </p:spPr>
+          <p:txBody>
+            <a:bodyPr wrap="square" rtlCol="0" anchor="ctr">
+              <a:spAutoFit/>
+            </a:bodyPr>
+            <a:lstStyle/>
+            <a:p>
+              <a:r>
+                <a:rPr lang="en-GB" sz="1400" dirty="0">
+                  <a:solidFill>
+                    <a:schemeClr val="bg1"/>
+                  </a:solidFill>
+                  <a:latin typeface="Century Gothic" panose="020B0502020202020204" pitchFamily="34" charset="0"/>
+                </a:rPr>
+                <a:t>Please Turn Off/Silence Your Devices </a:t>
+              </a:r>
+              <a:r>
+                <a:rPr lang="ja-JP" altLang="en-US" sz="1400" dirty="0">
+                  <a:solidFill>
+                    <a:schemeClr val="bg1"/>
+                  </a:solidFill>
+                  <a:latin typeface="Century Gothic" panose="020B0502020202020204" pitchFamily="34" charset="0"/>
+                </a:rPr>
+                <a:t>請靜音或關閉所有電子設備</a:t>
+              </a:r>
+            </a:p>
+          </p:txBody>
+        </p:sp>
+        <p:pic>
+          <p:nvPicPr>
+            <p:cNvPr id="15" name="Picture 14" descr="Shape&#10;&#10;Description automatically generated with low confidence">
+              <a:extLst>
+                <a:ext uri="{FF2B5EF4-FFF2-40B4-BE49-F238E27FC236}">
+                  <a16:creationId xmlns:a16="http://schemas.microsoft.com/office/drawing/2014/main" id="{410F383A-CEFA-D9B1-7962-0D52928214F6}"/>
+                </a:ext>
+              </a:extLst>
+            </p:cNvPr>
+            <p:cNvPicPr>
+              <a:picLocks noChangeAspect="1"/>
+            </p:cNvPicPr>
+            <p:nvPr/>
+          </p:nvPicPr>
+          <p:blipFill>
+            <a:blip r:embed="rId3" cstate="print">
+              <a:extLst>
+                <a:ext uri="{BEBA8EAE-BF5A-486C-A8C5-ECC9F3942E4B}">
+                  <a14:imgProps xmlns:a14="http://schemas.microsoft.com/office/drawing/2010/main">
+                    <a14:imgLayer r:embed="rId4">
+                      <a14:imgEffect>
+                        <a14:colorTemperature colorTemp="11500"/>
+                      </a14:imgEffect>
+                      <a14:imgEffect>
+                        <a14:saturation sat="400000"/>
+                      </a14:imgEffect>
+                      <a14:imgEffect>
+                        <a14:brightnessContrast bright="100000" contrast="100000"/>
+                      </a14:imgEffect>
+                    </a14:imgLayer>
+                  </a14:imgProps>
+                </a:ext>
+                <a:ext uri="{28A0092B-C50C-407E-A947-70E740481C1C}">
+                  <a14:useLocalDpi xmlns:a14="http://schemas.microsoft.com/office/drawing/2010/main" val="0"/>
+                </a:ext>
+              </a:extLst>
+            </a:blip>
+            <a:stretch>
+              <a:fillRect/>
+            </a:stretch>
+          </p:blipFill>
+          <p:spPr>
+            <a:xfrm>
+              <a:off x="10218327" y="6309320"/>
+              <a:ext cx="280267" cy="280267"/>
+            </a:xfrm>
+            <a:prstGeom prst="rect">
+              <a:avLst/>
+            </a:prstGeom>
+          </p:spPr>
+        </p:pic>
+      </p:grpSp>
+    </p:spTree>
+    <p:extLst>
+      <p:ext uri="{BB962C8B-B14F-4D97-AF65-F5344CB8AC3E}">
+        <p14:creationId xmlns:p14="http://schemas.microsoft.com/office/powerpoint/2010/main" val="3351645641"/>
+      </p:ext>
+    </p:extLst>
+  </p:cSld>
+  <p:clrMapOvr>
+    <a:masterClrMapping/>
+  </p:clrMapOvr>
+</p:sld>
+</file>
+
+<file path=ppt/slides/slide3.xml><?xml version="1.0" encoding="utf-8"?>
+<p:sld xmlns:a="http://schemas.openxmlformats.org/drawingml/2006/main" xmlns:r="http://schemas.openxmlformats.org/officeDocument/2006/relationships" xmlns:p="http://schemas.openxmlformats.org/presentationml/2006/main">
+  <p:cSld>
+    <p:bg>
+      <p:bgPr>
+        <a:solidFill>
+          <a:schemeClr val="tx1"/>
+        </a:solidFill>
+        <a:effectLst/>
+      </p:bgPr>
+    </p:bg>
+    <p:spTree>
+      <p:nvGrpSpPr>
+        <p:cNvPr id="1" name=""/>
+        <p:cNvGrpSpPr/>
+        <p:nvPr/>
+      </p:nvGrpSpPr>
+      <p:grpSpPr>
+        <a:xfrm>
+          <a:off x="0" y="0"/>
+          <a:ext cx="0" cy="0"/>
+          <a:chOff x="0" y="0"/>
+          <a:chExt cx="0" cy="0"/>
+        </a:xfrm>
+      </p:grpSpPr>
+      <p:sp>
+        <p:nvSpPr>
+          <p:cNvPr id="6" name="Text Box 12">
+            <a:extLst>
+              <a:ext uri="{FF2B5EF4-FFF2-40B4-BE49-F238E27FC236}">
+                <a16:creationId xmlns:a16="http://schemas.microsoft.com/office/drawing/2014/main" id="{BEA17A2D-ADBC-44E7-8241-0C2921ADB5E3}"/>
               </a:ext>
             </a:extLst>
           </p:cNvPr>
@@ -4700,8 +5168,8 @@
         </p:nvSpPr>
         <p:spPr bwMode="auto">
           <a:xfrm>
-            <a:off x="611560" y="6107922"/>
-            <a:ext cx="2736156" cy="338554"/>
+            <a:off x="-1523999" y="908720"/>
+            <a:ext cx="12192000" cy="5256584"/>
           </a:xfrm>
           <a:prstGeom prst="rect">
             <a:avLst/>
@@ -4742,34 +5210,27 @@
         </p:spPr>
         <p:txBody>
           <a:bodyPr wrap="square">
-            <a:spAutoFit/>
+            <a:noAutofit/>
           </a:bodyPr>
           <a:lstStyle/>
           <a:p>
-            <a:pPr>
-              <a:spcBef>
-                <a:spcPct val="50000"/>
-              </a:spcBef>
-            </a:pPr>
-            <a:r>
-              <a:rPr lang="en-US" altLang="en-US" sz="1600" dirty="0">
-                <a:solidFill>
-                  <a:schemeClr val="bg1"/>
-                </a:solidFill>
-                <a:latin typeface="Century Gothic" panose="020B0502020202020204" pitchFamily="34" charset="0"/>
-                <a:ea typeface="金梅新中楷全字體" panose="02010509060101010101" pitchFamily="49" charset="-120"/>
-              </a:rPr>
-              <a:t>請 關 您 的 手 提 電 話 </a:t>
-            </a:r>
-          </a:p>
-        </p:txBody>
-      </p:sp>
-      <p:sp>
-        <p:nvSpPr>
-          <p:cNvPr id="17" name="Text Box 12">
+            <a:pPr algn="ctr"/>
+            <a:endParaRPr lang="en-GB" altLang="zh-TW" sz="2200" b="1" dirty="0">
+              <a:solidFill>
+                <a:schemeClr val="bg1"/>
+              </a:solidFill>
+              <a:latin typeface="Century Gothic" panose="020B0502020202020204" pitchFamily="34" charset="0"/>
+              <a:ea typeface="金梅新中楷全字體" panose="02010509060101010101" pitchFamily="49" charset="-120"/>
+            </a:endParaRPr>
+          </a:p>
+        </p:txBody>
+      </p:sp>
+      <p:sp>
+        <p:nvSpPr>
+          <p:cNvPr id="7" name="Text Box 12">
             <a:extLst>
               <a:ext uri="{FF2B5EF4-FFF2-40B4-BE49-F238E27FC236}">
-                <a16:creationId xmlns:a16="http://schemas.microsoft.com/office/drawing/2014/main" id="{CAB9F7E6-2E50-4266-AC18-5A7B26BAC8FC}"/>
+                <a16:creationId xmlns:a16="http://schemas.microsoft.com/office/drawing/2014/main" id="{4A814393-22EC-4030-B099-593A4A5B942E}"/>
               </a:ext>
             </a:extLst>
           </p:cNvPr>
@@ -4780,8 +5241,8 @@
         </p:nvSpPr>
         <p:spPr bwMode="auto">
           <a:xfrm>
-            <a:off x="611560" y="6369861"/>
-            <a:ext cx="3672335" cy="276999"/>
+            <a:off x="347471" y="260648"/>
+            <a:ext cx="8449060" cy="648072"/>
           </a:xfrm>
           <a:prstGeom prst="rect">
             <a:avLst/>
@@ -4822,78 +5283,298 @@
         </p:spPr>
         <p:txBody>
           <a:bodyPr wrap="square">
-            <a:spAutoFit/>
+            <a:noAutofit/>
           </a:bodyPr>
           <a:lstStyle/>
           <a:p>
-            <a:pPr>
-              <a:spcBef>
-                <a:spcPct val="50000"/>
-              </a:spcBef>
-            </a:pPr>
-            <a:r>
-              <a:rPr lang="en-GB" altLang="en-US" sz="1200" b="1" dirty="0">
+            <a:pPr algn="ctr"/>
+            <a:r>
+              <a:rPr lang="en-GB" altLang="en-US" sz="3200" b="1" u="sng" dirty="0">
                 <a:solidFill>
                   <a:schemeClr val="bg1"/>
                 </a:solidFill>
                 <a:latin typeface="Century Gothic" panose="020B0502020202020204" pitchFamily="34" charset="0"/>
               </a:rPr>
-              <a:t>PLEASE SWITCH OFF YOUR MOBILE PHONE</a:t>
-            </a:r>
-            <a:endParaRPr lang="en-US" altLang="en-US" sz="1200" b="1" dirty="0">
+              <a:t>Prayer Requests</a:t>
+            </a:r>
+            <a:r>
+              <a:rPr lang="en-GB" altLang="en-US" sz="3200" b="1" u="sng" dirty="0">
+                <a:solidFill>
+                  <a:schemeClr val="bg1"/>
+                </a:solidFill>
+                <a:latin typeface="Century Gothic" panose="020B0502020202020204" pitchFamily="34" charset="0"/>
+                <a:ea typeface="金梅新中楷全字體" panose="02010509060101010101" pitchFamily="49" charset="-120"/>
+              </a:rPr>
+              <a:t>- </a:t>
+            </a:r>
+            <a:r>
+              <a:rPr lang="zh-TW" altLang="en-US" sz="3200" b="1" u="sng" dirty="0">
+                <a:solidFill>
+                  <a:schemeClr val="bg1"/>
+                </a:solidFill>
+                <a:latin typeface="Century Gothic" panose="020B0502020202020204" pitchFamily="34" charset="0"/>
+                <a:ea typeface="金梅新中楷全字體" panose="02010509060101010101" pitchFamily="49" charset="-120"/>
+              </a:rPr>
+              <a:t>代禱</a:t>
+            </a:r>
+            <a:endParaRPr lang="en-GB" altLang="zh-TW" sz="3200" b="1" u="sng" dirty="0">
               <a:solidFill>
                 <a:schemeClr val="bg1"/>
               </a:solidFill>
               <a:latin typeface="Century Gothic" panose="020B0502020202020204" pitchFamily="34" charset="0"/>
+              <a:ea typeface="金梅新中楷全字體" panose="02010509060101010101" pitchFamily="49" charset="-120"/>
             </a:endParaRPr>
+          </a:p>
+        </p:txBody>
+      </p:sp>
+      <p:sp>
+        <p:nvSpPr>
+          <p:cNvPr id="8" name="Title 1">
+            <a:extLst>
+              <a:ext uri="{FF2B5EF4-FFF2-40B4-BE49-F238E27FC236}">
+                <a16:creationId xmlns:a16="http://schemas.microsoft.com/office/drawing/2014/main" id="{3DD2CCF3-660C-4B35-8262-BE8668E0E220}"/>
+              </a:ext>
+            </a:extLst>
+          </p:cNvPr>
+          <p:cNvSpPr>
+            <a:spLocks noGrp="1"/>
+          </p:cNvSpPr>
+          <p:nvPr>
+            <p:ph type="ctrTitle"/>
+          </p:nvPr>
+        </p:nvSpPr>
+        <p:spPr>
+          <a:xfrm>
+            <a:off x="-7741368" y="2619557"/>
+            <a:ext cx="6858000" cy="2387600"/>
+          </a:xfrm>
+        </p:spPr>
+        <p:txBody>
+          <a:bodyPr/>
+          <a:lstStyle/>
+          <a:p>
+            <a:r>
+              <a:rPr lang="en-GB" dirty="0">
+                <a:latin typeface="Century Gothic" panose="020B0502020202020204" pitchFamily="34" charset="0"/>
+              </a:rPr>
+              <a:t>Prayer Requests</a:t>
+            </a:r>
           </a:p>
         </p:txBody>
       </p:sp>
       <p:pic>
         <p:nvPicPr>
-          <p:cNvPr id="18" name="Picture 2" descr="Custom No Mobile Phones Sign | The Sign Shed">
+          <p:cNvPr id="9" name="Picture 8" descr="Shape&#10;&#10;Description automatically generated with low confidence">
             <a:extLst>
               <a:ext uri="{FF2B5EF4-FFF2-40B4-BE49-F238E27FC236}">
-                <a16:creationId xmlns:a16="http://schemas.microsoft.com/office/drawing/2014/main" id="{198AE553-A78B-4238-8954-5B5301A1BDC8}"/>
+                <a16:creationId xmlns:a16="http://schemas.microsoft.com/office/drawing/2014/main" id="{74DC84FB-B8E8-09F8-D629-C4E6D71E8C7F}"/>
               </a:ext>
             </a:extLst>
           </p:cNvPr>
           <p:cNvPicPr>
-            <a:picLocks noChangeAspect="1" noChangeArrowheads="1"/>
+            <a:picLocks noChangeAspect="1"/>
           </p:cNvPicPr>
           <p:nvPr/>
         </p:nvPicPr>
-        <p:blipFill rotWithShape="1">
-          <a:blip r:embed="rId3" cstate="print">
+        <p:blipFill>
+          <a:blip r:embed="rId2" cstate="print">
+            <a:extLst>
+              <a:ext uri="{BEBA8EAE-BF5A-486C-A8C5-ECC9F3942E4B}">
+                <a14:imgProps xmlns:a14="http://schemas.microsoft.com/office/drawing/2010/main">
+                  <a14:imgLayer r:embed="rId3">
+                    <a14:imgEffect>
+                      <a14:colorTemperature colorTemp="11500"/>
+                    </a14:imgEffect>
+                    <a14:imgEffect>
+                      <a14:saturation sat="400000"/>
+                    </a14:imgEffect>
+                    <a14:imgEffect>
+                      <a14:brightnessContrast bright="100000" contrast="100000"/>
+                    </a14:imgEffect>
+                  </a14:imgLayer>
+                </a14:imgProps>
+              </a:ext>
+              <a:ext uri="{28A0092B-C50C-407E-A947-70E740481C1C}">
+                <a14:useLocalDpi xmlns:a14="http://schemas.microsoft.com/office/drawing/2010/main" val="0"/>
+              </a:ext>
+            </a:extLst>
+          </a:blip>
+          <a:stretch>
+            <a:fillRect/>
+          </a:stretch>
+        </p:blipFill>
+        <p:spPr>
+          <a:xfrm>
+            <a:off x="10134490" y="6309322"/>
+            <a:ext cx="280267" cy="280267"/>
+          </a:xfrm>
+          <a:prstGeom prst="rect">
+            <a:avLst/>
+          </a:prstGeom>
+        </p:spPr>
+      </p:pic>
+      <p:pic>
+        <p:nvPicPr>
+          <p:cNvPr id="11" name="Picture 10" descr="Logo&#10;&#10;Description automatically generated with medium confidence">
+            <a:extLst>
+              <a:ext uri="{FF2B5EF4-FFF2-40B4-BE49-F238E27FC236}">
+                <a16:creationId xmlns:a16="http://schemas.microsoft.com/office/drawing/2014/main" id="{24069B9F-ECCF-99AF-B2CD-5A16B5E832CD}"/>
+              </a:ext>
+            </a:extLst>
+          </p:cNvPr>
+          <p:cNvPicPr>
+            <a:picLocks noChangeAspect="1"/>
+          </p:cNvPicPr>
+          <p:nvPr/>
+        </p:nvPicPr>
+        <p:blipFill>
+          <a:blip r:embed="rId4" cstate="print">
             <a:extLst>
               <a:ext uri="{28A0092B-C50C-407E-A947-70E740481C1C}">
                 <a14:useLocalDpi xmlns:a14="http://schemas.microsoft.com/office/drawing/2010/main" val="0"/>
               </a:ext>
             </a:extLst>
           </a:blip>
-          <a:srcRect l="3327" t="11250" r="71169" b="12911"/>
-          <a:stretch/>
+          <a:stretch>
+            <a:fillRect/>
+          </a:stretch>
         </p:blipFill>
-        <p:spPr bwMode="auto">
+        <p:spPr>
           <a:xfrm>
-            <a:off x="179437" y="6144630"/>
-            <a:ext cx="432048" cy="432048"/>
+            <a:off x="117892" y="6396577"/>
+            <a:ext cx="2664297" cy="344791"/>
           </a:xfrm>
           <a:prstGeom prst="rect">
             <a:avLst/>
           </a:prstGeom>
-          <a:noFill/>
-          <a:extLst>
-            <a:ext uri="{909E8E84-426E-40DD-AFC4-6F175D3DCCD1}">
-              <a14:hiddenFill xmlns:a14="http://schemas.microsoft.com/office/drawing/2010/main">
-                <a:solidFill>
-                  <a:srgbClr val="FFFFFF"/>
-                </a:solidFill>
-              </a14:hiddenFill>
-            </a:ext>
-          </a:extLst>
         </p:spPr>
       </p:pic>
+      <p:grpSp>
+        <p:nvGrpSpPr>
+          <p:cNvPr id="12" name="Group 11">
+            <a:extLst>
+              <a:ext uri="{FF2B5EF4-FFF2-40B4-BE49-F238E27FC236}">
+                <a16:creationId xmlns:a16="http://schemas.microsoft.com/office/drawing/2014/main" id="{48DFC278-37A1-79DF-CF89-6B499EE01FE9}"/>
+              </a:ext>
+            </a:extLst>
+          </p:cNvPr>
+          <p:cNvGrpSpPr/>
+          <p:nvPr/>
+        </p:nvGrpSpPr>
+        <p:grpSpPr>
+          <a:xfrm>
+            <a:off x="3275856" y="6427357"/>
+            <a:ext cx="5734763" cy="307777"/>
+            <a:chOff x="4799854" y="6300028"/>
+            <a:chExt cx="5734763" cy="307776"/>
+          </a:xfrm>
+        </p:grpSpPr>
+        <p:sp>
+          <p:nvSpPr>
+            <p:cNvPr id="14" name="TextBox 13">
+              <a:extLst>
+                <a:ext uri="{FF2B5EF4-FFF2-40B4-BE49-F238E27FC236}">
+                  <a16:creationId xmlns:a16="http://schemas.microsoft.com/office/drawing/2014/main" id="{34FB57F4-7709-9649-9ECF-E64A8197756E}"/>
+                </a:ext>
+              </a:extLst>
+            </p:cNvPr>
+            <p:cNvSpPr txBox="1"/>
+            <p:nvPr/>
+          </p:nvSpPr>
+          <p:spPr>
+            <a:xfrm>
+              <a:off x="4799854" y="6300028"/>
+              <a:ext cx="5734763" cy="307776"/>
+            </a:xfrm>
+            <a:prstGeom prst="rect">
+              <a:avLst/>
+            </a:prstGeom>
+            <a:noFill/>
+            <a:ln w="19050">
+              <a:solidFill>
+                <a:srgbClr val="FF0000"/>
+              </a:solidFill>
+            </a:ln>
+          </p:spPr>
+          <p:txBody>
+            <a:bodyPr wrap="square" rtlCol="0" anchor="ctr">
+              <a:spAutoFit/>
+            </a:bodyPr>
+            <a:lstStyle/>
+            <a:p>
+              <a:r>
+                <a:rPr lang="en-GB" sz="1400" dirty="0">
+                  <a:solidFill>
+                    <a:schemeClr val="bg1"/>
+                  </a:solidFill>
+                  <a:latin typeface="Century Gothic" panose="020B0502020202020204" pitchFamily="34" charset="0"/>
+                </a:rPr>
+                <a:t>Please Turn Off/Silence Your Devices </a:t>
+              </a:r>
+              <a:r>
+                <a:rPr lang="ja-JP" altLang="en-US" sz="1400" dirty="0">
+                  <a:solidFill>
+                    <a:schemeClr val="bg1"/>
+                  </a:solidFill>
+                  <a:latin typeface="Century Gothic" panose="020B0502020202020204" pitchFamily="34" charset="0"/>
+                </a:rPr>
+                <a:t>請靜音或關閉所有電子設備</a:t>
+              </a:r>
+            </a:p>
+          </p:txBody>
+        </p:sp>
+        <p:pic>
+          <p:nvPicPr>
+            <p:cNvPr id="15" name="Picture 14" descr="Shape&#10;&#10;Description automatically generated with low confidence">
+              <a:extLst>
+                <a:ext uri="{FF2B5EF4-FFF2-40B4-BE49-F238E27FC236}">
+                  <a16:creationId xmlns:a16="http://schemas.microsoft.com/office/drawing/2014/main" id="{F733AC85-28CF-A206-2FC0-9F3EAF9D3F3B}"/>
+                </a:ext>
+              </a:extLst>
+            </p:cNvPr>
+            <p:cNvPicPr>
+              <a:picLocks noChangeAspect="1"/>
+            </p:cNvPicPr>
+            <p:nvPr/>
+          </p:nvPicPr>
+          <p:blipFill>
+            <a:blip r:embed="rId2" cstate="print">
+              <a:extLst>
+                <a:ext uri="{BEBA8EAE-BF5A-486C-A8C5-ECC9F3942E4B}">
+                  <a14:imgProps xmlns:a14="http://schemas.microsoft.com/office/drawing/2010/main">
+                    <a14:imgLayer r:embed="rId3">
+                      <a14:imgEffect>
+                        <a14:colorTemperature colorTemp="11500"/>
+                      </a14:imgEffect>
+                      <a14:imgEffect>
+                        <a14:saturation sat="400000"/>
+                      </a14:imgEffect>
+                      <a14:imgEffect>
+                        <a14:brightnessContrast bright="100000" contrast="100000"/>
+                      </a14:imgEffect>
+                    </a14:imgLayer>
+                  </a14:imgProps>
+                </a:ext>
+                <a:ext uri="{28A0092B-C50C-407E-A947-70E740481C1C}">
+                  <a14:useLocalDpi xmlns:a14="http://schemas.microsoft.com/office/drawing/2010/main" val="0"/>
+                </a:ext>
+              </a:extLst>
+            </a:blip>
+            <a:stretch>
+              <a:fillRect/>
+            </a:stretch>
+          </p:blipFill>
+          <p:spPr>
+            <a:xfrm>
+              <a:off x="10218327" y="6309320"/>
+              <a:ext cx="280267" cy="280267"/>
+            </a:xfrm>
+            <a:prstGeom prst="rect">
+              <a:avLst/>
+            </a:prstGeom>
+          </p:spPr>
+        </p:pic>
+      </p:grpSp>
     </p:spTree>
   </p:cSld>
   <p:clrMapOvr>
@@ -4902,9 +5583,17 @@
 </p:sld>
 </file>
 
-<file path=ppt/slides/slide2.xml><?xml version="1.0" encoding="utf-8"?>
+<file path=ppt/slides/slide4.xml><?xml version="1.0" encoding="utf-8"?>
 <p:sld xmlns:a="http://schemas.openxmlformats.org/drawingml/2006/main" xmlns:r="http://schemas.openxmlformats.org/officeDocument/2006/relationships" xmlns:p="http://schemas.openxmlformats.org/presentationml/2006/main">
   <p:cSld>
+    <p:bg>
+      <p:bgPr>
+        <a:solidFill>
+          <a:schemeClr val="tx1"/>
+        </a:solidFill>
+        <a:effectLst/>
+      </p:bgPr>
+    </p:bg>
     <p:spTree>
       <p:nvGrpSpPr>
         <p:cNvPr id="1" name=""/>
@@ -4921,10 +5610,10 @@
       </p:grpSpPr>
       <p:sp>
         <p:nvSpPr>
-          <p:cNvPr id="6" name="Text Box 12">
+          <p:cNvPr id="12" name="Text Box 12">
             <a:extLst>
               <a:ext uri="{FF2B5EF4-FFF2-40B4-BE49-F238E27FC236}">
-                <a16:creationId xmlns:a16="http://schemas.microsoft.com/office/drawing/2014/main" id="{BEA17A2D-ADBC-44E7-8241-0C2921ADB5E3}"/>
+                <a16:creationId xmlns:a16="http://schemas.microsoft.com/office/drawing/2014/main" id="{591C97DC-F419-4C94-A84E-E8038EFB7F71}"/>
               </a:ext>
             </a:extLst>
           </p:cNvPr>
@@ -4935,8 +5624,8 @@
         </p:nvSpPr>
         <p:spPr bwMode="auto">
           <a:xfrm>
-            <a:off x="4" y="597316"/>
-            <a:ext cx="9143999" cy="6432087"/>
+            <a:off x="-1524000" y="908721"/>
+            <a:ext cx="12192000" cy="5360531"/>
           </a:xfrm>
           <a:prstGeom prst="rect">
             <a:avLst/>
@@ -4982,7 +5671,7 @@
           <a:lstStyle/>
           <a:p>
             <a:pPr algn="ctr"/>
-            <a:endParaRPr lang="en-GB" altLang="zh-TW" sz="2200" b="1" dirty="0">
+            <a:endParaRPr lang="en-GB" altLang="zh-TW" sz="2400" b="1" dirty="0">
               <a:solidFill>
                 <a:schemeClr val="bg1"/>
               </a:solidFill>
@@ -4994,10 +5683,10 @@
       </p:sp>
       <p:sp>
         <p:nvSpPr>
-          <p:cNvPr id="7" name="Text Box 12">
+          <p:cNvPr id="13" name="Text Box 12">
             <a:extLst>
               <a:ext uri="{FF2B5EF4-FFF2-40B4-BE49-F238E27FC236}">
-                <a16:creationId xmlns:a16="http://schemas.microsoft.com/office/drawing/2014/main" id="{4A814393-22EC-4030-B099-593A4A5B942E}"/>
+                <a16:creationId xmlns:a16="http://schemas.microsoft.com/office/drawing/2014/main" id="{977E556A-8801-4241-B610-C5D48A41FAF4}"/>
               </a:ext>
             </a:extLst>
           </p:cNvPr>
@@ -5008,8 +5697,8 @@
         </p:nvSpPr>
         <p:spPr bwMode="auto">
           <a:xfrm>
-            <a:off x="347471" y="116632"/>
-            <a:ext cx="8449060" cy="648072"/>
+            <a:off x="1091495" y="260648"/>
+            <a:ext cx="6961015" cy="432048"/>
           </a:xfrm>
           <a:prstGeom prst="rect">
             <a:avLst/>
@@ -5062,7 +5751,7 @@
                 </a:solidFill>
                 <a:latin typeface="Century Gothic" panose="020B0502020202020204" pitchFamily="34" charset="0"/>
               </a:rPr>
-              <a:t>Prayer Requests</a:t>
+              <a:t>Announcements </a:t>
             </a:r>
             <a:r>
               <a:rPr lang="en-GB" altLang="en-US" sz="3200" b="1" u="sng" dirty="0">
@@ -5082,7 +5771,7 @@
                 <a:latin typeface="Century Gothic" panose="020B0502020202020204" pitchFamily="34" charset="0"/>
                 <a:ea typeface="金梅新中楷全字體" panose="02010509060101010101" pitchFamily="49" charset="-120"/>
               </a:rPr>
-              <a:t>代禱</a:t>
+              <a:t>佈告</a:t>
             </a:r>
             <a:endParaRPr lang="en-GB" altLang="zh-TW" sz="3200" b="1" u="sng" dirty="0">
               <a:solidFill>
@@ -5096,10 +5785,10 @@
       </p:sp>
       <p:sp>
         <p:nvSpPr>
-          <p:cNvPr id="8" name="Title 1">
+          <p:cNvPr id="14" name="Title 1">
             <a:extLst>
               <a:ext uri="{FF2B5EF4-FFF2-40B4-BE49-F238E27FC236}">
-                <a16:creationId xmlns:a16="http://schemas.microsoft.com/office/drawing/2014/main" id="{3DD2CCF3-660C-4B35-8262-BE8668E0E220}"/>
+                <a16:creationId xmlns:a16="http://schemas.microsoft.com/office/drawing/2014/main" id="{24CDB64D-DDA9-4535-BAD4-A67954A30EFA}"/>
               </a:ext>
             </a:extLst>
           </p:cNvPr>
@@ -5107,34 +5796,328 @@
             <a:spLocks noGrp="1"/>
           </p:cNvSpPr>
           <p:nvPr>
-            <p:ph type="ctrTitle"/>
+            <p:ph type="title"/>
           </p:nvPr>
         </p:nvSpPr>
         <p:spPr>
           <a:xfrm>
-            <a:off x="-7741368" y="2619557"/>
-            <a:ext cx="6858000" cy="2387600"/>
+            <a:off x="-8677472" y="1772816"/>
+            <a:ext cx="8229600" cy="1143000"/>
           </a:xfrm>
         </p:spPr>
         <p:txBody>
           <a:bodyPr/>
           <a:lstStyle/>
           <a:p>
+            <a:pPr algn="ctr"/>
             <a:r>
               <a:rPr lang="en-GB" dirty="0">
+                <a:solidFill>
+                  <a:schemeClr val="bg1"/>
+                </a:solidFill>
                 <a:latin typeface="Century Gothic" panose="020B0502020202020204" pitchFamily="34" charset="0"/>
               </a:rPr>
-              <a:t>Prayer Requests</a:t>
-            </a:r>
-          </a:p>
-        </p:txBody>
-      </p:sp>
-      <p:sp>
-        <p:nvSpPr>
-          <p:cNvPr id="17" name="Text Box 11">
+              <a:t>Announcements</a:t>
+            </a:r>
+          </a:p>
+        </p:txBody>
+      </p:sp>
+      <p:pic>
+        <p:nvPicPr>
+          <p:cNvPr id="9" name="Picture 8" descr="Logo&#10;&#10;Description automatically generated with medium confidence">
             <a:extLst>
               <a:ext uri="{FF2B5EF4-FFF2-40B4-BE49-F238E27FC236}">
-                <a16:creationId xmlns:a16="http://schemas.microsoft.com/office/drawing/2014/main" id="{0FB5C977-A0C6-4AD0-A3E2-50469958FC50}"/>
+                <a16:creationId xmlns:a16="http://schemas.microsoft.com/office/drawing/2014/main" id="{AB4992D7-29ED-F3F5-13B2-AF8E47876901}"/>
+              </a:ext>
+            </a:extLst>
+          </p:cNvPr>
+          <p:cNvPicPr>
+            <a:picLocks noChangeAspect="1"/>
+          </p:cNvPicPr>
+          <p:nvPr/>
+        </p:nvPicPr>
+        <p:blipFill>
+          <a:blip r:embed="rId2" cstate="print">
+            <a:extLst>
+              <a:ext uri="{28A0092B-C50C-407E-A947-70E740481C1C}">
+                <a14:useLocalDpi xmlns:a14="http://schemas.microsoft.com/office/drawing/2010/main" val="0"/>
+              </a:ext>
+            </a:extLst>
+          </a:blip>
+          <a:stretch>
+            <a:fillRect/>
+          </a:stretch>
+        </p:blipFill>
+        <p:spPr>
+          <a:xfrm>
+            <a:off x="117892" y="6396577"/>
+            <a:ext cx="2664297" cy="344791"/>
+          </a:xfrm>
+          <a:prstGeom prst="rect">
+            <a:avLst/>
+          </a:prstGeom>
+        </p:spPr>
+      </p:pic>
+      <p:grpSp>
+        <p:nvGrpSpPr>
+          <p:cNvPr id="11" name="Group 10">
+            <a:extLst>
+              <a:ext uri="{FF2B5EF4-FFF2-40B4-BE49-F238E27FC236}">
+                <a16:creationId xmlns:a16="http://schemas.microsoft.com/office/drawing/2014/main" id="{7F36010C-DCC2-A03F-162F-60E8212B4EF8}"/>
+              </a:ext>
+            </a:extLst>
+          </p:cNvPr>
+          <p:cNvGrpSpPr/>
+          <p:nvPr/>
+        </p:nvGrpSpPr>
+        <p:grpSpPr>
+          <a:xfrm>
+            <a:off x="3275856" y="6427357"/>
+            <a:ext cx="5734763" cy="307777"/>
+            <a:chOff x="4799854" y="6300028"/>
+            <a:chExt cx="5734763" cy="307776"/>
+          </a:xfrm>
+        </p:grpSpPr>
+        <p:sp>
+          <p:nvSpPr>
+            <p:cNvPr id="15" name="TextBox 14">
+              <a:extLst>
+                <a:ext uri="{FF2B5EF4-FFF2-40B4-BE49-F238E27FC236}">
+                  <a16:creationId xmlns:a16="http://schemas.microsoft.com/office/drawing/2014/main" id="{AE57B7FE-DEE4-10A2-9B1E-C5814C2B73D7}"/>
+                </a:ext>
+              </a:extLst>
+            </p:cNvPr>
+            <p:cNvSpPr txBox="1"/>
+            <p:nvPr/>
+          </p:nvSpPr>
+          <p:spPr>
+            <a:xfrm>
+              <a:off x="4799854" y="6300028"/>
+              <a:ext cx="5734763" cy="307776"/>
+            </a:xfrm>
+            <a:prstGeom prst="rect">
+              <a:avLst/>
+            </a:prstGeom>
+            <a:noFill/>
+            <a:ln w="19050">
+              <a:solidFill>
+                <a:srgbClr val="FF0000"/>
+              </a:solidFill>
+            </a:ln>
+          </p:spPr>
+          <p:txBody>
+            <a:bodyPr wrap="square" rtlCol="0" anchor="ctr">
+              <a:spAutoFit/>
+            </a:bodyPr>
+            <a:lstStyle/>
+            <a:p>
+              <a:r>
+                <a:rPr lang="en-GB" sz="1400" dirty="0">
+                  <a:solidFill>
+                    <a:schemeClr val="bg1"/>
+                  </a:solidFill>
+                  <a:latin typeface="Century Gothic" panose="020B0502020202020204" pitchFamily="34" charset="0"/>
+                </a:rPr>
+                <a:t>Please Turn Off/Silence Your Devices </a:t>
+              </a:r>
+              <a:r>
+                <a:rPr lang="ja-JP" altLang="en-US" sz="1400" dirty="0">
+                  <a:solidFill>
+                    <a:schemeClr val="bg1"/>
+                  </a:solidFill>
+                  <a:latin typeface="Century Gothic" panose="020B0502020202020204" pitchFamily="34" charset="0"/>
+                </a:rPr>
+                <a:t>請靜音或關閉所有電子設備</a:t>
+              </a:r>
+            </a:p>
+          </p:txBody>
+        </p:sp>
+        <p:pic>
+          <p:nvPicPr>
+            <p:cNvPr id="16" name="Picture 15" descr="Shape&#10;&#10;Description automatically generated with low confidence">
+              <a:extLst>
+                <a:ext uri="{FF2B5EF4-FFF2-40B4-BE49-F238E27FC236}">
+                  <a16:creationId xmlns:a16="http://schemas.microsoft.com/office/drawing/2014/main" id="{F74349E7-0488-D3B5-B070-045F66AF665F}"/>
+                </a:ext>
+              </a:extLst>
+            </p:cNvPr>
+            <p:cNvPicPr>
+              <a:picLocks noChangeAspect="1"/>
+            </p:cNvPicPr>
+            <p:nvPr/>
+          </p:nvPicPr>
+          <p:blipFill>
+            <a:blip r:embed="rId3" cstate="print">
+              <a:extLst>
+                <a:ext uri="{BEBA8EAE-BF5A-486C-A8C5-ECC9F3942E4B}">
+                  <a14:imgProps xmlns:a14="http://schemas.microsoft.com/office/drawing/2010/main">
+                    <a14:imgLayer r:embed="rId4">
+                      <a14:imgEffect>
+                        <a14:colorTemperature colorTemp="11500"/>
+                      </a14:imgEffect>
+                      <a14:imgEffect>
+                        <a14:saturation sat="400000"/>
+                      </a14:imgEffect>
+                      <a14:imgEffect>
+                        <a14:brightnessContrast bright="100000" contrast="100000"/>
+                      </a14:imgEffect>
+                    </a14:imgLayer>
+                  </a14:imgProps>
+                </a:ext>
+                <a:ext uri="{28A0092B-C50C-407E-A947-70E740481C1C}">
+                  <a14:useLocalDpi xmlns:a14="http://schemas.microsoft.com/office/drawing/2010/main" val="0"/>
+                </a:ext>
+              </a:extLst>
+            </a:blip>
+            <a:stretch>
+              <a:fillRect/>
+            </a:stretch>
+          </p:blipFill>
+          <p:spPr>
+            <a:xfrm>
+              <a:off x="10218327" y="6309320"/>
+              <a:ext cx="280267" cy="280267"/>
+            </a:xfrm>
+            <a:prstGeom prst="rect">
+              <a:avLst/>
+            </a:prstGeom>
+          </p:spPr>
+        </p:pic>
+      </p:grpSp>
+    </p:spTree>
+    <p:extLst>
+      <p:ext uri="{BB962C8B-B14F-4D97-AF65-F5344CB8AC3E}">
+        <p14:creationId xmlns:p14="http://schemas.microsoft.com/office/powerpoint/2010/main" val="3880852022"/>
+      </p:ext>
+    </p:extLst>
+  </p:cSld>
+  <p:clrMapOvr>
+    <a:masterClrMapping/>
+  </p:clrMapOvr>
+</p:sld>
+</file>
+
+<file path=ppt/slides/slide5.xml><?xml version="1.0" encoding="utf-8"?>
+<p:sld xmlns:a="http://schemas.openxmlformats.org/drawingml/2006/main" xmlns:r="http://schemas.openxmlformats.org/officeDocument/2006/relationships" xmlns:p="http://schemas.openxmlformats.org/presentationml/2006/main">
+  <p:cSld>
+    <p:bg>
+      <p:bgPr>
+        <a:solidFill>
+          <a:schemeClr val="tx1"/>
+        </a:solidFill>
+        <a:effectLst/>
+      </p:bgPr>
+    </p:bg>
+    <p:spTree>
+      <p:nvGrpSpPr>
+        <p:cNvPr id="1" name=""/>
+        <p:cNvGrpSpPr/>
+        <p:nvPr/>
+      </p:nvGrpSpPr>
+      <p:grpSpPr>
+        <a:xfrm>
+          <a:off x="0" y="0"/>
+          <a:ext cx="0" cy="0"/>
+          <a:chOff x="0" y="0"/>
+          <a:chExt cx="0" cy="0"/>
+        </a:xfrm>
+      </p:grpSpPr>
+      <p:sp>
+        <p:nvSpPr>
+          <p:cNvPr id="2" name="TextBox 1">
+            <a:extLst>
+              <a:ext uri="{FF2B5EF4-FFF2-40B4-BE49-F238E27FC236}">
+                <a16:creationId xmlns:a16="http://schemas.microsoft.com/office/drawing/2014/main" id="{FC4F1879-493F-4201-BC24-C2CC96213270}"/>
+              </a:ext>
+            </a:extLst>
+          </p:cNvPr>
+          <p:cNvSpPr txBox="1"/>
+          <p:nvPr/>
+        </p:nvSpPr>
+        <p:spPr>
+          <a:xfrm>
+            <a:off x="0" y="2204864"/>
+            <a:ext cx="4644008" cy="495457"/>
+          </a:xfrm>
+          <a:prstGeom prst="rect">
+            <a:avLst/>
+          </a:prstGeom>
+          <a:noFill/>
+        </p:spPr>
+        <p:txBody>
+          <a:bodyPr wrap="square" rtlCol="0">
+            <a:spAutoFit/>
+          </a:bodyPr>
+          <a:lstStyle/>
+          <a:p>
+            <a:pPr algn="ctr">
+              <a:lnSpc>
+                <a:spcPct val="150000"/>
+              </a:lnSpc>
+            </a:pPr>
+            <a:r>
+              <a:rPr lang="en-GB" sz="2000" dirty="0">
+                <a:solidFill>
+                  <a:schemeClr val="bg1"/>
+                </a:solidFill>
+                <a:latin typeface="Century Gothic" panose="020B0502020202020204" pitchFamily="34" charset="0"/>
+              </a:rPr>
+              <a:t>-</a:t>
+            </a:r>
+          </a:p>
+        </p:txBody>
+      </p:sp>
+      <p:sp>
+        <p:nvSpPr>
+          <p:cNvPr id="11" name="TextBox 10">
+            <a:extLst>
+              <a:ext uri="{FF2B5EF4-FFF2-40B4-BE49-F238E27FC236}">
+                <a16:creationId xmlns:a16="http://schemas.microsoft.com/office/drawing/2014/main" id="{60901149-CE29-414A-E785-70ADD41E8777}"/>
+              </a:ext>
+            </a:extLst>
+          </p:cNvPr>
+          <p:cNvSpPr txBox="1"/>
+          <p:nvPr/>
+        </p:nvSpPr>
+        <p:spPr>
+          <a:xfrm>
+            <a:off x="4572000" y="2204864"/>
+            <a:ext cx="4572000" cy="495457"/>
+          </a:xfrm>
+          <a:prstGeom prst="rect">
+            <a:avLst/>
+          </a:prstGeom>
+          <a:noFill/>
+        </p:spPr>
+        <p:txBody>
+          <a:bodyPr wrap="square" rtlCol="0">
+            <a:spAutoFit/>
+          </a:bodyPr>
+          <a:lstStyle/>
+          <a:p>
+            <a:pPr algn="ctr">
+              <a:lnSpc>
+                <a:spcPct val="150000"/>
+              </a:lnSpc>
+            </a:pPr>
+            <a:r>
+              <a:rPr lang="en-GB" sz="2000" dirty="0">
+                <a:solidFill>
+                  <a:schemeClr val="bg1"/>
+                </a:solidFill>
+                <a:latin typeface="Century Gothic" panose="020B0502020202020204" pitchFamily="34" charset="0"/>
+              </a:rPr>
+              <a:t>-</a:t>
+            </a:r>
+          </a:p>
+        </p:txBody>
+      </p:sp>
+      <p:sp>
+        <p:nvSpPr>
+          <p:cNvPr id="13" name="Text Box 12">
+            <a:extLst>
+              <a:ext uri="{FF2B5EF4-FFF2-40B4-BE49-F238E27FC236}">
+                <a16:creationId xmlns:a16="http://schemas.microsoft.com/office/drawing/2014/main" id="{977E556A-8801-4241-B610-C5D48A41FAF4}"/>
               </a:ext>
             </a:extLst>
           </p:cNvPr>
@@ -5145,8 +6128,8 @@
         </p:nvSpPr>
         <p:spPr bwMode="auto">
           <a:xfrm>
-            <a:off x="611560" y="6107922"/>
-            <a:ext cx="2736156" cy="338554"/>
+            <a:off x="1091495" y="333016"/>
+            <a:ext cx="6961015" cy="671447"/>
           </a:xfrm>
           <a:prstGeom prst="rect">
             <a:avLst/>
@@ -5187,128 +6170,183 @@
         </p:spPr>
         <p:txBody>
           <a:bodyPr wrap="square">
-            <a:spAutoFit/>
+            <a:noAutofit/>
           </a:bodyPr>
           <a:lstStyle/>
           <a:p>
-            <a:pPr>
-              <a:spcBef>
-                <a:spcPct val="50000"/>
-              </a:spcBef>
-            </a:pPr>
-            <a:r>
-              <a:rPr lang="en-US" altLang="en-US" sz="1600" dirty="0">
+            <a:pPr algn="ctr"/>
+            <a:r>
+              <a:rPr lang="en-GB" altLang="en-US" sz="3200" b="1" u="sng" dirty="0">
                 <a:solidFill>
                   <a:schemeClr val="bg1"/>
                 </a:solidFill>
                 <a:latin typeface="Century Gothic" panose="020B0502020202020204" pitchFamily="34" charset="0"/>
-                <a:ea typeface="金梅新中楷全字體" panose="02010509060101010101" pitchFamily="49" charset="-120"/>
               </a:rPr>
-              <a:t>請 關 您 的 手 提 電 話 </a:t>
-            </a:r>
-          </a:p>
-        </p:txBody>
-      </p:sp>
-      <p:sp>
-        <p:nvSpPr>
-          <p:cNvPr id="18" name="Text Box 12">
+              <a:t>Holy Communion </a:t>
+            </a:r>
+            <a:r>
+              <a:rPr lang="ja-JP" altLang="en-US" sz="3200" b="1" u="sng" dirty="0">
+                <a:solidFill>
+                  <a:schemeClr val="bg1"/>
+                </a:solidFill>
+                <a:latin typeface="Roboto" panose="02000000000000000000" pitchFamily="2" charset="0"/>
+              </a:rPr>
+              <a:t>聖餐典禮</a:t>
+            </a:r>
+            <a:endParaRPr lang="en-GB" altLang="zh-TW" sz="3200" b="1" u="sng" dirty="0">
+              <a:solidFill>
+                <a:schemeClr val="bg1"/>
+              </a:solidFill>
+              <a:latin typeface="Century Gothic" panose="020B0502020202020204" pitchFamily="34" charset="0"/>
+              <a:ea typeface="金梅新中楷全字體" panose="02010509060101010101" pitchFamily="49" charset="-120"/>
+            </a:endParaRPr>
+          </a:p>
+        </p:txBody>
+      </p:sp>
+      <p:sp>
+        <p:nvSpPr>
+          <p:cNvPr id="14" name="Title 1">
             <a:extLst>
               <a:ext uri="{FF2B5EF4-FFF2-40B4-BE49-F238E27FC236}">
-                <a16:creationId xmlns:a16="http://schemas.microsoft.com/office/drawing/2014/main" id="{9B9F7A55-A3DF-4026-A8E6-E29DDCFEB20D}"/>
+                <a16:creationId xmlns:a16="http://schemas.microsoft.com/office/drawing/2014/main" id="{24CDB64D-DDA9-4535-BAD4-A67954A30EFA}"/>
               </a:ext>
             </a:extLst>
           </p:cNvPr>
-          <p:cNvSpPr txBox="1">
-            <a:spLocks noChangeArrowheads="1"/>
-          </p:cNvSpPr>
+          <p:cNvSpPr>
+            <a:spLocks noGrp="1"/>
+          </p:cNvSpPr>
+          <p:nvPr>
+            <p:ph type="title"/>
+          </p:nvPr>
+        </p:nvSpPr>
+        <p:spPr>
+          <a:xfrm>
+            <a:off x="-8677472" y="1772816"/>
+            <a:ext cx="8229600" cy="1143000"/>
+          </a:xfrm>
+        </p:spPr>
+        <p:txBody>
+          <a:bodyPr/>
+          <a:lstStyle/>
+          <a:p>
+            <a:pPr algn="ctr"/>
+            <a:r>
+              <a:rPr lang="en-GB" dirty="0">
+                <a:solidFill>
+                  <a:schemeClr val="bg1"/>
+                </a:solidFill>
+                <a:latin typeface="Century Gothic" panose="020B0502020202020204" pitchFamily="34" charset="0"/>
+              </a:rPr>
+              <a:t>Holy Communion</a:t>
+            </a:r>
+          </a:p>
+        </p:txBody>
+      </p:sp>
+      <p:sp>
+        <p:nvSpPr>
+          <p:cNvPr id="7" name="TextBox 6">
+            <a:extLst>
+              <a:ext uri="{FF2B5EF4-FFF2-40B4-BE49-F238E27FC236}">
+                <a16:creationId xmlns:a16="http://schemas.microsoft.com/office/drawing/2014/main" id="{A120D86B-9412-FFFA-2E86-3E358DE4B992}"/>
+              </a:ext>
+            </a:extLst>
+          </p:cNvPr>
+          <p:cNvSpPr txBox="1"/>
           <p:nvPr/>
         </p:nvSpPr>
-        <p:spPr bwMode="auto">
+        <p:spPr>
           <a:xfrm>
-            <a:off x="611560" y="6369861"/>
-            <a:ext cx="3672335" cy="276999"/>
+            <a:off x="0" y="1468079"/>
+            <a:ext cx="4572000" cy="735779"/>
           </a:xfrm>
           <a:prstGeom prst="rect">
             <a:avLst/>
           </a:prstGeom>
           <a:noFill/>
-          <a:ln>
-            <a:noFill/>
-          </a:ln>
-          <a:effectLst/>
-          <a:extLst>
-            <a:ext uri="{909E8E84-426E-40DD-AFC4-6F175D3DCCD1}">
-              <a14:hiddenFill xmlns:a14="http://schemas.microsoft.com/office/drawing/2010/main">
-                <a:solidFill>
-                  <a:schemeClr val="accent1"/>
-                </a:solidFill>
-              </a14:hiddenFill>
-            </a:ext>
-            <a:ext uri="{91240B29-F687-4F45-9708-019B960494DF}">
-              <a14:hiddenLine xmlns:a14="http://schemas.microsoft.com/office/drawing/2010/main" w="9525">
-                <a:solidFill>
-                  <a:schemeClr val="tx1"/>
-                </a:solidFill>
-                <a:miter lim="800000"/>
-                <a:headEnd/>
-                <a:tailEnd/>
-              </a14:hiddenLine>
-            </a:ext>
-            <a:ext uri="{AF507438-7753-43E0-B8FC-AC1667EBCBE1}">
-              <a14:hiddenEffects xmlns:a14="http://schemas.microsoft.com/office/drawing/2010/main">
-                <a:effectLst>
-                  <a:outerShdw dist="35921" dir="2700000" algn="ctr" rotWithShape="0">
-                    <a:schemeClr val="bg2"/>
-                  </a:outerShdw>
-                </a:effectLst>
-              </a14:hiddenEffects>
-            </a:ext>
-          </a:extLst>
         </p:spPr>
         <p:txBody>
-          <a:bodyPr wrap="square">
+          <a:bodyPr wrap="square" rtlCol="0">
             <a:spAutoFit/>
           </a:bodyPr>
           <a:lstStyle/>
           <a:p>
-            <a:pPr>
-              <a:spcBef>
-                <a:spcPct val="50000"/>
-              </a:spcBef>
+            <a:pPr algn="ctr">
+              <a:lnSpc>
+                <a:spcPct val="150000"/>
+              </a:lnSpc>
             </a:pPr>
             <a:r>
-              <a:rPr lang="en-GB" altLang="en-US" sz="1200" b="1" dirty="0">
+              <a:rPr lang="en-GB" sz="3200" b="1" dirty="0">
                 <a:solidFill>
                   <a:schemeClr val="bg1"/>
                 </a:solidFill>
                 <a:latin typeface="Century Gothic" panose="020B0502020202020204" pitchFamily="34" charset="0"/>
               </a:rPr>
-              <a:t>PLEASE SWITCH OFF YOUR MOBILE PHONE</a:t>
-            </a:r>
-            <a:endParaRPr lang="en-US" altLang="en-US" sz="1200" b="1" dirty="0">
-              <a:solidFill>
-                <a:schemeClr val="bg1"/>
-              </a:solidFill>
-              <a:latin typeface="Century Gothic" panose="020B0502020202020204" pitchFamily="34" charset="0"/>
-            </a:endParaRPr>
+              <a:t>Bread:</a:t>
+            </a:r>
+          </a:p>
+        </p:txBody>
+      </p:sp>
+      <p:sp>
+        <p:nvSpPr>
+          <p:cNvPr id="8" name="TextBox 7">
+            <a:extLst>
+              <a:ext uri="{FF2B5EF4-FFF2-40B4-BE49-F238E27FC236}">
+                <a16:creationId xmlns:a16="http://schemas.microsoft.com/office/drawing/2014/main" id="{FAE06038-3F4F-5E0F-699C-9FFE1D160046}"/>
+              </a:ext>
+            </a:extLst>
+          </p:cNvPr>
+          <p:cNvSpPr txBox="1"/>
+          <p:nvPr/>
+        </p:nvSpPr>
+        <p:spPr>
+          <a:xfrm>
+            <a:off x="4572000" y="1542134"/>
+            <a:ext cx="4572000" cy="735779"/>
+          </a:xfrm>
+          <a:prstGeom prst="rect">
+            <a:avLst/>
+          </a:prstGeom>
+          <a:noFill/>
+        </p:spPr>
+        <p:txBody>
+          <a:bodyPr wrap="square" rtlCol="0">
+            <a:spAutoFit/>
+          </a:bodyPr>
+          <a:lstStyle/>
+          <a:p>
+            <a:pPr algn="ctr">
+              <a:lnSpc>
+                <a:spcPct val="150000"/>
+              </a:lnSpc>
+            </a:pPr>
+            <a:r>
+              <a:rPr lang="en-GB" sz="3200" b="1" dirty="0">
+                <a:solidFill>
+                  <a:schemeClr val="bg1"/>
+                </a:solidFill>
+                <a:latin typeface="Century Gothic" panose="020B0502020202020204" pitchFamily="34" charset="0"/>
+              </a:rPr>
+              <a:t>Cup:</a:t>
+            </a:r>
           </a:p>
         </p:txBody>
       </p:sp>
       <p:pic>
         <p:nvPicPr>
-          <p:cNvPr id="19" name="Picture 2" descr="Custom No Mobile Phones Sign | The Sign Shed">
+          <p:cNvPr id="15" name="Picture 14" descr="Logo&#10;&#10;Description automatically generated with medium confidence">
             <a:extLst>
               <a:ext uri="{FF2B5EF4-FFF2-40B4-BE49-F238E27FC236}">
-                <a16:creationId xmlns:a16="http://schemas.microsoft.com/office/drawing/2014/main" id="{A11A0B15-B5D6-4DCE-A2EC-9FD7B52515EF}"/>
+                <a16:creationId xmlns:a16="http://schemas.microsoft.com/office/drawing/2014/main" id="{068CEBF2-6DC4-922C-C4D4-9BEEE6E38253}"/>
               </a:ext>
             </a:extLst>
           </p:cNvPr>
           <p:cNvPicPr>
-            <a:picLocks noChangeAspect="1" noChangeArrowheads="1"/>
+            <a:picLocks noChangeAspect="1"/>
           </p:cNvPicPr>
           <p:nvPr/>
         </p:nvPicPr>
-        <p:blipFill rotWithShape="1">
+        <p:blipFill>
           <a:blip r:embed="rId2" cstate="print">
             <a:extLst>
               <a:ext uri="{28A0092B-C50C-407E-A947-70E740481C1C}">
@@ -5316,30 +6354,152 @@
               </a:ext>
             </a:extLst>
           </a:blip>
-          <a:srcRect l="3327" t="11250" r="71169" b="12911"/>
-          <a:stretch/>
+          <a:stretch>
+            <a:fillRect/>
+          </a:stretch>
         </p:blipFill>
-        <p:spPr bwMode="auto">
+        <p:spPr>
           <a:xfrm>
-            <a:off x="179437" y="6144630"/>
-            <a:ext cx="432048" cy="432048"/>
+            <a:off x="117892" y="6396577"/>
+            <a:ext cx="2664297" cy="344791"/>
           </a:xfrm>
           <a:prstGeom prst="rect">
             <a:avLst/>
           </a:prstGeom>
-          <a:noFill/>
-          <a:extLst>
-            <a:ext uri="{909E8E84-426E-40DD-AFC4-6F175D3DCCD1}">
-              <a14:hiddenFill xmlns:a14="http://schemas.microsoft.com/office/drawing/2010/main">
-                <a:solidFill>
-                  <a:srgbClr val="FFFFFF"/>
-                </a:solidFill>
-              </a14:hiddenFill>
-            </a:ext>
-          </a:extLst>
         </p:spPr>
       </p:pic>
+      <p:grpSp>
+        <p:nvGrpSpPr>
+          <p:cNvPr id="18" name="Group 17">
+            <a:extLst>
+              <a:ext uri="{FF2B5EF4-FFF2-40B4-BE49-F238E27FC236}">
+                <a16:creationId xmlns:a16="http://schemas.microsoft.com/office/drawing/2014/main" id="{FB7969D4-40D6-5EE7-645B-F7B010160FE7}"/>
+              </a:ext>
+            </a:extLst>
+          </p:cNvPr>
+          <p:cNvGrpSpPr/>
+          <p:nvPr/>
+        </p:nvGrpSpPr>
+        <p:grpSpPr>
+          <a:xfrm>
+            <a:off x="3275856" y="6427357"/>
+            <a:ext cx="5734763" cy="307777"/>
+            <a:chOff x="4799854" y="6300028"/>
+            <a:chExt cx="5734763" cy="307776"/>
+          </a:xfrm>
+        </p:grpSpPr>
+        <p:sp>
+          <p:nvSpPr>
+            <p:cNvPr id="19" name="TextBox 18">
+              <a:extLst>
+                <a:ext uri="{FF2B5EF4-FFF2-40B4-BE49-F238E27FC236}">
+                  <a16:creationId xmlns:a16="http://schemas.microsoft.com/office/drawing/2014/main" id="{5462D8D6-3990-2455-0FEF-8663B2E98123}"/>
+                </a:ext>
+              </a:extLst>
+            </p:cNvPr>
+            <p:cNvSpPr txBox="1"/>
+            <p:nvPr/>
+          </p:nvSpPr>
+          <p:spPr>
+            <a:xfrm>
+              <a:off x="4799854" y="6300028"/>
+              <a:ext cx="5734763" cy="307776"/>
+            </a:xfrm>
+            <a:prstGeom prst="rect">
+              <a:avLst/>
+            </a:prstGeom>
+            <a:noFill/>
+            <a:ln w="19050">
+              <a:solidFill>
+                <a:srgbClr val="FF0000"/>
+              </a:solidFill>
+            </a:ln>
+          </p:spPr>
+          <p:txBody>
+            <a:bodyPr wrap="square" rtlCol="0" anchor="ctr">
+              <a:spAutoFit/>
+            </a:bodyPr>
+            <a:lstStyle/>
+            <a:p>
+              <a:r>
+                <a:rPr lang="en-GB" sz="1400" dirty="0">
+                  <a:solidFill>
+                    <a:schemeClr val="bg1"/>
+                  </a:solidFill>
+                  <a:latin typeface="Century Gothic" panose="020B0502020202020204" pitchFamily="34" charset="0"/>
+                </a:rPr>
+                <a:t>Please Turn Off/Silence Your Devices </a:t>
+              </a:r>
+              <a:r>
+                <a:rPr lang="ja-JP" altLang="en-US" sz="1400" dirty="0">
+                  <a:solidFill>
+                    <a:schemeClr val="bg1"/>
+                  </a:solidFill>
+                  <a:latin typeface="Century Gothic" panose="020B0502020202020204" pitchFamily="34" charset="0"/>
+                </a:rPr>
+                <a:t>請靜音或關閉所有電子設備</a:t>
+              </a:r>
+            </a:p>
+          </p:txBody>
+        </p:sp>
+        <p:pic>
+          <p:nvPicPr>
+            <p:cNvPr id="20" name="Picture 19" descr="Shape&#10;&#10;Description automatically generated with low confidence">
+              <a:extLst>
+                <a:ext uri="{FF2B5EF4-FFF2-40B4-BE49-F238E27FC236}">
+                  <a16:creationId xmlns:a16="http://schemas.microsoft.com/office/drawing/2014/main" id="{ADEDB93E-2E01-B764-CC6D-54F0524083F0}"/>
+                </a:ext>
+              </a:extLst>
+            </p:cNvPr>
+            <p:cNvPicPr>
+              <a:picLocks noChangeAspect="1"/>
+            </p:cNvPicPr>
+            <p:nvPr/>
+          </p:nvPicPr>
+          <p:blipFill>
+            <a:blip r:embed="rId3" cstate="print">
+              <a:extLst>
+                <a:ext uri="{BEBA8EAE-BF5A-486C-A8C5-ECC9F3942E4B}">
+                  <a14:imgProps xmlns:a14="http://schemas.microsoft.com/office/drawing/2010/main">
+                    <a14:imgLayer r:embed="rId4">
+                      <a14:imgEffect>
+                        <a14:colorTemperature colorTemp="11500"/>
+                      </a14:imgEffect>
+                      <a14:imgEffect>
+                        <a14:saturation sat="400000"/>
+                      </a14:imgEffect>
+                      <a14:imgEffect>
+                        <a14:brightnessContrast bright="100000" contrast="100000"/>
+                      </a14:imgEffect>
+                    </a14:imgLayer>
+                  </a14:imgProps>
+                </a:ext>
+                <a:ext uri="{28A0092B-C50C-407E-A947-70E740481C1C}">
+                  <a14:useLocalDpi xmlns:a14="http://schemas.microsoft.com/office/drawing/2010/main" val="0"/>
+                </a:ext>
+              </a:extLst>
+            </a:blip>
+            <a:stretch>
+              <a:fillRect/>
+            </a:stretch>
+          </p:blipFill>
+          <p:spPr>
+            <a:xfrm>
+              <a:off x="10218327" y="6309320"/>
+              <a:ext cx="280267" cy="280267"/>
+            </a:xfrm>
+            <a:prstGeom prst="rect">
+              <a:avLst/>
+            </a:prstGeom>
+          </p:spPr>
+        </p:pic>
+      </p:grpSp>
     </p:spTree>
+    <p:extLst>
+      <p:ext uri="{BB962C8B-B14F-4D97-AF65-F5344CB8AC3E}">
+        <p14:creationId xmlns:p14="http://schemas.microsoft.com/office/powerpoint/2010/main" val="1339517695"/>
+      </p:ext>
+    </p:extLst>
   </p:cSld>
   <p:clrMapOvr>
     <a:masterClrMapping/>
@@ -5347,9 +6507,17 @@
 </p:sld>
 </file>
 
-<file path=ppt/slides/slide3.xml><?xml version="1.0" encoding="utf-8"?>
+<file path=ppt/slides/slide6.xml><?xml version="1.0" encoding="utf-8"?>
 <p:sld xmlns:a="http://schemas.openxmlformats.org/drawingml/2006/main" xmlns:r="http://schemas.openxmlformats.org/officeDocument/2006/relationships" xmlns:p="http://schemas.openxmlformats.org/presentationml/2006/main">
   <p:cSld>
+    <p:bg>
+      <p:bgPr>
+        <a:solidFill>
+          <a:schemeClr val="tx1"/>
+        </a:solidFill>
+        <a:effectLst/>
+      </p:bgPr>
+    </p:bg>
     <p:spTree>
       <p:nvGrpSpPr>
         <p:cNvPr id="1" name=""/>
@@ -5366,394 +6534,533 @@
       </p:grpSpPr>
       <p:sp>
         <p:nvSpPr>
-          <p:cNvPr id="12" name="Text Box 12">
-            <a:extLst>
-              <a:ext uri="{FF2B5EF4-FFF2-40B4-BE49-F238E27FC236}">
-                <a16:creationId xmlns:a16="http://schemas.microsoft.com/office/drawing/2014/main" id="{591C97DC-F419-4C94-A84E-E8038EFB7F71}"/>
-              </a:ext>
-            </a:extLst>
-          </p:cNvPr>
-          <p:cNvSpPr txBox="1">
-            <a:spLocks noChangeArrowheads="1"/>
-          </p:cNvSpPr>
+          <p:cNvPr id="7170" name="Title 1"/>
+          <p:cNvSpPr>
+            <a:spLocks noGrp="1"/>
+          </p:cNvSpPr>
+          <p:nvPr>
+            <p:ph type="title"/>
+          </p:nvPr>
+        </p:nvSpPr>
+        <p:spPr>
+          <a:xfrm>
+            <a:off x="-8737648" y="2060848"/>
+            <a:ext cx="8507412" cy="1498600"/>
+          </a:xfrm>
+        </p:spPr>
+        <p:txBody>
+          <a:bodyPr>
+            <a:normAutofit/>
+          </a:bodyPr>
+          <a:lstStyle/>
+          <a:p>
+            <a:pPr algn="ctr"/>
+            <a:r>
+              <a:rPr lang="en-GB" altLang="en-US" dirty="0">
+                <a:solidFill>
+                  <a:schemeClr val="bg1"/>
+                </a:solidFill>
+                <a:latin typeface="Century Gothic" panose="020B0502020202020204" pitchFamily="34" charset="0"/>
+              </a:rPr>
+              <a:t>How to Pray</a:t>
+            </a:r>
+            <a:endParaRPr lang="en-GB" altLang="en-US" dirty="0">
+              <a:solidFill>
+                <a:schemeClr val="bg1"/>
+              </a:solidFill>
+              <a:latin typeface="Century Gothic" panose="020B0502020202020204" pitchFamily="34" charset="0"/>
+              <a:ea typeface="金梅新中楷全字體" pitchFamily="49" charset="-120"/>
+            </a:endParaRPr>
+          </a:p>
+        </p:txBody>
+      </p:sp>
+      <p:sp>
+        <p:nvSpPr>
+          <p:cNvPr id="2" name="TextBox 1"/>
+          <p:cNvSpPr txBox="1"/>
           <p:nvPr/>
         </p:nvSpPr>
-        <p:spPr bwMode="auto">
+        <p:spPr>
           <a:xfrm>
-            <a:off x="0" y="597316"/>
-            <a:ext cx="9144000" cy="6432087"/>
+            <a:off x="1" y="391869"/>
+            <a:ext cx="9144000" cy="1569660"/>
           </a:xfrm>
           <a:prstGeom prst="rect">
             <a:avLst/>
           </a:prstGeom>
           <a:noFill/>
-          <a:ln>
-            <a:noFill/>
-          </a:ln>
-          <a:effectLst/>
-          <a:extLst>
-            <a:ext uri="{909E8E84-426E-40DD-AFC4-6F175D3DCCD1}">
-              <a14:hiddenFill xmlns:a14="http://schemas.microsoft.com/office/drawing/2010/main">
-                <a:solidFill>
-                  <a:schemeClr val="accent1"/>
-                </a:solidFill>
-              </a14:hiddenFill>
-            </a:ext>
-            <a:ext uri="{91240B29-F687-4F45-9708-019B960494DF}">
-              <a14:hiddenLine xmlns:a14="http://schemas.microsoft.com/office/drawing/2010/main" w="9525">
-                <a:solidFill>
-                  <a:schemeClr val="tx1"/>
-                </a:solidFill>
-                <a:miter lim="800000"/>
-                <a:headEnd/>
-                <a:tailEnd/>
-              </a14:hiddenLine>
-            </a:ext>
-            <a:ext uri="{AF507438-7753-43E0-B8FC-AC1667EBCBE1}">
-              <a14:hiddenEffects xmlns:a14="http://schemas.microsoft.com/office/drawing/2010/main">
-                <a:effectLst>
-                  <a:outerShdw dist="35921" dir="2700000" algn="ctr" rotWithShape="0">
-                    <a:schemeClr val="bg2"/>
-                  </a:outerShdw>
-                </a:effectLst>
-              </a14:hiddenEffects>
-            </a:ext>
-          </a:extLst>
         </p:spPr>
         <p:txBody>
-          <a:bodyPr wrap="square">
-            <a:noAutofit/>
+          <a:bodyPr wrap="square" rtlCol="0">
+            <a:spAutoFit/>
           </a:bodyPr>
           <a:lstStyle/>
           <a:p>
             <a:pPr algn="ctr"/>
-            <a:endParaRPr lang="en-GB" altLang="zh-TW" sz="2400" b="1" dirty="0">
+            <a:r>
+              <a:rPr lang="en-GB" altLang="en-US" sz="2400" b="1" dirty="0">
+                <a:solidFill>
+                  <a:schemeClr val="bg1"/>
+                </a:solidFill>
+                <a:latin typeface="Century Gothic" panose="020B0502020202020204" pitchFamily="34" charset="0"/>
+              </a:rPr>
+              <a:t>Welcome To True Jesus Church , Please Join Us In Prayer </a:t>
+            </a:r>
+            <a:br>
+              <a:rPr lang="en-GB" altLang="en-US" sz="2400" b="1" dirty="0">
+                <a:solidFill>
+                  <a:schemeClr val="bg1"/>
+                </a:solidFill>
+                <a:latin typeface="Century Gothic" panose="020B0502020202020204" pitchFamily="34" charset="0"/>
+              </a:rPr>
+            </a:br>
+            <a:r>
+              <a:rPr lang="zh-TW" altLang="en-US" sz="2400" b="1" dirty="0">
+                <a:solidFill>
+                  <a:schemeClr val="bg1"/>
+                </a:solidFill>
+                <a:latin typeface="Century Gothic" panose="020B0502020202020204" pitchFamily="34" charset="0"/>
+                <a:ea typeface="金梅新中楷全字體" pitchFamily="49" charset="-120"/>
+              </a:rPr>
+              <a:t>歡迎光臨真耶穌教會，請跟我們一起禱告</a:t>
+            </a:r>
+            <a:br>
+              <a:rPr lang="en-GB" altLang="zh-TW" sz="2400" b="1" dirty="0">
+                <a:solidFill>
+                  <a:schemeClr val="bg1"/>
+                </a:solidFill>
+                <a:latin typeface="Century Gothic" panose="020B0502020202020204" pitchFamily="34" charset="0"/>
+                <a:ea typeface="金梅新中楷全字體" pitchFamily="49" charset="-120"/>
+              </a:rPr>
+            </a:br>
+            <a:r>
+              <a:rPr lang="en-GB" altLang="zh-TW" sz="2400" b="1" dirty="0">
+                <a:solidFill>
+                  <a:schemeClr val="bg1"/>
+                </a:solidFill>
+                <a:latin typeface="Century Gothic" panose="020B0502020202020204" pitchFamily="34" charset="0"/>
+                <a:ea typeface="金梅新中楷全字體" pitchFamily="49" charset="-120"/>
+              </a:rPr>
+              <a:t>------------------------------------------------------------------</a:t>
+            </a:r>
+          </a:p>
+          <a:p>
+            <a:pPr algn="ctr"/>
+            <a:endParaRPr lang="en-GB" sz="2400" b="1" dirty="0">
               <a:solidFill>
                 <a:schemeClr val="bg1"/>
               </a:solidFill>
               <a:latin typeface="Century Gothic" panose="020B0502020202020204" pitchFamily="34" charset="0"/>
-              <a:ea typeface="金梅新中楷全字體" panose="02010509060101010101" pitchFamily="49" charset="-120"/>
+              <a:ea typeface="金梅新中楷全字體" pitchFamily="49" charset="-120"/>
             </a:endParaRPr>
           </a:p>
         </p:txBody>
       </p:sp>
       <p:sp>
         <p:nvSpPr>
-          <p:cNvPr id="13" name="Text Box 12">
+          <p:cNvPr id="11" name="TextBox 10">
             <a:extLst>
               <a:ext uri="{FF2B5EF4-FFF2-40B4-BE49-F238E27FC236}">
-                <a16:creationId xmlns:a16="http://schemas.microsoft.com/office/drawing/2014/main" id="{977E556A-8801-4241-B610-C5D48A41FAF4}"/>
+                <a16:creationId xmlns:a16="http://schemas.microsoft.com/office/drawing/2014/main" id="{235016D5-86EA-E742-B39A-4D64FDB8E053}"/>
               </a:ext>
             </a:extLst>
           </p:cNvPr>
-          <p:cNvSpPr txBox="1">
-            <a:spLocks noChangeArrowheads="1"/>
-          </p:cNvSpPr>
+          <p:cNvSpPr txBox="1"/>
           <p:nvPr/>
         </p:nvSpPr>
-        <p:spPr bwMode="auto">
+        <p:spPr>
           <a:xfrm>
-            <a:off x="1091496" y="165267"/>
-            <a:ext cx="6961015" cy="432048"/>
+            <a:off x="179512" y="2030073"/>
+            <a:ext cx="4392488" cy="3477875"/>
           </a:xfrm>
           <a:prstGeom prst="rect">
             <a:avLst/>
           </a:prstGeom>
           <a:noFill/>
-          <a:ln>
-            <a:noFill/>
-          </a:ln>
-          <a:effectLst/>
-          <a:extLst>
-            <a:ext uri="{909E8E84-426E-40DD-AFC4-6F175D3DCCD1}">
-              <a14:hiddenFill xmlns:a14="http://schemas.microsoft.com/office/drawing/2010/main">
-                <a:solidFill>
-                  <a:schemeClr val="accent1"/>
-                </a:solidFill>
-              </a14:hiddenFill>
-            </a:ext>
-            <a:ext uri="{91240B29-F687-4F45-9708-019B960494DF}">
-              <a14:hiddenLine xmlns:a14="http://schemas.microsoft.com/office/drawing/2010/main" w="9525">
-                <a:solidFill>
-                  <a:schemeClr val="tx1"/>
-                </a:solidFill>
-                <a:miter lim="800000"/>
-                <a:headEnd/>
-                <a:tailEnd/>
-              </a14:hiddenLine>
-            </a:ext>
-            <a:ext uri="{AF507438-7753-43E0-B8FC-AC1667EBCBE1}">
-              <a14:hiddenEffects xmlns:a14="http://schemas.microsoft.com/office/drawing/2010/main">
-                <a:effectLst>
-                  <a:outerShdw dist="35921" dir="2700000" algn="ctr" rotWithShape="0">
-                    <a:schemeClr val="bg2"/>
-                  </a:outerShdw>
-                </a:effectLst>
-              </a14:hiddenEffects>
-            </a:ext>
-          </a:extLst>
         </p:spPr>
         <p:txBody>
-          <a:bodyPr wrap="square">
-            <a:noAutofit/>
+          <a:bodyPr wrap="square" lIns="0" rtlCol="0" anchor="ctr">
+            <a:spAutoFit/>
           </a:bodyPr>
           <a:lstStyle/>
           <a:p>
-            <a:pPr algn="ctr"/>
-            <a:r>
-              <a:rPr lang="en-GB" altLang="en-US" sz="3200" b="1" u="sng" dirty="0">
-                <a:solidFill>
-                  <a:schemeClr val="bg1"/>
+            <a:pPr algn="l"/>
+            <a:r>
+              <a:rPr lang="en-GB" sz="2000" dirty="0">
+                <a:solidFill>
+                  <a:srgbClr val="FFFFFF"/>
                 </a:solidFill>
                 <a:latin typeface="Century Gothic" panose="020B0502020202020204" pitchFamily="34" charset="0"/>
               </a:rPr>
-              <a:t>Announcements </a:t>
-            </a:r>
-            <a:r>
-              <a:rPr lang="en-GB" altLang="en-US" sz="3200" b="1" u="sng" dirty="0">
-                <a:solidFill>
-                  <a:schemeClr val="bg1"/>
+              <a:t>Kneel with humility.</a:t>
+            </a:r>
+          </a:p>
+          <a:p>
+            <a:pPr algn="l"/>
+            <a:r>
+              <a:rPr lang="en-GB" sz="2000" dirty="0">
+                <a:solidFill>
+                  <a:srgbClr val="FFFFFF"/>
                 </a:solidFill>
                 <a:latin typeface="Century Gothic" panose="020B0502020202020204" pitchFamily="34" charset="0"/>
-                <a:ea typeface="金梅新中楷全字體" panose="02010509060101010101" pitchFamily="49" charset="-120"/>
               </a:rPr>
-              <a:t>- </a:t>
-            </a:r>
-            <a:r>
-              <a:rPr lang="zh-TW" altLang="en-US" sz="3200" b="1" u="sng" dirty="0">
-                <a:solidFill>
-                  <a:schemeClr val="bg1"/>
+              <a:t>Close your eyes to concentrate.</a:t>
+            </a:r>
+          </a:p>
+          <a:p>
+            <a:pPr algn="l"/>
+            <a:r>
+              <a:rPr lang="en-GB" sz="2000" dirty="0">
+                <a:solidFill>
+                  <a:srgbClr val="FFFFFF"/>
                 </a:solidFill>
                 <a:latin typeface="Century Gothic" panose="020B0502020202020204" pitchFamily="34" charset="0"/>
-                <a:ea typeface="金梅新中楷全字體" panose="02010509060101010101" pitchFamily="49" charset="-120"/>
               </a:rPr>
-              <a:t>佈告</a:t>
-            </a:r>
-            <a:endParaRPr lang="en-GB" altLang="zh-TW" sz="3200" b="1" u="sng" dirty="0">
+              <a:t>Begin by saying, </a:t>
+            </a:r>
+            <a:r>
+              <a:rPr lang="en-GB" sz="2000" b="1" i="1" dirty="0">
+                <a:solidFill>
+                  <a:srgbClr val="DAF5FF"/>
+                </a:solidFill>
+                <a:latin typeface="Century Gothic" panose="020B0502020202020204" pitchFamily="34" charset="0"/>
+              </a:rPr>
+              <a:t>“In the name of the Lord Jesus Christ I pray.”</a:t>
+            </a:r>
+            <a:endParaRPr lang="en-GB" sz="2000" b="1" dirty="0">
               <a:solidFill>
-                <a:schemeClr val="bg1"/>
+                <a:srgbClr val="FFFFFF"/>
               </a:solidFill>
               <a:latin typeface="Century Gothic" panose="020B0502020202020204" pitchFamily="34" charset="0"/>
-              <a:ea typeface="金梅新中楷全字體" panose="02010509060101010101" pitchFamily="49" charset="-120"/>
             </a:endParaRPr>
           </a:p>
-        </p:txBody>
-      </p:sp>
-      <p:sp>
-        <p:nvSpPr>
-          <p:cNvPr id="14" name="Title 1">
+          <a:p>
+            <a:pPr algn="l"/>
+            <a:r>
+              <a:rPr lang="en-GB" sz="2000" dirty="0">
+                <a:solidFill>
+                  <a:srgbClr val="FFFFFF"/>
+                </a:solidFill>
+                <a:latin typeface="Century Gothic" panose="020B0502020202020204" pitchFamily="34" charset="0"/>
+              </a:rPr>
+              <a:t>Praise the Lord by saying, </a:t>
+            </a:r>
+            <a:r>
+              <a:rPr lang="en-GB" sz="2000" b="1" i="1" dirty="0">
+                <a:solidFill>
+                  <a:srgbClr val="DAF5FF"/>
+                </a:solidFill>
+                <a:latin typeface="Century Gothic" panose="020B0502020202020204" pitchFamily="34" charset="0"/>
+              </a:rPr>
+              <a:t>“Hallelujah!”</a:t>
+            </a:r>
+            <a:endParaRPr lang="en-GB" sz="2000" b="1" dirty="0">
+              <a:solidFill>
+                <a:srgbClr val="FFFFFF"/>
+              </a:solidFill>
+              <a:latin typeface="Century Gothic" panose="020B0502020202020204" pitchFamily="34" charset="0"/>
+            </a:endParaRPr>
+          </a:p>
+          <a:p>
+            <a:pPr algn="l"/>
+            <a:r>
+              <a:rPr lang="en-GB" sz="2000" dirty="0">
+                <a:solidFill>
+                  <a:srgbClr val="FFFFFF"/>
+                </a:solidFill>
+                <a:latin typeface="Century Gothic" panose="020B0502020202020204" pitchFamily="34" charset="0"/>
+              </a:rPr>
+              <a:t>Spend time to speak with God from your heart and ask Him to fill you with the Holy Spirit.</a:t>
+            </a:r>
+          </a:p>
+          <a:p>
+            <a:pPr algn="l"/>
+            <a:r>
+              <a:rPr lang="en-GB" sz="2000" dirty="0">
+                <a:solidFill>
+                  <a:srgbClr val="FFFFFF"/>
+                </a:solidFill>
+                <a:latin typeface="Century Gothic" panose="020B0502020202020204" pitchFamily="34" charset="0"/>
+              </a:rPr>
+              <a:t>Conclude your prayer with, </a:t>
+            </a:r>
+            <a:r>
+              <a:rPr lang="en-GB" sz="2000" b="1" i="1" dirty="0">
+                <a:solidFill>
+                  <a:srgbClr val="DAF5FF"/>
+                </a:solidFill>
+                <a:latin typeface="Century Gothic" panose="020B0502020202020204" pitchFamily="34" charset="0"/>
+              </a:rPr>
+              <a:t>“Amen.”</a:t>
+            </a:r>
+            <a:endParaRPr lang="en-GB" sz="2000" b="1" dirty="0">
+              <a:solidFill>
+                <a:srgbClr val="FFFFFF"/>
+              </a:solidFill>
+              <a:latin typeface="Century Gothic" panose="020B0502020202020204" pitchFamily="34" charset="0"/>
+            </a:endParaRPr>
+          </a:p>
+        </p:txBody>
+      </p:sp>
+      <p:sp>
+        <p:nvSpPr>
+          <p:cNvPr id="13" name="TextBox 12">
             <a:extLst>
               <a:ext uri="{FF2B5EF4-FFF2-40B4-BE49-F238E27FC236}">
-                <a16:creationId xmlns:a16="http://schemas.microsoft.com/office/drawing/2014/main" id="{24CDB64D-DDA9-4535-BAD4-A67954A30EFA}"/>
+                <a16:creationId xmlns:a16="http://schemas.microsoft.com/office/drawing/2014/main" id="{C204AB72-B659-2754-2040-B5F198104EBB}"/>
               </a:ext>
             </a:extLst>
           </p:cNvPr>
-          <p:cNvSpPr>
-            <a:spLocks noGrp="1"/>
-          </p:cNvSpPr>
-          <p:nvPr>
-            <p:ph type="title"/>
-          </p:nvPr>
+          <p:cNvSpPr txBox="1"/>
+          <p:nvPr/>
         </p:nvSpPr>
         <p:spPr>
           <a:xfrm>
-            <a:off x="-8677472" y="1772816"/>
-            <a:ext cx="8229600" cy="1143000"/>
-          </a:xfrm>
-        </p:spPr>
-        <p:txBody>
-          <a:bodyPr/>
-          <a:lstStyle/>
-          <a:p>
-            <a:r>
-              <a:rPr lang="en-GB" dirty="0">
-                <a:latin typeface="Century Gothic" panose="020B0502020202020204" pitchFamily="34" charset="0"/>
-              </a:rPr>
-              <a:t>Announcements</a:t>
-            </a:r>
-          </a:p>
-        </p:txBody>
-      </p:sp>
-      <p:sp>
-        <p:nvSpPr>
-          <p:cNvPr id="8" name="Text Box 11">
-            <a:extLst>
-              <a:ext uri="{FF2B5EF4-FFF2-40B4-BE49-F238E27FC236}">
-                <a16:creationId xmlns:a16="http://schemas.microsoft.com/office/drawing/2014/main" id="{3985E19E-5E75-4B70-B876-FBD9207D307A}"/>
-              </a:ext>
-            </a:extLst>
-          </p:cNvPr>
-          <p:cNvSpPr txBox="1">
-            <a:spLocks noChangeArrowheads="1"/>
-          </p:cNvSpPr>
-          <p:nvPr/>
-        </p:nvSpPr>
-        <p:spPr bwMode="auto">
-          <a:xfrm>
-            <a:off x="611560" y="6107922"/>
-            <a:ext cx="2736156" cy="338554"/>
+            <a:off x="4644008" y="2060848"/>
+            <a:ext cx="4499992" cy="3539430"/>
           </a:xfrm>
           <a:prstGeom prst="rect">
             <a:avLst/>
           </a:prstGeom>
           <a:noFill/>
-          <a:ln>
-            <a:noFill/>
-          </a:ln>
-          <a:effectLst/>
-          <a:extLst>
-            <a:ext uri="{909E8E84-426E-40DD-AFC4-6F175D3DCCD1}">
-              <a14:hiddenFill xmlns:a14="http://schemas.microsoft.com/office/drawing/2010/main">
-                <a:solidFill>
-                  <a:schemeClr val="accent1"/>
-                </a:solidFill>
-              </a14:hiddenFill>
-            </a:ext>
-            <a:ext uri="{91240B29-F687-4F45-9708-019B960494DF}">
-              <a14:hiddenLine xmlns:a14="http://schemas.microsoft.com/office/drawing/2010/main" w="9525">
-                <a:solidFill>
-                  <a:schemeClr val="tx1"/>
-                </a:solidFill>
-                <a:miter lim="800000"/>
-                <a:headEnd/>
-                <a:tailEnd/>
-              </a14:hiddenLine>
-            </a:ext>
-            <a:ext uri="{AF507438-7753-43E0-B8FC-AC1667EBCBE1}">
-              <a14:hiddenEffects xmlns:a14="http://schemas.microsoft.com/office/drawing/2010/main">
-                <a:effectLst>
-                  <a:outerShdw dist="35921" dir="2700000" algn="ctr" rotWithShape="0">
-                    <a:schemeClr val="bg2"/>
-                  </a:outerShdw>
-                </a:effectLst>
-              </a14:hiddenEffects>
-            </a:ext>
-          </a:extLst>
         </p:spPr>
         <p:txBody>
-          <a:bodyPr wrap="square">
+          <a:bodyPr wrap="square" rtlCol="0" anchor="ctr">
             <a:spAutoFit/>
           </a:bodyPr>
           <a:lstStyle/>
           <a:p>
-            <a:pPr>
-              <a:spcBef>
-                <a:spcPct val="50000"/>
-              </a:spcBef>
-            </a:pPr>
-            <a:r>
-              <a:rPr lang="en-US" altLang="en-US" sz="1600" dirty="0">
-                <a:solidFill>
-                  <a:schemeClr val="bg1"/>
+            <a:pPr algn="l"/>
+            <a:r>
+              <a:rPr lang="zh-TW" altLang="en-US" sz="2800" dirty="0">
+                <a:solidFill>
+                  <a:srgbClr val="FFFFFF"/>
                 </a:solidFill>
                 <a:latin typeface="Century Gothic" panose="020B0502020202020204" pitchFamily="34" charset="0"/>
-                <a:ea typeface="金梅新中楷全字體" panose="02010509060101010101" pitchFamily="49" charset="-120"/>
+                <a:ea typeface="金梅新中楷全字體" panose="02010509060101010101"/>
               </a:rPr>
-              <a:t>請 關 您 的 手 提 電 話 </a:t>
-            </a:r>
-          </a:p>
-        </p:txBody>
-      </p:sp>
-      <p:sp>
-        <p:nvSpPr>
-          <p:cNvPr id="9" name="Text Box 12">
+              <a:t>虔誠地跪下</a:t>
+            </a:r>
+          </a:p>
+          <a:p>
+            <a:pPr algn="l"/>
+            <a:r>
+              <a:rPr lang="zh-TW" altLang="en-US" sz="2800" dirty="0">
+                <a:solidFill>
+                  <a:srgbClr val="FFFFFF"/>
+                </a:solidFill>
+                <a:latin typeface="Century Gothic" panose="020B0502020202020204" pitchFamily="34" charset="0"/>
+                <a:ea typeface="金梅新中楷全字體" panose="02010509060101010101"/>
+              </a:rPr>
+              <a:t>閉上眼睛專心預備</a:t>
+            </a:r>
+          </a:p>
+          <a:p>
+            <a:pPr algn="l"/>
+            <a:r>
+              <a:rPr lang="zh-TW" altLang="en-US" sz="2800" dirty="0">
+                <a:solidFill>
+                  <a:srgbClr val="FFFFFF"/>
+                </a:solidFill>
+                <a:latin typeface="Century Gothic" panose="020B0502020202020204" pitchFamily="34" charset="0"/>
+                <a:ea typeface="金梅新中楷全字體" panose="02010509060101010101"/>
+              </a:rPr>
+              <a:t>先唸</a:t>
+            </a:r>
+            <a:r>
+              <a:rPr lang="en-US" altLang="zh-TW" sz="2800" dirty="0">
+                <a:solidFill>
+                  <a:srgbClr val="FFFFFF"/>
+                </a:solidFill>
+                <a:latin typeface="Century Gothic" panose="020B0502020202020204" pitchFamily="34" charset="0"/>
+                <a:ea typeface="金梅新中楷全字體" panose="02010509060101010101"/>
+              </a:rPr>
+              <a:t>, </a:t>
+            </a:r>
+            <a:r>
+              <a:rPr lang="en-US" altLang="zh-TW" sz="2800" b="1" dirty="0">
+                <a:solidFill>
+                  <a:srgbClr val="DAF5FF"/>
+                </a:solidFill>
+                <a:latin typeface="Century Gothic" panose="020B0502020202020204" pitchFamily="34" charset="0"/>
+                <a:ea typeface="金梅新中楷全字體" panose="02010509060101010101"/>
+              </a:rPr>
+              <a:t>“</a:t>
+            </a:r>
+            <a:r>
+              <a:rPr lang="zh-TW" altLang="en-US" sz="2800" b="1" dirty="0">
+                <a:solidFill>
+                  <a:srgbClr val="DAF5FF"/>
+                </a:solidFill>
+                <a:latin typeface="Century Gothic" panose="020B0502020202020204" pitchFamily="34" charset="0"/>
+                <a:ea typeface="金梅新中楷全字體" panose="02010509060101010101"/>
+              </a:rPr>
+              <a:t>奉主耶穌聖名禱告”</a:t>
+            </a:r>
+          </a:p>
+          <a:p>
+            <a:pPr algn="l"/>
+            <a:r>
+              <a:rPr lang="zh-TW" altLang="en-US" sz="2800" dirty="0">
+                <a:solidFill>
+                  <a:srgbClr val="FFFFFF"/>
+                </a:solidFill>
+                <a:latin typeface="Century Gothic" panose="020B0502020202020204" pitchFamily="34" charset="0"/>
+                <a:ea typeface="金梅新中楷全字體" panose="02010509060101010101"/>
+              </a:rPr>
+              <a:t>重複唸</a:t>
+            </a:r>
+            <a:r>
+              <a:rPr lang="en-US" altLang="zh-TW" sz="2800" dirty="0">
+                <a:solidFill>
+                  <a:srgbClr val="FFFFFF"/>
+                </a:solidFill>
+                <a:latin typeface="Century Gothic" panose="020B0502020202020204" pitchFamily="34" charset="0"/>
+                <a:ea typeface="金梅新中楷全字體" panose="02010509060101010101"/>
+              </a:rPr>
+              <a:t>, </a:t>
+            </a:r>
+            <a:r>
+              <a:rPr lang="en-US" altLang="zh-TW" sz="2800" b="1" dirty="0">
+                <a:solidFill>
+                  <a:srgbClr val="DAF5FF"/>
+                </a:solidFill>
+                <a:latin typeface="Century Gothic" panose="020B0502020202020204" pitchFamily="34" charset="0"/>
+                <a:ea typeface="金梅新中楷全字體" panose="02010509060101010101"/>
+              </a:rPr>
+              <a:t>“</a:t>
+            </a:r>
+            <a:r>
+              <a:rPr lang="zh-TW" altLang="en-US" sz="2800" b="1" dirty="0">
+                <a:solidFill>
+                  <a:srgbClr val="DAF5FF"/>
+                </a:solidFill>
+                <a:latin typeface="Century Gothic" panose="020B0502020202020204" pitchFamily="34" charset="0"/>
+                <a:ea typeface="金梅新中楷全字體" panose="02010509060101010101"/>
+              </a:rPr>
+              <a:t>哈利路亞</a:t>
+            </a:r>
+            <a:r>
+              <a:rPr lang="en-US" altLang="zh-TW" sz="2800" b="1" dirty="0">
+                <a:solidFill>
+                  <a:srgbClr val="DAF5FF"/>
+                </a:solidFill>
+                <a:latin typeface="Century Gothic" panose="020B0502020202020204" pitchFamily="34" charset="0"/>
+                <a:ea typeface="金梅新中楷全字體" panose="02010509060101010101"/>
+              </a:rPr>
+              <a:t>, </a:t>
+            </a:r>
+            <a:r>
+              <a:rPr lang="zh-TW" altLang="en-US" sz="2800" b="1" dirty="0">
+                <a:solidFill>
+                  <a:srgbClr val="DAF5FF"/>
+                </a:solidFill>
+                <a:latin typeface="Century Gothic" panose="020B0502020202020204" pitchFamily="34" charset="0"/>
+                <a:ea typeface="金梅新中楷全字體" panose="02010509060101010101"/>
+              </a:rPr>
+              <a:t>讚美主耶穌”</a:t>
+            </a:r>
+          </a:p>
+          <a:p>
+            <a:pPr algn="l"/>
+            <a:r>
+              <a:rPr lang="zh-TW" altLang="en-US" sz="2800" dirty="0">
+                <a:solidFill>
+                  <a:srgbClr val="FFFFFF"/>
+                </a:solidFill>
+                <a:latin typeface="Century Gothic" panose="020B0502020202020204" pitchFamily="34" charset="0"/>
+                <a:ea typeface="金梅新中楷全字體" panose="02010509060101010101"/>
+              </a:rPr>
+              <a:t>您也可以將您的需要告訴神</a:t>
+            </a:r>
+            <a:r>
+              <a:rPr lang="en-US" altLang="zh-TW" sz="2800" dirty="0">
+                <a:solidFill>
+                  <a:srgbClr val="FFFFFF"/>
+                </a:solidFill>
+                <a:latin typeface="Century Gothic" panose="020B0502020202020204" pitchFamily="34" charset="0"/>
+                <a:ea typeface="金梅新中楷全字體" panose="02010509060101010101"/>
+              </a:rPr>
+              <a:t>, </a:t>
+            </a:r>
+            <a:r>
+              <a:rPr lang="zh-TW" altLang="en-US" sz="2800" dirty="0">
+                <a:solidFill>
+                  <a:srgbClr val="FFFFFF"/>
+                </a:solidFill>
+                <a:latin typeface="Century Gothic" panose="020B0502020202020204" pitchFamily="34" charset="0"/>
+                <a:ea typeface="金梅新中楷全字體" panose="02010509060101010101"/>
+              </a:rPr>
+              <a:t>並祈求祂賞賜您聖靈</a:t>
+            </a:r>
+          </a:p>
+          <a:p>
+            <a:pPr algn="l"/>
+            <a:r>
+              <a:rPr lang="zh-TW" altLang="en-US" sz="2800" dirty="0">
+                <a:solidFill>
+                  <a:srgbClr val="FFFFFF"/>
+                </a:solidFill>
+                <a:latin typeface="Century Gothic" panose="020B0502020202020204" pitchFamily="34" charset="0"/>
+                <a:ea typeface="金梅新中楷全字體" panose="02010509060101010101"/>
+              </a:rPr>
+              <a:t>最後以 </a:t>
+            </a:r>
+            <a:r>
+              <a:rPr lang="zh-TW" altLang="en-US" sz="2800" b="1" dirty="0">
+                <a:solidFill>
+                  <a:srgbClr val="DAF5FF"/>
+                </a:solidFill>
+                <a:latin typeface="Century Gothic" panose="020B0502020202020204" pitchFamily="34" charset="0"/>
+                <a:ea typeface="金梅新中楷全字體" panose="02010509060101010101"/>
+              </a:rPr>
+              <a:t>“阿們</a:t>
+            </a:r>
+            <a:r>
+              <a:rPr lang="en-US" altLang="zh-TW" sz="2800" b="1" dirty="0">
+                <a:solidFill>
+                  <a:srgbClr val="DAF5FF"/>
+                </a:solidFill>
+                <a:latin typeface="Century Gothic" panose="020B0502020202020204" pitchFamily="34" charset="0"/>
+                <a:ea typeface="金梅新中楷全字體" panose="02010509060101010101"/>
+              </a:rPr>
+              <a:t>!” </a:t>
+            </a:r>
+            <a:r>
+              <a:rPr lang="zh-TW" altLang="en-US" sz="2800" dirty="0">
+                <a:solidFill>
+                  <a:srgbClr val="FFFFFF"/>
+                </a:solidFill>
+                <a:latin typeface="Century Gothic" panose="020B0502020202020204" pitchFamily="34" charset="0"/>
+                <a:ea typeface="金梅新中楷全字體" panose="02010509060101010101"/>
+              </a:rPr>
+              <a:t>結束禱告</a:t>
+            </a:r>
+            <a:endParaRPr lang="en-GB" sz="2800" dirty="0">
+              <a:solidFill>
+                <a:srgbClr val="FFFFFF"/>
+              </a:solidFill>
+              <a:latin typeface="Century Gothic" panose="020B0502020202020204" pitchFamily="34" charset="0"/>
+              <a:ea typeface="金梅新中楷全字體" panose="02010509060101010101"/>
+            </a:endParaRPr>
+          </a:p>
+        </p:txBody>
+      </p:sp>
+      <p:pic>
+        <p:nvPicPr>
+          <p:cNvPr id="10" name="Picture 9" descr="Logo&#10;&#10;Description automatically generated with medium confidence">
             <a:extLst>
               <a:ext uri="{FF2B5EF4-FFF2-40B4-BE49-F238E27FC236}">
-                <a16:creationId xmlns:a16="http://schemas.microsoft.com/office/drawing/2014/main" id="{59F5DB9D-F5DF-428A-A391-61CF9584390B}"/>
-              </a:ext>
-            </a:extLst>
-          </p:cNvPr>
-          <p:cNvSpPr txBox="1">
-            <a:spLocks noChangeArrowheads="1"/>
-          </p:cNvSpPr>
-          <p:nvPr/>
-        </p:nvSpPr>
-        <p:spPr bwMode="auto">
-          <a:xfrm>
-            <a:off x="611560" y="6369861"/>
-            <a:ext cx="3672335" cy="276999"/>
-          </a:xfrm>
-          <a:prstGeom prst="rect">
-            <a:avLst/>
-          </a:prstGeom>
-          <a:noFill/>
-          <a:ln>
-            <a:noFill/>
-          </a:ln>
-          <a:effectLst/>
-          <a:extLst>
-            <a:ext uri="{909E8E84-426E-40DD-AFC4-6F175D3DCCD1}">
-              <a14:hiddenFill xmlns:a14="http://schemas.microsoft.com/office/drawing/2010/main">
-                <a:solidFill>
-                  <a:schemeClr val="accent1"/>
-                </a:solidFill>
-              </a14:hiddenFill>
-            </a:ext>
-            <a:ext uri="{91240B29-F687-4F45-9708-019B960494DF}">
-              <a14:hiddenLine xmlns:a14="http://schemas.microsoft.com/office/drawing/2010/main" w="9525">
-                <a:solidFill>
-                  <a:schemeClr val="tx1"/>
-                </a:solidFill>
-                <a:miter lim="800000"/>
-                <a:headEnd/>
-                <a:tailEnd/>
-              </a14:hiddenLine>
-            </a:ext>
-            <a:ext uri="{AF507438-7753-43E0-B8FC-AC1667EBCBE1}">
-              <a14:hiddenEffects xmlns:a14="http://schemas.microsoft.com/office/drawing/2010/main">
-                <a:effectLst>
-                  <a:outerShdw dist="35921" dir="2700000" algn="ctr" rotWithShape="0">
-                    <a:schemeClr val="bg2"/>
-                  </a:outerShdw>
-                </a:effectLst>
-              </a14:hiddenEffects>
-            </a:ext>
-          </a:extLst>
-        </p:spPr>
-        <p:txBody>
-          <a:bodyPr wrap="square">
-            <a:spAutoFit/>
-          </a:bodyPr>
-          <a:lstStyle/>
-          <a:p>
-            <a:pPr>
-              <a:spcBef>
-                <a:spcPct val="50000"/>
-              </a:spcBef>
-            </a:pPr>
-            <a:r>
-              <a:rPr lang="en-GB" altLang="en-US" sz="1200" b="1" dirty="0">
-                <a:solidFill>
-                  <a:schemeClr val="bg1"/>
-                </a:solidFill>
-                <a:latin typeface="Century Gothic" panose="020B0502020202020204" pitchFamily="34" charset="0"/>
-              </a:rPr>
-              <a:t>PLEASE SWITCH OFF YOUR MOBILE PHONE</a:t>
-            </a:r>
-            <a:endParaRPr lang="en-US" altLang="en-US" sz="1200" b="1" dirty="0">
-              <a:solidFill>
-                <a:schemeClr val="bg1"/>
-              </a:solidFill>
-              <a:latin typeface="Century Gothic" panose="020B0502020202020204" pitchFamily="34" charset="0"/>
-            </a:endParaRPr>
-          </a:p>
-        </p:txBody>
-      </p:sp>
-      <p:pic>
-        <p:nvPicPr>
-          <p:cNvPr id="10" name="Picture 2" descr="Custom No Mobile Phones Sign | The Sign Shed">
-            <a:extLst>
-              <a:ext uri="{FF2B5EF4-FFF2-40B4-BE49-F238E27FC236}">
-                <a16:creationId xmlns:a16="http://schemas.microsoft.com/office/drawing/2014/main" id="{659EC883-578A-43C7-ADBC-296DCE1F49C2}"/>
+                <a16:creationId xmlns:a16="http://schemas.microsoft.com/office/drawing/2014/main" id="{5AEB2637-2851-5FB4-C663-08810550744D}"/>
               </a:ext>
             </a:extLst>
           </p:cNvPr>
           <p:cNvPicPr>
-            <a:picLocks noChangeAspect="1" noChangeArrowheads="1"/>
+            <a:picLocks noChangeAspect="1"/>
           </p:cNvPicPr>
           <p:nvPr/>
         </p:nvPicPr>
-        <p:blipFill rotWithShape="1">
+        <p:blipFill>
           <a:blip r:embed="rId2" cstate="print">
             <a:extLst>
               <a:ext uri="{28A0092B-C50C-407E-A947-70E740481C1C}">
@@ -5761,33 +7068,150 @@
               </a:ext>
             </a:extLst>
           </a:blip>
-          <a:srcRect l="3327" t="11250" r="71169" b="12911"/>
-          <a:stretch/>
+          <a:stretch>
+            <a:fillRect/>
+          </a:stretch>
         </p:blipFill>
-        <p:spPr bwMode="auto">
+        <p:spPr>
           <a:xfrm>
-            <a:off x="179437" y="6144630"/>
-            <a:ext cx="432048" cy="432048"/>
+            <a:off x="117892" y="6396577"/>
+            <a:ext cx="2664297" cy="344791"/>
           </a:xfrm>
           <a:prstGeom prst="rect">
             <a:avLst/>
           </a:prstGeom>
-          <a:noFill/>
-          <a:extLst>
-            <a:ext uri="{909E8E84-426E-40DD-AFC4-6F175D3DCCD1}">
-              <a14:hiddenFill xmlns:a14="http://schemas.microsoft.com/office/drawing/2010/main">
-                <a:solidFill>
-                  <a:srgbClr val="FFFFFF"/>
-                </a:solidFill>
-              </a14:hiddenFill>
-            </a:ext>
-          </a:extLst>
         </p:spPr>
       </p:pic>
+      <p:grpSp>
+        <p:nvGrpSpPr>
+          <p:cNvPr id="14" name="Group 13">
+            <a:extLst>
+              <a:ext uri="{FF2B5EF4-FFF2-40B4-BE49-F238E27FC236}">
+                <a16:creationId xmlns:a16="http://schemas.microsoft.com/office/drawing/2014/main" id="{58D7A999-D8C1-FC7E-B7E9-B1DE9E27DBD0}"/>
+              </a:ext>
+            </a:extLst>
+          </p:cNvPr>
+          <p:cNvGrpSpPr/>
+          <p:nvPr/>
+        </p:nvGrpSpPr>
+        <p:grpSpPr>
+          <a:xfrm>
+            <a:off x="3275856" y="6427357"/>
+            <a:ext cx="5734763" cy="307777"/>
+            <a:chOff x="4799854" y="6300028"/>
+            <a:chExt cx="5734763" cy="307776"/>
+          </a:xfrm>
+        </p:grpSpPr>
+        <p:sp>
+          <p:nvSpPr>
+            <p:cNvPr id="15" name="TextBox 14">
+              <a:extLst>
+                <a:ext uri="{FF2B5EF4-FFF2-40B4-BE49-F238E27FC236}">
+                  <a16:creationId xmlns:a16="http://schemas.microsoft.com/office/drawing/2014/main" id="{B1FDF483-C38A-55F2-30F6-775BD045085D}"/>
+                </a:ext>
+              </a:extLst>
+            </p:cNvPr>
+            <p:cNvSpPr txBox="1"/>
+            <p:nvPr/>
+          </p:nvSpPr>
+          <p:spPr>
+            <a:xfrm>
+              <a:off x="4799854" y="6300028"/>
+              <a:ext cx="5734763" cy="307776"/>
+            </a:xfrm>
+            <a:prstGeom prst="rect">
+              <a:avLst/>
+            </a:prstGeom>
+            <a:noFill/>
+            <a:ln w="19050">
+              <a:solidFill>
+                <a:srgbClr val="FF0000"/>
+              </a:solidFill>
+            </a:ln>
+          </p:spPr>
+          <p:txBody>
+            <a:bodyPr wrap="square" rtlCol="0" anchor="ctr">
+              <a:spAutoFit/>
+            </a:bodyPr>
+            <a:lstStyle/>
+            <a:p>
+              <a:r>
+                <a:rPr lang="en-GB" sz="1400" dirty="0">
+                  <a:solidFill>
+                    <a:schemeClr val="bg1"/>
+                  </a:solidFill>
+                  <a:latin typeface="Century Gothic" panose="020B0502020202020204" pitchFamily="34" charset="0"/>
+                </a:rPr>
+                <a:t>Please Turn Off/Silence Your Devices </a:t>
+              </a:r>
+              <a:r>
+                <a:rPr lang="ja-JP" altLang="en-US" sz="1400" dirty="0">
+                  <a:solidFill>
+                    <a:schemeClr val="bg1"/>
+                  </a:solidFill>
+                  <a:latin typeface="Century Gothic" panose="020B0502020202020204" pitchFamily="34" charset="0"/>
+                </a:rPr>
+                <a:t>請靜音或關閉所有電子設備</a:t>
+              </a:r>
+            </a:p>
+          </p:txBody>
+        </p:sp>
+        <p:pic>
+          <p:nvPicPr>
+            <p:cNvPr id="16" name="Picture 15" descr="Shape&#10;&#10;Description automatically generated with low confidence">
+              <a:extLst>
+                <a:ext uri="{FF2B5EF4-FFF2-40B4-BE49-F238E27FC236}">
+                  <a16:creationId xmlns:a16="http://schemas.microsoft.com/office/drawing/2014/main" id="{22587B7C-35F3-AD9E-3BD2-D38C44043EE3}"/>
+                </a:ext>
+              </a:extLst>
+            </p:cNvPr>
+            <p:cNvPicPr>
+              <a:picLocks noChangeAspect="1"/>
+            </p:cNvPicPr>
+            <p:nvPr/>
+          </p:nvPicPr>
+          <p:blipFill>
+            <a:blip r:embed="rId3" cstate="print">
+              <a:extLst>
+                <a:ext uri="{BEBA8EAE-BF5A-486C-A8C5-ECC9F3942E4B}">
+                  <a14:imgProps xmlns:a14="http://schemas.microsoft.com/office/drawing/2010/main">
+                    <a14:imgLayer r:embed="rId4">
+                      <a14:imgEffect>
+                        <a14:colorTemperature colorTemp="11500"/>
+                      </a14:imgEffect>
+                      <a14:imgEffect>
+                        <a14:saturation sat="400000"/>
+                      </a14:imgEffect>
+                      <a14:imgEffect>
+                        <a14:brightnessContrast bright="100000" contrast="100000"/>
+                      </a14:imgEffect>
+                    </a14:imgLayer>
+                  </a14:imgProps>
+                </a:ext>
+                <a:ext uri="{28A0092B-C50C-407E-A947-70E740481C1C}">
+                  <a14:useLocalDpi xmlns:a14="http://schemas.microsoft.com/office/drawing/2010/main" val="0"/>
+                </a:ext>
+              </a:extLst>
+            </a:blip>
+            <a:stretch>
+              <a:fillRect/>
+            </a:stretch>
+          </p:blipFill>
+          <p:spPr>
+            <a:xfrm>
+              <a:off x="10218327" y="6309320"/>
+              <a:ext cx="280267" cy="280267"/>
+            </a:xfrm>
+            <a:prstGeom prst="rect">
+              <a:avLst/>
+            </a:prstGeom>
+          </p:spPr>
+        </p:pic>
+      </p:grpSp>
     </p:spTree>
     <p:extLst>
       <p:ext uri="{BB962C8B-B14F-4D97-AF65-F5344CB8AC3E}">
-        <p14:creationId xmlns:p14="http://schemas.microsoft.com/office/powerpoint/2010/main" val="3880852022"/>
+        <p14:creationId xmlns:p14="http://schemas.microsoft.com/office/powerpoint/2010/main" val="2970436884"/>
       </p:ext>
     </p:extLst>
   </p:cSld>
@@ -5797,9 +7221,17 @@
 </p:sld>
 </file>
 
-<file path=ppt/slides/slide4.xml><?xml version="1.0" encoding="utf-8"?>
+<file path=ppt/slides/slide7.xml><?xml version="1.0" encoding="utf-8"?>
 <p:sld xmlns:a="http://schemas.openxmlformats.org/drawingml/2006/main" xmlns:r="http://schemas.openxmlformats.org/officeDocument/2006/relationships" xmlns:p="http://schemas.openxmlformats.org/presentationml/2006/main">
   <p:cSld>
+    <p:bg>
+      <p:bgPr>
+        <a:solidFill>
+          <a:schemeClr val="tx1"/>
+        </a:solidFill>
+        <a:effectLst/>
+      </p:bgPr>
+    </p:bg>
     <p:spTree>
       <p:nvGrpSpPr>
         <p:cNvPr id="1" name=""/>
@@ -5816,435 +7248,376 @@
       </p:grpSpPr>
       <p:sp>
         <p:nvSpPr>
-          <p:cNvPr id="14" name="Title 1">
+          <p:cNvPr id="9" name="TextBox 8">
             <a:extLst>
               <a:ext uri="{FF2B5EF4-FFF2-40B4-BE49-F238E27FC236}">
-                <a16:creationId xmlns:a16="http://schemas.microsoft.com/office/drawing/2014/main" id="{24CDB64D-DDA9-4535-BAD4-A67954A30EFA}"/>
+                <a16:creationId xmlns:a16="http://schemas.microsoft.com/office/drawing/2014/main" id="{EB7FD2AF-7F03-5326-A748-9D97F0B7E43C}"/>
               </a:ext>
             </a:extLst>
           </p:cNvPr>
-          <p:cNvSpPr>
-            <a:spLocks noGrp="1"/>
-          </p:cNvSpPr>
-          <p:nvPr>
-            <p:ph type="title"/>
-          </p:nvPr>
+          <p:cNvSpPr txBox="1"/>
+          <p:nvPr/>
         </p:nvSpPr>
         <p:spPr>
           <a:xfrm>
-            <a:off x="-8677472" y="1772816"/>
-            <a:ext cx="8229600" cy="1143000"/>
-          </a:xfrm>
-        </p:spPr>
-        <p:txBody>
-          <a:bodyPr/>
-          <a:lstStyle/>
-          <a:p>
-            <a:r>
-              <a:rPr lang="en-GB" dirty="0">
-                <a:latin typeface="Century Gothic" panose="020B0502020202020204" pitchFamily="34" charset="0"/>
-              </a:rPr>
-              <a:t>Holy Communion</a:t>
-            </a:r>
-          </a:p>
-        </p:txBody>
-      </p:sp>
-      <p:sp>
-        <p:nvSpPr>
-          <p:cNvPr id="8" name="Text Box 11">
-            <a:extLst>
-              <a:ext uri="{FF2B5EF4-FFF2-40B4-BE49-F238E27FC236}">
-                <a16:creationId xmlns:a16="http://schemas.microsoft.com/office/drawing/2014/main" id="{3985E19E-5E75-4B70-B876-FBD9207D307A}"/>
-              </a:ext>
-            </a:extLst>
-          </p:cNvPr>
-          <p:cNvSpPr txBox="1">
-            <a:spLocks noChangeArrowheads="1"/>
-          </p:cNvSpPr>
-          <p:nvPr/>
-        </p:nvSpPr>
-        <p:spPr bwMode="auto">
-          <a:xfrm>
-            <a:off x="611560" y="6107922"/>
-            <a:ext cx="2736156" cy="338554"/>
+            <a:off x="186703" y="637429"/>
+            <a:ext cx="8770600" cy="2123658"/>
           </a:xfrm>
           <a:prstGeom prst="rect">
             <a:avLst/>
           </a:prstGeom>
           <a:noFill/>
-          <a:ln>
-            <a:noFill/>
+          <a:ln w="63500">
+            <a:solidFill>
+              <a:srgbClr val="FF0000"/>
+            </a:solidFill>
           </a:ln>
-          <a:effectLst/>
-          <a:extLst>
-            <a:ext uri="{909E8E84-426E-40DD-AFC4-6F175D3DCCD1}">
-              <a14:hiddenFill xmlns:a14="http://schemas.microsoft.com/office/drawing/2010/main">
-                <a:solidFill>
-                  <a:schemeClr val="accent1"/>
-                </a:solidFill>
-              </a14:hiddenFill>
-            </a:ext>
-            <a:ext uri="{91240B29-F687-4F45-9708-019B960494DF}">
-              <a14:hiddenLine xmlns:a14="http://schemas.microsoft.com/office/drawing/2010/main" w="9525">
-                <a:solidFill>
-                  <a:schemeClr val="tx1"/>
-                </a:solidFill>
-                <a:miter lim="800000"/>
-                <a:headEnd/>
-                <a:tailEnd/>
-              </a14:hiddenLine>
-            </a:ext>
-            <a:ext uri="{AF507438-7753-43E0-B8FC-AC1667EBCBE1}">
-              <a14:hiddenEffects xmlns:a14="http://schemas.microsoft.com/office/drawing/2010/main">
-                <a:effectLst>
-                  <a:outerShdw dist="35921" dir="2700000" algn="ctr" rotWithShape="0">
-                    <a:schemeClr val="bg2"/>
-                  </a:outerShdw>
-                </a:effectLst>
-              </a14:hiddenEffects>
-            </a:ext>
-          </a:extLst>
         </p:spPr>
         <p:txBody>
-          <a:bodyPr wrap="square">
+          <a:bodyPr wrap="square" rtlCol="0">
             <a:spAutoFit/>
           </a:bodyPr>
           <a:lstStyle/>
           <a:p>
-            <a:pPr>
-              <a:spcBef>
-                <a:spcPct val="50000"/>
-              </a:spcBef>
-            </a:pPr>
-            <a:r>
-              <a:rPr lang="en-US" altLang="en-US" sz="1600" dirty="0">
+            <a:pPr algn="ctr"/>
+            <a:r>
+              <a:rPr lang="en-GB" altLang="en-US" sz="4400" b="1" dirty="0">
                 <a:solidFill>
                   <a:schemeClr val="bg1"/>
                 </a:solidFill>
                 <a:latin typeface="Century Gothic" panose="020B0502020202020204" pitchFamily="34" charset="0"/>
-                <a:ea typeface="金梅新中楷全字體" panose="02010509060101010101" pitchFamily="49" charset="-120"/>
               </a:rPr>
-              <a:t>請 關 您 的 手 提 電 話 </a:t>
-            </a:r>
-          </a:p>
-        </p:txBody>
-      </p:sp>
-      <p:sp>
-        <p:nvSpPr>
-          <p:cNvPr id="9" name="Text Box 12">
+              <a:t>Please Turn Off/Silence Your Devices</a:t>
+            </a:r>
+          </a:p>
+          <a:p>
+            <a:pPr algn="ctr"/>
+            <a:r>
+              <a:rPr lang="ja-JP" altLang="en-US" sz="4400" b="1" dirty="0">
+                <a:solidFill>
+                  <a:schemeClr val="bg1"/>
+                </a:solidFill>
+                <a:latin typeface="Century Gothic" panose="020B0502020202020204" pitchFamily="34" charset="0"/>
+              </a:rPr>
+              <a:t>請靜音或關閉所有電子設備</a:t>
+            </a:r>
+            <a:endParaRPr lang="en-GB" sz="4400" b="1" dirty="0">
+              <a:solidFill>
+                <a:schemeClr val="bg1"/>
+              </a:solidFill>
+              <a:latin typeface="Century Gothic" panose="020B0502020202020204" pitchFamily="34" charset="0"/>
+              <a:ea typeface="金梅新中楷全字體" pitchFamily="49" charset="-120"/>
+            </a:endParaRPr>
+          </a:p>
+        </p:txBody>
+      </p:sp>
+      <p:pic>
+        <p:nvPicPr>
+          <p:cNvPr id="5" name="Picture 4" descr="Shape&#10;&#10;Description automatically generated with low confidence">
             <a:extLst>
               <a:ext uri="{FF2B5EF4-FFF2-40B4-BE49-F238E27FC236}">
-                <a16:creationId xmlns:a16="http://schemas.microsoft.com/office/drawing/2014/main" id="{59F5DB9D-F5DF-428A-A391-61CF9584390B}"/>
+                <a16:creationId xmlns:a16="http://schemas.microsoft.com/office/drawing/2014/main" id="{AC9BD3E1-856D-B518-3D09-AA2FCBC6B91A}"/>
               </a:ext>
             </a:extLst>
           </p:cNvPr>
-          <p:cNvSpPr txBox="1">
-            <a:spLocks noChangeArrowheads="1"/>
-          </p:cNvSpPr>
+          <p:cNvPicPr>
+            <a:picLocks noChangeAspect="1"/>
+          </p:cNvPicPr>
           <p:nvPr/>
-        </p:nvSpPr>
-        <p:spPr bwMode="auto">
+        </p:nvPicPr>
+        <p:blipFill>
+          <a:blip r:embed="rId2" cstate="print">
+            <a:extLst>
+              <a:ext uri="{BEBA8EAE-BF5A-486C-A8C5-ECC9F3942E4B}">
+                <a14:imgProps xmlns:a14="http://schemas.microsoft.com/office/drawing/2010/main">
+                  <a14:imgLayer r:embed="rId3">
+                    <a14:imgEffect>
+                      <a14:colorTemperature colorTemp="11500"/>
+                    </a14:imgEffect>
+                    <a14:imgEffect>
+                      <a14:saturation sat="400000"/>
+                    </a14:imgEffect>
+                    <a14:imgEffect>
+                      <a14:brightnessContrast bright="100000" contrast="100000"/>
+                    </a14:imgEffect>
+                  </a14:imgLayer>
+                </a14:imgProps>
+              </a:ext>
+              <a:ext uri="{28A0092B-C50C-407E-A947-70E740481C1C}">
+                <a14:useLocalDpi xmlns:a14="http://schemas.microsoft.com/office/drawing/2010/main" val="0"/>
+              </a:ext>
+            </a:extLst>
+          </a:blip>
+          <a:stretch>
+            <a:fillRect/>
+          </a:stretch>
+        </p:blipFill>
+        <p:spPr>
           <a:xfrm>
-            <a:off x="611560" y="6369861"/>
-            <a:ext cx="3672335" cy="276999"/>
+            <a:off x="186702" y="3157844"/>
+            <a:ext cx="2359387" cy="2359387"/>
           </a:xfrm>
           <a:prstGeom prst="rect">
             <a:avLst/>
           </a:prstGeom>
-          <a:noFill/>
-          <a:ln>
-            <a:noFill/>
-          </a:ln>
-          <a:effectLst/>
-          <a:extLst>
-            <a:ext uri="{909E8E84-426E-40DD-AFC4-6F175D3DCCD1}">
-              <a14:hiddenFill xmlns:a14="http://schemas.microsoft.com/office/drawing/2010/main">
-                <a:solidFill>
-                  <a:schemeClr val="accent1"/>
-                </a:solidFill>
-              </a14:hiddenFill>
-            </a:ext>
-            <a:ext uri="{91240B29-F687-4F45-9708-019B960494DF}">
-              <a14:hiddenLine xmlns:a14="http://schemas.microsoft.com/office/drawing/2010/main" w="9525">
-                <a:solidFill>
-                  <a:schemeClr val="tx1"/>
-                </a:solidFill>
-                <a:miter lim="800000"/>
-                <a:headEnd/>
-                <a:tailEnd/>
-              </a14:hiddenLine>
-            </a:ext>
-            <a:ext uri="{AF507438-7753-43E0-B8FC-AC1667EBCBE1}">
-              <a14:hiddenEffects xmlns:a14="http://schemas.microsoft.com/office/drawing/2010/main">
-                <a:effectLst>
-                  <a:outerShdw dist="35921" dir="2700000" algn="ctr" rotWithShape="0">
-                    <a:schemeClr val="bg2"/>
-                  </a:outerShdw>
-                </a:effectLst>
-              </a14:hiddenEffects>
-            </a:ext>
-          </a:extLst>
         </p:spPr>
-        <p:txBody>
-          <a:bodyPr wrap="square">
-            <a:spAutoFit/>
-          </a:bodyPr>
-          <a:lstStyle/>
-          <a:p>
-            <a:pPr>
-              <a:spcBef>
-                <a:spcPct val="50000"/>
-              </a:spcBef>
-            </a:pPr>
-            <a:r>
-              <a:rPr lang="en-GB" altLang="en-US" sz="1200" b="1" dirty="0">
-                <a:solidFill>
-                  <a:schemeClr val="bg1"/>
-                </a:solidFill>
-                <a:latin typeface="Century Gothic" panose="020B0502020202020204" pitchFamily="34" charset="0"/>
-              </a:rPr>
-              <a:t>PLEASE SWITCH OFF YOUR MOBILE PHONE</a:t>
-            </a:r>
-            <a:endParaRPr lang="en-US" altLang="en-US" sz="1200" b="1" dirty="0">
-              <a:solidFill>
-                <a:schemeClr val="bg1"/>
-              </a:solidFill>
-              <a:latin typeface="Century Gothic" panose="020B0502020202020204" pitchFamily="34" charset="0"/>
-            </a:endParaRPr>
-          </a:p>
-        </p:txBody>
-      </p:sp>
+      </p:pic>
       <p:pic>
         <p:nvPicPr>
-          <p:cNvPr id="10" name="Picture 2" descr="Custom No Mobile Phones Sign | The Sign Shed">
+          <p:cNvPr id="3" name="Picture 2" descr="Shape&#10;&#10;Description automatically generated with low confidence">
             <a:extLst>
               <a:ext uri="{FF2B5EF4-FFF2-40B4-BE49-F238E27FC236}">
-                <a16:creationId xmlns:a16="http://schemas.microsoft.com/office/drawing/2014/main" id="{659EC883-578A-43C7-ADBC-296DCE1F49C2}"/>
+                <a16:creationId xmlns:a16="http://schemas.microsoft.com/office/drawing/2014/main" id="{F2B8EEB5-A2A8-2246-92B8-D793C3FDC5FE}"/>
               </a:ext>
             </a:extLst>
           </p:cNvPr>
           <p:cNvPicPr>
-            <a:picLocks noChangeAspect="1" noChangeArrowheads="1"/>
+            <a:picLocks noChangeAspect="1"/>
           </p:cNvPicPr>
           <p:nvPr/>
         </p:nvPicPr>
-        <p:blipFill rotWithShape="1">
-          <a:blip r:embed="rId2" cstate="print">
+        <p:blipFill>
+          <a:blip r:embed="rId4">
+            <a:extLst>
+              <a:ext uri="{BEBA8EAE-BF5A-486C-A8C5-ECC9F3942E4B}">
+                <a14:imgProps xmlns:a14="http://schemas.microsoft.com/office/drawing/2010/main">
+                  <a14:imgLayer r:embed="rId5">
+                    <a14:imgEffect>
+                      <a14:brightnessContrast bright="100000" contrast="100000"/>
+                    </a14:imgEffect>
+                  </a14:imgLayer>
+                </a14:imgProps>
+              </a:ext>
+              <a:ext uri="{28A0092B-C50C-407E-A947-70E740481C1C}">
+                <a14:useLocalDpi xmlns:a14="http://schemas.microsoft.com/office/drawing/2010/main" val="0"/>
+              </a:ext>
+            </a:extLst>
+          </a:blip>
+          <a:stretch>
+            <a:fillRect/>
+          </a:stretch>
+        </p:blipFill>
+        <p:spPr>
+          <a:xfrm>
+            <a:off x="3491882" y="3157847"/>
+            <a:ext cx="2359385" cy="2359385"/>
+          </a:xfrm>
+          <a:prstGeom prst="rect">
+            <a:avLst/>
+          </a:prstGeom>
+        </p:spPr>
+      </p:pic>
+      <p:pic>
+        <p:nvPicPr>
+          <p:cNvPr id="6" name="Picture 5" descr="Shape&#10;&#10;Description automatically generated with low confidence">
+            <a:extLst>
+              <a:ext uri="{FF2B5EF4-FFF2-40B4-BE49-F238E27FC236}">
+                <a16:creationId xmlns:a16="http://schemas.microsoft.com/office/drawing/2014/main" id="{E4E05851-7A29-58F2-A0E9-7AFC98E740B6}"/>
+              </a:ext>
+            </a:extLst>
+          </p:cNvPr>
+          <p:cNvPicPr>
+            <a:picLocks noChangeAspect="1"/>
+          </p:cNvPicPr>
+          <p:nvPr/>
+        </p:nvPicPr>
+        <p:blipFill>
+          <a:blip r:embed="rId6">
+            <a:extLst>
+              <a:ext uri="{BEBA8EAE-BF5A-486C-A8C5-ECC9F3942E4B}">
+                <a14:imgProps xmlns:a14="http://schemas.microsoft.com/office/drawing/2010/main">
+                  <a14:imgLayer r:embed="rId7">
+                    <a14:imgEffect>
+                      <a14:brightnessContrast bright="100000" contrast="100000"/>
+                    </a14:imgEffect>
+                  </a14:imgLayer>
+                </a14:imgProps>
+              </a:ext>
+              <a:ext uri="{28A0092B-C50C-407E-A947-70E740481C1C}">
+                <a14:useLocalDpi xmlns:a14="http://schemas.microsoft.com/office/drawing/2010/main" val="0"/>
+              </a:ext>
+            </a:extLst>
+          </a:blip>
+          <a:stretch>
+            <a:fillRect/>
+          </a:stretch>
+        </p:blipFill>
+        <p:spPr>
+          <a:xfrm>
+            <a:off x="6597917" y="3154932"/>
+            <a:ext cx="2359385" cy="2359385"/>
+          </a:xfrm>
+          <a:prstGeom prst="rect">
+            <a:avLst/>
+          </a:prstGeom>
+        </p:spPr>
+      </p:pic>
+      <p:pic>
+        <p:nvPicPr>
+          <p:cNvPr id="8" name="Picture 7" descr="Logo&#10;&#10;Description automatically generated with medium confidence">
+            <a:extLst>
+              <a:ext uri="{FF2B5EF4-FFF2-40B4-BE49-F238E27FC236}">
+                <a16:creationId xmlns:a16="http://schemas.microsoft.com/office/drawing/2014/main" id="{E63C1CB6-0BBA-0289-0A0E-C329DCF9A9F8}"/>
+              </a:ext>
+            </a:extLst>
+          </p:cNvPr>
+          <p:cNvPicPr>
+            <a:picLocks noChangeAspect="1"/>
+          </p:cNvPicPr>
+          <p:nvPr/>
+        </p:nvPicPr>
+        <p:blipFill>
+          <a:blip r:embed="rId8" cstate="print">
             <a:extLst>
               <a:ext uri="{28A0092B-C50C-407E-A947-70E740481C1C}">
                 <a14:useLocalDpi xmlns:a14="http://schemas.microsoft.com/office/drawing/2010/main" val="0"/>
               </a:ext>
             </a:extLst>
           </a:blip>
-          <a:srcRect l="3327" t="11250" r="71169" b="12911"/>
-          <a:stretch/>
+          <a:stretch>
+            <a:fillRect/>
+          </a:stretch>
         </p:blipFill>
-        <p:spPr bwMode="auto">
+        <p:spPr>
           <a:xfrm>
-            <a:off x="179437" y="6144630"/>
-            <a:ext cx="432048" cy="432048"/>
+            <a:off x="117892" y="6396577"/>
+            <a:ext cx="2664297" cy="344791"/>
           </a:xfrm>
           <a:prstGeom prst="rect">
             <a:avLst/>
           </a:prstGeom>
-          <a:noFill/>
-          <a:extLst>
-            <a:ext uri="{909E8E84-426E-40DD-AFC4-6F175D3DCCD1}">
-              <a14:hiddenFill xmlns:a14="http://schemas.microsoft.com/office/drawing/2010/main">
-                <a:solidFill>
-                  <a:srgbClr val="FFFFFF"/>
-                </a:solidFill>
-              </a14:hiddenFill>
-            </a:ext>
-          </a:extLst>
         </p:spPr>
       </p:pic>
-      <p:sp>
-        <p:nvSpPr>
-          <p:cNvPr id="11" name="Text Box 12">
+      <p:grpSp>
+        <p:nvGrpSpPr>
+          <p:cNvPr id="10" name="Group 9">
             <a:extLst>
               <a:ext uri="{FF2B5EF4-FFF2-40B4-BE49-F238E27FC236}">
-                <a16:creationId xmlns:a16="http://schemas.microsoft.com/office/drawing/2014/main" id="{18D6DFE5-236E-49F0-A2B7-8F2FEBFFC2D6}"/>
+                <a16:creationId xmlns:a16="http://schemas.microsoft.com/office/drawing/2014/main" id="{93F8435B-C159-5EF3-25C1-4E3826B2F661}"/>
               </a:ext>
             </a:extLst>
           </p:cNvPr>
-          <p:cNvSpPr txBox="1">
-            <a:spLocks noChangeArrowheads="1"/>
-          </p:cNvSpPr>
+          <p:cNvGrpSpPr/>
           <p:nvPr/>
-        </p:nvSpPr>
-        <p:spPr bwMode="auto">
+        </p:nvGrpSpPr>
+        <p:grpSpPr>
           <a:xfrm>
-            <a:off x="1091493" y="246237"/>
-            <a:ext cx="6961014" cy="671446"/>
+            <a:off x="3275856" y="6427357"/>
+            <a:ext cx="5734763" cy="307777"/>
+            <a:chOff x="4799854" y="6300028"/>
+            <a:chExt cx="5734763" cy="307776"/>
           </a:xfrm>
-          <a:prstGeom prst="rect">
-            <a:avLst/>
-          </a:prstGeom>
-          <a:noFill/>
-          <a:ln>
+        </p:grpSpPr>
+        <p:sp>
+          <p:nvSpPr>
+            <p:cNvPr id="11" name="TextBox 10">
+              <a:extLst>
+                <a:ext uri="{FF2B5EF4-FFF2-40B4-BE49-F238E27FC236}">
+                  <a16:creationId xmlns:a16="http://schemas.microsoft.com/office/drawing/2014/main" id="{ED6E40C3-3B2B-6A67-24EE-8D26ED9A9939}"/>
+                </a:ext>
+              </a:extLst>
+            </p:cNvPr>
+            <p:cNvSpPr txBox="1"/>
+            <p:nvPr/>
+          </p:nvSpPr>
+          <p:spPr>
+            <a:xfrm>
+              <a:off x="4799854" y="6300028"/>
+              <a:ext cx="5734763" cy="307776"/>
+            </a:xfrm>
+            <a:prstGeom prst="rect">
+              <a:avLst/>
+            </a:prstGeom>
             <a:noFill/>
-          </a:ln>
-          <a:effectLst/>
-          <a:extLst>
-            <a:ext uri="{909E8E84-426E-40DD-AFC4-6F175D3DCCD1}">
-              <a14:hiddenFill xmlns:a14="http://schemas.microsoft.com/office/drawing/2010/main">
-                <a:solidFill>
-                  <a:schemeClr val="accent1"/>
-                </a:solidFill>
-              </a14:hiddenFill>
-            </a:ext>
-            <a:ext uri="{91240B29-F687-4F45-9708-019B960494DF}">
-              <a14:hiddenLine xmlns:a14="http://schemas.microsoft.com/office/drawing/2010/main" w="9525">
-                <a:solidFill>
-                  <a:schemeClr val="tx1"/>
-                </a:solidFill>
-                <a:miter lim="800000"/>
-                <a:headEnd/>
-                <a:tailEnd/>
-              </a14:hiddenLine>
-            </a:ext>
-            <a:ext uri="{AF507438-7753-43E0-B8FC-AC1667EBCBE1}">
-              <a14:hiddenEffects xmlns:a14="http://schemas.microsoft.com/office/drawing/2010/main">
-                <a:effectLst>
-                  <a:outerShdw dist="35921" dir="2700000" algn="ctr" rotWithShape="0">
-                    <a:schemeClr val="bg2"/>
-                  </a:outerShdw>
-                </a:effectLst>
-              </a14:hiddenEffects>
-            </a:ext>
-          </a:extLst>
-        </p:spPr>
-        <p:txBody>
-          <a:bodyPr wrap="square">
-            <a:noAutofit/>
-          </a:bodyPr>
-          <a:lstStyle/>
-          <a:p>
-            <a:pPr algn="ctr"/>
-            <a:r>
-              <a:rPr lang="en-GB" altLang="en-US" sz="3200" b="1" u="sng" dirty="0">
-                <a:solidFill>
-                  <a:schemeClr val="bg1"/>
-                </a:solidFill>
-                <a:latin typeface="Century Gothic" panose="020B0502020202020204" pitchFamily="34" charset="0"/>
-              </a:rPr>
-              <a:t>Holy Communion </a:t>
-            </a:r>
-            <a:r>
-              <a:rPr lang="ja-JP" altLang="en-US" sz="3200" b="1" i="0" u="sng" dirty="0">
-                <a:solidFill>
-                  <a:schemeClr val="bg1"/>
-                </a:solidFill>
-                <a:effectLst/>
-                <a:latin typeface="Roboto" panose="02000000000000000000" pitchFamily="2" charset="0"/>
-              </a:rPr>
-              <a:t>聖餐典禮</a:t>
-            </a:r>
-            <a:endParaRPr lang="en-GB" altLang="zh-TW" sz="3200" b="1" u="sng" dirty="0">
+            <a:ln w="19050">
               <a:solidFill>
-                <a:schemeClr val="bg1"/>
+                <a:srgbClr val="FF0000"/>
               </a:solidFill>
-              <a:latin typeface="Century Gothic" panose="020B0502020202020204" pitchFamily="34" charset="0"/>
-              <a:ea typeface="金梅新中楷全字體" panose="02010509060101010101" pitchFamily="49" charset="-120"/>
-            </a:endParaRPr>
-          </a:p>
-        </p:txBody>
-      </p:sp>
-      <p:sp>
-        <p:nvSpPr>
-          <p:cNvPr id="15" name="TextBox 14">
-            <a:extLst>
-              <a:ext uri="{FF2B5EF4-FFF2-40B4-BE49-F238E27FC236}">
-                <a16:creationId xmlns:a16="http://schemas.microsoft.com/office/drawing/2014/main" id="{E0F3D7F5-D6D7-4D5D-8150-807034C286CD}"/>
-              </a:ext>
-            </a:extLst>
-          </p:cNvPr>
-          <p:cNvSpPr txBox="1"/>
-          <p:nvPr/>
-        </p:nvSpPr>
-        <p:spPr>
-          <a:xfrm>
-            <a:off x="179436" y="1653496"/>
-            <a:ext cx="4608587" cy="735779"/>
-          </a:xfrm>
-          <a:prstGeom prst="rect">
-            <a:avLst/>
-          </a:prstGeom>
-          <a:noFill/>
-        </p:spPr>
-        <p:txBody>
-          <a:bodyPr wrap="square" rtlCol="0">
-            <a:spAutoFit/>
-          </a:bodyPr>
-          <a:lstStyle/>
-          <a:p>
-            <a:pPr algn="ctr">
-              <a:lnSpc>
-                <a:spcPct val="150000"/>
-              </a:lnSpc>
-            </a:pPr>
-            <a:r>
-              <a:rPr lang="en-GB" sz="3200" b="1" dirty="0">
-                <a:solidFill>
-                  <a:schemeClr val="bg1"/>
-                </a:solidFill>
-                <a:latin typeface="Century Gothic" panose="020B0502020202020204" pitchFamily="34" charset="0"/>
-              </a:rPr>
-              <a:t>Bread:</a:t>
-            </a:r>
-          </a:p>
-        </p:txBody>
-      </p:sp>
-      <p:sp>
-        <p:nvSpPr>
-          <p:cNvPr id="16" name="TextBox 15">
-            <a:extLst>
-              <a:ext uri="{FF2B5EF4-FFF2-40B4-BE49-F238E27FC236}">
-                <a16:creationId xmlns:a16="http://schemas.microsoft.com/office/drawing/2014/main" id="{F585918E-FD18-4A05-994E-888C9B303265}"/>
-              </a:ext>
-            </a:extLst>
-          </p:cNvPr>
-          <p:cNvSpPr txBox="1"/>
-          <p:nvPr/>
-        </p:nvSpPr>
-        <p:spPr>
-          <a:xfrm>
-            <a:off x="4572000" y="1653496"/>
-            <a:ext cx="3888432" cy="735779"/>
-          </a:xfrm>
-          <a:prstGeom prst="rect">
-            <a:avLst/>
-          </a:prstGeom>
-          <a:noFill/>
-        </p:spPr>
-        <p:txBody>
-          <a:bodyPr wrap="square" rtlCol="0">
-            <a:spAutoFit/>
-          </a:bodyPr>
-          <a:lstStyle/>
-          <a:p>
-            <a:pPr algn="ctr">
-              <a:lnSpc>
-                <a:spcPct val="150000"/>
-              </a:lnSpc>
-            </a:pPr>
-            <a:r>
-              <a:rPr lang="en-GB" sz="3200" b="1" dirty="0">
-                <a:solidFill>
-                  <a:schemeClr val="bg1"/>
-                </a:solidFill>
-                <a:latin typeface="Century Gothic" panose="020B0502020202020204" pitchFamily="34" charset="0"/>
-              </a:rPr>
-              <a:t>Cup:</a:t>
-            </a:r>
-          </a:p>
-        </p:txBody>
-      </p:sp>
+            </a:ln>
+          </p:spPr>
+          <p:txBody>
+            <a:bodyPr wrap="square" rtlCol="0" anchor="ctr">
+              <a:spAutoFit/>
+            </a:bodyPr>
+            <a:lstStyle/>
+            <a:p>
+              <a:r>
+                <a:rPr lang="en-GB" sz="1400" dirty="0">
+                  <a:solidFill>
+                    <a:schemeClr val="bg1"/>
+                  </a:solidFill>
+                  <a:latin typeface="Century Gothic" panose="020B0502020202020204" pitchFamily="34" charset="0"/>
+                </a:rPr>
+                <a:t>Please Turn Off/Silence Your Devices </a:t>
+              </a:r>
+              <a:r>
+                <a:rPr lang="ja-JP" altLang="en-US" sz="1400" dirty="0">
+                  <a:solidFill>
+                    <a:schemeClr val="bg1"/>
+                  </a:solidFill>
+                  <a:latin typeface="Century Gothic" panose="020B0502020202020204" pitchFamily="34" charset="0"/>
+                </a:rPr>
+                <a:t>請靜音或關閉所有電子設備</a:t>
+              </a:r>
+            </a:p>
+          </p:txBody>
+        </p:sp>
+        <p:pic>
+          <p:nvPicPr>
+            <p:cNvPr id="12" name="Picture 11" descr="Shape&#10;&#10;Description automatically generated with low confidence">
+              <a:extLst>
+                <a:ext uri="{FF2B5EF4-FFF2-40B4-BE49-F238E27FC236}">
+                  <a16:creationId xmlns:a16="http://schemas.microsoft.com/office/drawing/2014/main" id="{BEB19D38-94FA-AEE7-47B0-00940964557D}"/>
+                </a:ext>
+              </a:extLst>
+            </p:cNvPr>
+            <p:cNvPicPr>
+              <a:picLocks noChangeAspect="1"/>
+            </p:cNvPicPr>
+            <p:nvPr/>
+          </p:nvPicPr>
+          <p:blipFill>
+            <a:blip r:embed="rId9" cstate="print">
+              <a:extLst>
+                <a:ext uri="{BEBA8EAE-BF5A-486C-A8C5-ECC9F3942E4B}">
+                  <a14:imgProps xmlns:a14="http://schemas.microsoft.com/office/drawing/2010/main">
+                    <a14:imgLayer r:embed="rId10">
+                      <a14:imgEffect>
+                        <a14:colorTemperature colorTemp="11500"/>
+                      </a14:imgEffect>
+                      <a14:imgEffect>
+                        <a14:saturation sat="400000"/>
+                      </a14:imgEffect>
+                      <a14:imgEffect>
+                        <a14:brightnessContrast bright="100000" contrast="100000"/>
+                      </a14:imgEffect>
+                    </a14:imgLayer>
+                  </a14:imgProps>
+                </a:ext>
+                <a:ext uri="{28A0092B-C50C-407E-A947-70E740481C1C}">
+                  <a14:useLocalDpi xmlns:a14="http://schemas.microsoft.com/office/drawing/2010/main" val="0"/>
+                </a:ext>
+              </a:extLst>
+            </a:blip>
+            <a:stretch>
+              <a:fillRect/>
+            </a:stretch>
+          </p:blipFill>
+          <p:spPr>
+            <a:xfrm>
+              <a:off x="10218327" y="6309320"/>
+              <a:ext cx="280267" cy="280267"/>
+            </a:xfrm>
+            <a:prstGeom prst="rect">
+              <a:avLst/>
+            </a:prstGeom>
+          </p:spPr>
+        </p:pic>
+      </p:grpSp>
     </p:spTree>
     <p:extLst>
       <p:ext uri="{BB962C8B-B14F-4D97-AF65-F5344CB8AC3E}">
-        <p14:creationId xmlns:p14="http://schemas.microsoft.com/office/powerpoint/2010/main" val="1020035878"/>
+        <p14:creationId xmlns:p14="http://schemas.microsoft.com/office/powerpoint/2010/main" val="1579287213"/>
       </p:ext>
     </p:extLst>
   </p:cSld>
@@ -6254,9 +7627,17 @@
 </p:sld>
 </file>
 
-<file path=ppt/slides/slide5.xml><?xml version="1.0" encoding="utf-8"?>
+<file path=ppt/slides/slide8.xml><?xml version="1.0" encoding="utf-8"?>
 <p:sld xmlns:a="http://schemas.openxmlformats.org/drawingml/2006/main" xmlns:r="http://schemas.openxmlformats.org/officeDocument/2006/relationships" xmlns:p="http://schemas.openxmlformats.org/presentationml/2006/main">
   <p:cSld>
+    <p:bg>
+      <p:bgPr>
+        <a:solidFill>
+          <a:schemeClr val="tx1"/>
+        </a:solidFill>
+        <a:effectLst/>
+      </p:bgPr>
+    </p:bg>
     <p:spTree>
       <p:nvGrpSpPr>
         <p:cNvPr id="1" name=""/>
@@ -6273,296 +7654,80 @@
       </p:grpSpPr>
       <p:sp>
         <p:nvSpPr>
-          <p:cNvPr id="7170" name="Title 1"/>
-          <p:cNvSpPr>
-            <a:spLocks noGrp="1"/>
-          </p:cNvSpPr>
-          <p:nvPr>
-            <p:ph type="title"/>
-          </p:nvPr>
+          <p:cNvPr id="10" name="Title 1">
+            <a:extLst>
+              <a:ext uri="{FF2B5EF4-FFF2-40B4-BE49-F238E27FC236}">
+                <a16:creationId xmlns:a16="http://schemas.microsoft.com/office/drawing/2014/main" id="{A29A4E1D-6B90-5AD8-9DB2-C35F6160DFE2}"/>
+              </a:ext>
+            </a:extLst>
+          </p:cNvPr>
+          <p:cNvSpPr txBox="1">
+            <a:spLocks/>
+          </p:cNvSpPr>
+          <p:nvPr/>
         </p:nvSpPr>
         <p:spPr>
           <a:xfrm>
-            <a:off x="-6445224" y="274638"/>
-            <a:ext cx="8507412" cy="1498600"/>
+            <a:off x="-7741368" y="2619557"/>
+            <a:ext cx="6858000" cy="2387600"/>
           </a:xfrm>
+          <a:prstGeom prst="rect">
+            <a:avLst/>
+          </a:prstGeom>
         </p:spPr>
         <p:txBody>
-          <a:bodyPr/>
-          <a:lstStyle/>
-          <a:p>
-            <a:r>
-              <a:rPr lang="en-GB" altLang="en-US" sz="2800" b="1" dirty="0">
+          <a:bodyPr vert="horz" lIns="91440" tIns="45720" rIns="91440" bIns="45720" rtlCol="0" anchor="ctr">
+            <a:normAutofit/>
+          </a:bodyPr>
+          <a:lstStyle>
+            <a:lvl1pPr algn="l" defTabSz="914400" rtl="0" eaLnBrk="1" latinLnBrk="0" hangingPunct="1">
+              <a:lnSpc>
+                <a:spcPct val="90000"/>
+              </a:lnSpc>
+              <a:spcBef>
+                <a:spcPct val="0"/>
+              </a:spcBef>
+              <a:buNone/>
+              <a:defRPr sz="4400" kern="1200">
+                <a:solidFill>
+                  <a:schemeClr val="tx1"/>
+                </a:solidFill>
+                <a:latin typeface="+mj-lt"/>
+                <a:ea typeface="+mj-ea"/>
+                <a:cs typeface="+mj-cs"/>
+              </a:defRPr>
+            </a:lvl1pPr>
+          </a:lstStyle>
+          <a:p>
+            <a:pPr algn="ctr"/>
+            <a:r>
+              <a:rPr lang="en-GB" dirty="0">
                 <a:solidFill>
                   <a:schemeClr val="bg1"/>
                 </a:solidFill>
                 <a:latin typeface="Century Gothic" panose="020B0502020202020204" pitchFamily="34" charset="0"/>
               </a:rPr>
-              <a:t>How to Pray</a:t>
-            </a:r>
-            <a:endParaRPr lang="en-GB" altLang="en-US" sz="2800" b="1" dirty="0">
-              <a:solidFill>
-                <a:schemeClr val="bg1"/>
-              </a:solidFill>
-              <a:latin typeface="Century Gothic" panose="020B0502020202020204" pitchFamily="34" charset="0"/>
-              <a:ea typeface="金梅新中楷全字體" pitchFamily="49" charset="-120"/>
-            </a:endParaRPr>
-          </a:p>
-        </p:txBody>
-      </p:sp>
-      <p:sp>
-        <p:nvSpPr>
-          <p:cNvPr id="7171" name="Content Placeholder 2"/>
-          <p:cNvSpPr>
-            <a:spLocks noGrp="1"/>
-          </p:cNvSpPr>
-          <p:nvPr>
-            <p:ph idx="1"/>
-          </p:nvPr>
-        </p:nvSpPr>
-        <p:spPr/>
-        <p:txBody>
-          <a:bodyPr/>
-          <a:lstStyle/>
-          <a:p>
-            <a:pPr marL="0" indent="0">
-              <a:buNone/>
-            </a:pPr>
-            <a:endParaRPr lang="en-GB" altLang="en-US" sz="800" b="1" dirty="0">
-              <a:solidFill>
-                <a:schemeClr val="bg1"/>
-              </a:solidFill>
-              <a:latin typeface="Century Gothic" panose="020B0502020202020204" pitchFamily="34" charset="0"/>
-            </a:endParaRPr>
-          </a:p>
-          <a:p>
-            <a:pPr marL="0" indent="0">
-              <a:buNone/>
-            </a:pPr>
-            <a:r>
-              <a:rPr lang="en-GB" altLang="en-US" sz="2600" b="1" dirty="0">
-                <a:solidFill>
-                  <a:schemeClr val="bg1"/>
-                </a:solidFill>
-                <a:latin typeface="Century Gothic" panose="020B0502020202020204" pitchFamily="34" charset="0"/>
-              </a:rPr>
-              <a:t>Begin : </a:t>
-            </a:r>
-            <a:r>
-              <a:rPr lang="en-GB" altLang="en-US" sz="2600" dirty="0">
-                <a:solidFill>
-                  <a:schemeClr val="bg1"/>
-                </a:solidFill>
-                <a:latin typeface="Century Gothic" panose="020B0502020202020204" pitchFamily="34" charset="0"/>
-              </a:rPr>
-              <a:t>Hallelujah in the name of Jesus Christ I pray</a:t>
-            </a:r>
-          </a:p>
-          <a:p>
-            <a:pPr marL="0" indent="0">
-              <a:buNone/>
-            </a:pPr>
-            <a:r>
-              <a:rPr lang="zh-TW" altLang="en-US" b="1" dirty="0">
-                <a:solidFill>
-                  <a:schemeClr val="bg1"/>
-                </a:solidFill>
-                <a:latin typeface="Century Gothic" panose="020B0502020202020204" pitchFamily="34" charset="0"/>
-                <a:ea typeface="金梅新中楷全字體" pitchFamily="49" charset="-120"/>
-              </a:rPr>
-              <a:t>開始</a:t>
-            </a:r>
-            <a:r>
-              <a:rPr lang="en-GB" altLang="zh-TW" b="1" dirty="0">
-                <a:solidFill>
-                  <a:schemeClr val="bg1"/>
-                </a:solidFill>
-                <a:latin typeface="Century Gothic" panose="020B0502020202020204" pitchFamily="34" charset="0"/>
-                <a:ea typeface="金梅新中楷全字體" pitchFamily="49" charset="-120"/>
-              </a:rPr>
-              <a:t> : </a:t>
-            </a:r>
-            <a:r>
-              <a:rPr lang="zh-TW" altLang="en-US" b="1" dirty="0">
-                <a:solidFill>
-                  <a:schemeClr val="bg1"/>
-                </a:solidFill>
-                <a:latin typeface="Century Gothic" panose="020B0502020202020204" pitchFamily="34" charset="0"/>
-                <a:ea typeface="金梅新中楷全字體" pitchFamily="49" charset="-120"/>
-              </a:rPr>
-              <a:t>哈利路亞奉主耶穌聖名禱告</a:t>
-            </a:r>
-            <a:endParaRPr lang="en-GB" altLang="zh-TW" dirty="0">
-              <a:solidFill>
-                <a:schemeClr val="bg1"/>
-              </a:solidFill>
-              <a:latin typeface="Century Gothic" panose="020B0502020202020204" pitchFamily="34" charset="0"/>
-              <a:ea typeface="金梅新中楷全字體" pitchFamily="49" charset="-120"/>
-            </a:endParaRPr>
-          </a:p>
-          <a:p>
-            <a:pPr marL="0" indent="0">
-              <a:buNone/>
-            </a:pPr>
-            <a:endParaRPr lang="en-GB" altLang="en-US" sz="800" b="1" dirty="0">
-              <a:solidFill>
-                <a:schemeClr val="bg1"/>
-              </a:solidFill>
-              <a:latin typeface="Century Gothic" panose="020B0502020202020204" pitchFamily="34" charset="0"/>
-            </a:endParaRPr>
-          </a:p>
-          <a:p>
-            <a:pPr marL="0" indent="0">
-              <a:buNone/>
-            </a:pPr>
-            <a:r>
-              <a:rPr lang="en-GB" altLang="en-US" sz="2600" b="1" dirty="0">
-                <a:solidFill>
-                  <a:schemeClr val="bg1"/>
-                </a:solidFill>
-                <a:latin typeface="Century Gothic" panose="020B0502020202020204" pitchFamily="34" charset="0"/>
-              </a:rPr>
-              <a:t>During :</a:t>
-            </a:r>
-            <a:r>
-              <a:rPr lang="en-GB" altLang="en-US" sz="2600" dirty="0">
-                <a:solidFill>
-                  <a:schemeClr val="bg1"/>
-                </a:solidFill>
-                <a:latin typeface="Century Gothic" panose="020B0502020202020204" pitchFamily="34" charset="0"/>
-              </a:rPr>
-              <a:t> Hallelujah praise the Lord Jesus</a:t>
-            </a:r>
-          </a:p>
-          <a:p>
-            <a:pPr marL="0" indent="0">
-              <a:buNone/>
-            </a:pPr>
-            <a:r>
-              <a:rPr lang="zh-TW" altLang="en-US" b="1" dirty="0">
-                <a:solidFill>
-                  <a:schemeClr val="bg1"/>
-                </a:solidFill>
-                <a:latin typeface="Century Gothic" panose="020B0502020202020204" pitchFamily="34" charset="0"/>
-                <a:ea typeface="金梅新中楷全字體" pitchFamily="49" charset="-120"/>
-              </a:rPr>
-              <a:t>中間 </a:t>
-            </a:r>
-            <a:r>
-              <a:rPr lang="en-GB" altLang="zh-TW" b="1" dirty="0">
-                <a:solidFill>
-                  <a:schemeClr val="bg1"/>
-                </a:solidFill>
-                <a:latin typeface="Century Gothic" panose="020B0502020202020204" pitchFamily="34" charset="0"/>
-                <a:ea typeface="金梅新中楷全字體" pitchFamily="49" charset="-120"/>
-              </a:rPr>
-              <a:t>: </a:t>
-            </a:r>
-            <a:r>
-              <a:rPr lang="zh-TW" altLang="en-US" b="1" dirty="0">
-                <a:solidFill>
-                  <a:schemeClr val="bg1"/>
-                </a:solidFill>
-                <a:latin typeface="Century Gothic" panose="020B0502020202020204" pitchFamily="34" charset="0"/>
-                <a:ea typeface="金梅新中楷全字體" pitchFamily="49" charset="-120"/>
-              </a:rPr>
-              <a:t>哈利路亞讚美主耶穌</a:t>
-            </a:r>
-            <a:endParaRPr lang="en-GB" altLang="zh-TW" dirty="0">
-              <a:solidFill>
-                <a:schemeClr val="bg1"/>
-              </a:solidFill>
-              <a:latin typeface="Century Gothic" panose="020B0502020202020204" pitchFamily="34" charset="0"/>
-              <a:ea typeface="金梅新中楷全字體" pitchFamily="49" charset="-120"/>
-            </a:endParaRPr>
-          </a:p>
-          <a:p>
-            <a:pPr marL="0" indent="0">
-              <a:buNone/>
-            </a:pPr>
-            <a:endParaRPr lang="en-GB" altLang="en-US" sz="800" b="1" dirty="0">
-              <a:solidFill>
-                <a:schemeClr val="bg1"/>
-              </a:solidFill>
-              <a:latin typeface="Century Gothic" panose="020B0502020202020204" pitchFamily="34" charset="0"/>
-            </a:endParaRPr>
-          </a:p>
-          <a:p>
-            <a:pPr marL="0" indent="0">
-              <a:buNone/>
-            </a:pPr>
-            <a:r>
-              <a:rPr lang="en-GB" altLang="en-US" sz="2600" b="1" dirty="0">
-                <a:solidFill>
-                  <a:schemeClr val="bg1"/>
-                </a:solidFill>
-                <a:latin typeface="Century Gothic" panose="020B0502020202020204" pitchFamily="34" charset="0"/>
-              </a:rPr>
-              <a:t>End : </a:t>
-            </a:r>
-            <a:r>
-              <a:rPr lang="en-GB" altLang="en-US" sz="2600" dirty="0">
-                <a:solidFill>
-                  <a:schemeClr val="bg1"/>
-                </a:solidFill>
-                <a:latin typeface="Century Gothic" panose="020B0502020202020204" pitchFamily="34" charset="0"/>
-              </a:rPr>
-              <a:t>Amen</a:t>
-            </a:r>
-          </a:p>
-          <a:p>
-            <a:pPr marL="0" indent="0">
-              <a:buNone/>
-            </a:pPr>
-            <a:r>
-              <a:rPr lang="zh-TW" altLang="en-US" b="1" dirty="0">
-                <a:solidFill>
-                  <a:schemeClr val="bg1"/>
-                </a:solidFill>
-                <a:latin typeface="Century Gothic" panose="020B0502020202020204" pitchFamily="34" charset="0"/>
-                <a:ea typeface="金梅新中楷全字體" pitchFamily="49" charset="-120"/>
-              </a:rPr>
-              <a:t>結束 </a:t>
-            </a:r>
-            <a:r>
-              <a:rPr lang="en-GB" altLang="zh-TW" b="1" dirty="0">
-                <a:solidFill>
-                  <a:schemeClr val="bg1"/>
-                </a:solidFill>
-                <a:latin typeface="Century Gothic" panose="020B0502020202020204" pitchFamily="34" charset="0"/>
-                <a:ea typeface="金梅新中楷全字體" pitchFamily="49" charset="-120"/>
-              </a:rPr>
-              <a:t>: </a:t>
-            </a:r>
-            <a:r>
-              <a:rPr lang="zh-TW" altLang="en-US" b="1" dirty="0">
-                <a:solidFill>
-                  <a:schemeClr val="bg1"/>
-                </a:solidFill>
-                <a:latin typeface="Century Gothic" panose="020B0502020202020204" pitchFamily="34" charset="0"/>
-                <a:ea typeface="金梅新中楷全字體" pitchFamily="49" charset="-120"/>
-              </a:rPr>
-              <a:t>阿們</a:t>
-            </a:r>
-            <a:endParaRPr lang="en-GB" altLang="en-US" dirty="0">
-              <a:solidFill>
-                <a:schemeClr val="bg1"/>
-              </a:solidFill>
-              <a:latin typeface="Century Gothic" panose="020B0502020202020204" pitchFamily="34" charset="0"/>
-            </a:endParaRPr>
-          </a:p>
-        </p:txBody>
-      </p:sp>
-      <p:sp>
-        <p:nvSpPr>
-          <p:cNvPr id="2" name="TextBox 1"/>
+              <a:t>Service Times</a:t>
+            </a:r>
+          </a:p>
+        </p:txBody>
+      </p:sp>
+      <p:sp>
+        <p:nvSpPr>
+          <p:cNvPr id="11" name="TextBox 10">
+            <a:extLst>
+              <a:ext uri="{FF2B5EF4-FFF2-40B4-BE49-F238E27FC236}">
+                <a16:creationId xmlns:a16="http://schemas.microsoft.com/office/drawing/2014/main" id="{ADA8455D-134F-486C-C096-FFC55CA1AF07}"/>
+              </a:ext>
+            </a:extLst>
+          </p:cNvPr>
           <p:cNvSpPr txBox="1"/>
           <p:nvPr/>
         </p:nvSpPr>
         <p:spPr>
           <a:xfrm>
-            <a:off x="-684584" y="116633"/>
-            <a:ext cx="10260632" cy="1815882"/>
+            <a:off x="2051720" y="3105836"/>
+            <a:ext cx="5040560" cy="646331"/>
           </a:xfrm>
           <a:prstGeom prst="rect">
             <a:avLst/>
@@ -6577,254 +7742,32 @@
           <a:p>
             <a:pPr algn="ctr"/>
             <a:r>
-              <a:rPr lang="en-GB" altLang="en-US" sz="2800" b="1" dirty="0">
+              <a:rPr lang="en-GB" sz="3600" b="1" dirty="0">
                 <a:solidFill>
                   <a:schemeClr val="bg1"/>
                 </a:solidFill>
                 <a:latin typeface="Century Gothic" panose="020B0502020202020204" pitchFamily="34" charset="0"/>
               </a:rPr>
-              <a:t>Welcome To True Jesus Church </a:t>
-            </a:r>
-            <a:br>
-              <a:rPr lang="en-GB" altLang="en-US" sz="2800" b="1" dirty="0">
-                <a:solidFill>
-                  <a:schemeClr val="bg1"/>
-                </a:solidFill>
-                <a:latin typeface="Century Gothic" panose="020B0502020202020204" pitchFamily="34" charset="0"/>
-              </a:rPr>
-            </a:br>
-            <a:r>
-              <a:rPr lang="en-GB" altLang="en-US" sz="2800" b="1" dirty="0">
-                <a:solidFill>
-                  <a:schemeClr val="bg1"/>
-                </a:solidFill>
-                <a:latin typeface="Century Gothic" panose="020B0502020202020204" pitchFamily="34" charset="0"/>
-              </a:rPr>
-              <a:t>Please Join Us In Prayer </a:t>
-            </a:r>
-            <a:br>
-              <a:rPr lang="en-GB" altLang="en-US" sz="2800" b="1" dirty="0">
-                <a:solidFill>
-                  <a:schemeClr val="bg1"/>
-                </a:solidFill>
-                <a:latin typeface="Century Gothic" panose="020B0502020202020204" pitchFamily="34" charset="0"/>
-              </a:rPr>
-            </a:br>
-            <a:r>
-              <a:rPr lang="zh-TW" altLang="en-US" sz="2800" b="1" dirty="0">
-                <a:solidFill>
-                  <a:schemeClr val="bg1"/>
-                </a:solidFill>
-                <a:latin typeface="Century Gothic" panose="020B0502020202020204" pitchFamily="34" charset="0"/>
-                <a:ea typeface="金梅新中楷全字體" pitchFamily="49" charset="-120"/>
-              </a:rPr>
-              <a:t>歡迎光臨真耶穌教會，請跟我們一起禱告</a:t>
-            </a:r>
-            <a:br>
-              <a:rPr lang="en-GB" altLang="zh-TW" sz="2800" b="1" dirty="0">
-                <a:solidFill>
-                  <a:schemeClr val="bg1"/>
-                </a:solidFill>
-                <a:latin typeface="Century Gothic" panose="020B0502020202020204" pitchFamily="34" charset="0"/>
-                <a:ea typeface="金梅新中楷全字體" pitchFamily="49" charset="-120"/>
-              </a:rPr>
-            </a:br>
-            <a:r>
-              <a:rPr lang="en-GB" altLang="zh-TW" sz="2800" b="1" dirty="0">
-                <a:solidFill>
-                  <a:schemeClr val="bg1"/>
-                </a:solidFill>
-                <a:latin typeface="Century Gothic" panose="020B0502020202020204" pitchFamily="34" charset="0"/>
-                <a:ea typeface="金梅新中楷全字體" pitchFamily="49" charset="-120"/>
-              </a:rPr>
-              <a:t>----------------------------------------------</a:t>
-            </a:r>
-            <a:endParaRPr lang="en-GB" sz="2800" dirty="0">
-              <a:latin typeface="Century Gothic" panose="020B0502020202020204" pitchFamily="34" charset="0"/>
-            </a:endParaRPr>
-          </a:p>
-        </p:txBody>
-      </p:sp>
-      <p:sp>
-        <p:nvSpPr>
-          <p:cNvPr id="11" name="Text Box 11">
+              <a:t>IMAGE PLACEHOLDER</a:t>
+            </a:r>
+          </a:p>
+        </p:txBody>
+      </p:sp>
+      <p:pic>
+        <p:nvPicPr>
+          <p:cNvPr id="8" name="Picture 7" descr="Logo&#10;&#10;Description automatically generated with medium confidence">
             <a:extLst>
               <a:ext uri="{FF2B5EF4-FFF2-40B4-BE49-F238E27FC236}">
-                <a16:creationId xmlns:a16="http://schemas.microsoft.com/office/drawing/2014/main" id="{AE7C9989-F736-469B-B6E0-D5C0884DF265}"/>
-              </a:ext>
-            </a:extLst>
-          </p:cNvPr>
-          <p:cNvSpPr txBox="1">
-            <a:spLocks noChangeArrowheads="1"/>
-          </p:cNvSpPr>
-          <p:nvPr/>
-        </p:nvSpPr>
-        <p:spPr bwMode="auto">
-          <a:xfrm>
-            <a:off x="611560" y="6107922"/>
-            <a:ext cx="2736156" cy="338554"/>
-          </a:xfrm>
-          <a:prstGeom prst="rect">
-            <a:avLst/>
-          </a:prstGeom>
-          <a:noFill/>
-          <a:ln>
-            <a:noFill/>
-          </a:ln>
-          <a:effectLst/>
-          <a:extLst>
-            <a:ext uri="{909E8E84-426E-40DD-AFC4-6F175D3DCCD1}">
-              <a14:hiddenFill xmlns:a14="http://schemas.microsoft.com/office/drawing/2010/main">
-                <a:solidFill>
-                  <a:schemeClr val="accent1"/>
-                </a:solidFill>
-              </a14:hiddenFill>
-            </a:ext>
-            <a:ext uri="{91240B29-F687-4F45-9708-019B960494DF}">
-              <a14:hiddenLine xmlns:a14="http://schemas.microsoft.com/office/drawing/2010/main" w="9525">
-                <a:solidFill>
-                  <a:schemeClr val="tx1"/>
-                </a:solidFill>
-                <a:miter lim="800000"/>
-                <a:headEnd/>
-                <a:tailEnd/>
-              </a14:hiddenLine>
-            </a:ext>
-            <a:ext uri="{AF507438-7753-43E0-B8FC-AC1667EBCBE1}">
-              <a14:hiddenEffects xmlns:a14="http://schemas.microsoft.com/office/drawing/2010/main">
-                <a:effectLst>
-                  <a:outerShdw dist="35921" dir="2700000" algn="ctr" rotWithShape="0">
-                    <a:schemeClr val="bg2"/>
-                  </a:outerShdw>
-                </a:effectLst>
-              </a14:hiddenEffects>
-            </a:ext>
-          </a:extLst>
-        </p:spPr>
-        <p:txBody>
-          <a:bodyPr wrap="square">
-            <a:spAutoFit/>
-          </a:bodyPr>
-          <a:lstStyle/>
-          <a:p>
-            <a:pPr>
-              <a:spcBef>
-                <a:spcPct val="50000"/>
-              </a:spcBef>
-            </a:pPr>
-            <a:r>
-              <a:rPr lang="en-US" altLang="en-US" sz="1600" dirty="0">
-                <a:solidFill>
-                  <a:schemeClr val="bg1"/>
-                </a:solidFill>
-                <a:latin typeface="Century Gothic" panose="020B0502020202020204" pitchFamily="34" charset="0"/>
-                <a:ea typeface="金梅新中楷全字體" panose="02010509060101010101" pitchFamily="49" charset="-120"/>
-              </a:rPr>
-              <a:t>請 關 您 的 手 提 電 話 </a:t>
-            </a:r>
-          </a:p>
-        </p:txBody>
-      </p:sp>
-      <p:sp>
-        <p:nvSpPr>
-          <p:cNvPr id="12" name="Text Box 12">
-            <a:extLst>
-              <a:ext uri="{FF2B5EF4-FFF2-40B4-BE49-F238E27FC236}">
-                <a16:creationId xmlns:a16="http://schemas.microsoft.com/office/drawing/2014/main" id="{0C89997A-6CC6-4B2D-BB18-B88086E7AFE0}"/>
-              </a:ext>
-            </a:extLst>
-          </p:cNvPr>
-          <p:cNvSpPr txBox="1">
-            <a:spLocks noChangeArrowheads="1"/>
-          </p:cNvSpPr>
-          <p:nvPr/>
-        </p:nvSpPr>
-        <p:spPr bwMode="auto">
-          <a:xfrm>
-            <a:off x="611560" y="6369861"/>
-            <a:ext cx="3672335" cy="276999"/>
-          </a:xfrm>
-          <a:prstGeom prst="rect">
-            <a:avLst/>
-          </a:prstGeom>
-          <a:noFill/>
-          <a:ln>
-            <a:noFill/>
-          </a:ln>
-          <a:effectLst/>
-          <a:extLst>
-            <a:ext uri="{909E8E84-426E-40DD-AFC4-6F175D3DCCD1}">
-              <a14:hiddenFill xmlns:a14="http://schemas.microsoft.com/office/drawing/2010/main">
-                <a:solidFill>
-                  <a:schemeClr val="accent1"/>
-                </a:solidFill>
-              </a14:hiddenFill>
-            </a:ext>
-            <a:ext uri="{91240B29-F687-4F45-9708-019B960494DF}">
-              <a14:hiddenLine xmlns:a14="http://schemas.microsoft.com/office/drawing/2010/main" w="9525">
-                <a:solidFill>
-                  <a:schemeClr val="tx1"/>
-                </a:solidFill>
-                <a:miter lim="800000"/>
-                <a:headEnd/>
-                <a:tailEnd/>
-              </a14:hiddenLine>
-            </a:ext>
-            <a:ext uri="{AF507438-7753-43E0-B8FC-AC1667EBCBE1}">
-              <a14:hiddenEffects xmlns:a14="http://schemas.microsoft.com/office/drawing/2010/main">
-                <a:effectLst>
-                  <a:outerShdw dist="35921" dir="2700000" algn="ctr" rotWithShape="0">
-                    <a:schemeClr val="bg2"/>
-                  </a:outerShdw>
-                </a:effectLst>
-              </a14:hiddenEffects>
-            </a:ext>
-          </a:extLst>
-        </p:spPr>
-        <p:txBody>
-          <a:bodyPr wrap="square">
-            <a:spAutoFit/>
-          </a:bodyPr>
-          <a:lstStyle/>
-          <a:p>
-            <a:pPr>
-              <a:spcBef>
-                <a:spcPct val="50000"/>
-              </a:spcBef>
-            </a:pPr>
-            <a:r>
-              <a:rPr lang="en-GB" altLang="en-US" sz="1200" b="1" dirty="0">
-                <a:solidFill>
-                  <a:schemeClr val="bg1"/>
-                </a:solidFill>
-                <a:latin typeface="Century Gothic" panose="020B0502020202020204" pitchFamily="34" charset="0"/>
-              </a:rPr>
-              <a:t>PLEASE SWITCH OFF YOUR MOBILE PHONE</a:t>
-            </a:r>
-            <a:endParaRPr lang="en-US" altLang="en-US" sz="1200" b="1" dirty="0">
-              <a:solidFill>
-                <a:schemeClr val="bg1"/>
-              </a:solidFill>
-              <a:latin typeface="Century Gothic" panose="020B0502020202020204" pitchFamily="34" charset="0"/>
-            </a:endParaRPr>
-          </a:p>
-        </p:txBody>
-      </p:sp>
-      <p:pic>
-        <p:nvPicPr>
-          <p:cNvPr id="13" name="Picture 2" descr="Custom No Mobile Phones Sign | The Sign Shed">
-            <a:extLst>
-              <a:ext uri="{FF2B5EF4-FFF2-40B4-BE49-F238E27FC236}">
-                <a16:creationId xmlns:a16="http://schemas.microsoft.com/office/drawing/2014/main" id="{8151BCD2-BC62-411B-881C-57E67AD0C811}"/>
+                <a16:creationId xmlns:a16="http://schemas.microsoft.com/office/drawing/2014/main" id="{D677756F-3A49-6300-B0F1-C6DA9A9F8D34}"/>
               </a:ext>
             </a:extLst>
           </p:cNvPr>
           <p:cNvPicPr>
-            <a:picLocks noChangeAspect="1" noChangeArrowheads="1"/>
+            <a:picLocks noChangeAspect="1"/>
           </p:cNvPicPr>
           <p:nvPr/>
         </p:nvPicPr>
-        <p:blipFill rotWithShape="1">
+        <p:blipFill>
           <a:blip r:embed="rId2" cstate="print">
             <a:extLst>
               <a:ext uri="{28A0092B-C50C-407E-A947-70E740481C1C}">
@@ -6832,33 +7775,150 @@
               </a:ext>
             </a:extLst>
           </a:blip>
-          <a:srcRect l="3327" t="11250" r="71169" b="12911"/>
-          <a:stretch/>
+          <a:stretch>
+            <a:fillRect/>
+          </a:stretch>
         </p:blipFill>
-        <p:spPr bwMode="auto">
+        <p:spPr>
           <a:xfrm>
-            <a:off x="179437" y="6144630"/>
-            <a:ext cx="432048" cy="432048"/>
+            <a:off x="117892" y="6396577"/>
+            <a:ext cx="2664297" cy="344791"/>
           </a:xfrm>
           <a:prstGeom prst="rect">
             <a:avLst/>
           </a:prstGeom>
-          <a:noFill/>
-          <a:extLst>
-            <a:ext uri="{909E8E84-426E-40DD-AFC4-6F175D3DCCD1}">
-              <a14:hiddenFill xmlns:a14="http://schemas.microsoft.com/office/drawing/2010/main">
-                <a:solidFill>
-                  <a:srgbClr val="FFFFFF"/>
-                </a:solidFill>
-              </a14:hiddenFill>
-            </a:ext>
-          </a:extLst>
         </p:spPr>
       </p:pic>
+      <p:grpSp>
+        <p:nvGrpSpPr>
+          <p:cNvPr id="9" name="Group 8">
+            <a:extLst>
+              <a:ext uri="{FF2B5EF4-FFF2-40B4-BE49-F238E27FC236}">
+                <a16:creationId xmlns:a16="http://schemas.microsoft.com/office/drawing/2014/main" id="{085118E6-F6F2-9A59-25D2-BD75EA8A9A9D}"/>
+              </a:ext>
+            </a:extLst>
+          </p:cNvPr>
+          <p:cNvGrpSpPr/>
+          <p:nvPr/>
+        </p:nvGrpSpPr>
+        <p:grpSpPr>
+          <a:xfrm>
+            <a:off x="3275856" y="6427357"/>
+            <a:ext cx="5734763" cy="307777"/>
+            <a:chOff x="4799854" y="6300028"/>
+            <a:chExt cx="5734763" cy="307776"/>
+          </a:xfrm>
+        </p:grpSpPr>
+        <p:sp>
+          <p:nvSpPr>
+            <p:cNvPr id="16" name="TextBox 15">
+              <a:extLst>
+                <a:ext uri="{FF2B5EF4-FFF2-40B4-BE49-F238E27FC236}">
+                  <a16:creationId xmlns:a16="http://schemas.microsoft.com/office/drawing/2014/main" id="{9DFA8A01-5008-24A0-784C-DEFFCAF35475}"/>
+                </a:ext>
+              </a:extLst>
+            </p:cNvPr>
+            <p:cNvSpPr txBox="1"/>
+            <p:nvPr/>
+          </p:nvSpPr>
+          <p:spPr>
+            <a:xfrm>
+              <a:off x="4799854" y="6300028"/>
+              <a:ext cx="5734763" cy="307776"/>
+            </a:xfrm>
+            <a:prstGeom prst="rect">
+              <a:avLst/>
+            </a:prstGeom>
+            <a:noFill/>
+            <a:ln w="19050">
+              <a:solidFill>
+                <a:srgbClr val="FF0000"/>
+              </a:solidFill>
+            </a:ln>
+          </p:spPr>
+          <p:txBody>
+            <a:bodyPr wrap="square" rtlCol="0" anchor="ctr">
+              <a:spAutoFit/>
+            </a:bodyPr>
+            <a:lstStyle/>
+            <a:p>
+              <a:r>
+                <a:rPr lang="en-GB" sz="1400" dirty="0">
+                  <a:solidFill>
+                    <a:schemeClr val="bg1"/>
+                  </a:solidFill>
+                  <a:latin typeface="Century Gothic" panose="020B0502020202020204" pitchFamily="34" charset="0"/>
+                </a:rPr>
+                <a:t>Please Turn Off/Silence Your Devices </a:t>
+              </a:r>
+              <a:r>
+                <a:rPr lang="ja-JP" altLang="en-US" sz="1400" dirty="0">
+                  <a:solidFill>
+                    <a:schemeClr val="bg1"/>
+                  </a:solidFill>
+                  <a:latin typeface="Century Gothic" panose="020B0502020202020204" pitchFamily="34" charset="0"/>
+                </a:rPr>
+                <a:t>請靜音或關閉所有電子設備</a:t>
+              </a:r>
+            </a:p>
+          </p:txBody>
+        </p:sp>
+        <p:pic>
+          <p:nvPicPr>
+            <p:cNvPr id="17" name="Picture 16" descr="Shape&#10;&#10;Description automatically generated with low confidence">
+              <a:extLst>
+                <a:ext uri="{FF2B5EF4-FFF2-40B4-BE49-F238E27FC236}">
+                  <a16:creationId xmlns:a16="http://schemas.microsoft.com/office/drawing/2014/main" id="{589DD497-9D97-2251-8EA7-31A10D4F2F55}"/>
+                </a:ext>
+              </a:extLst>
+            </p:cNvPr>
+            <p:cNvPicPr>
+              <a:picLocks noChangeAspect="1"/>
+            </p:cNvPicPr>
+            <p:nvPr/>
+          </p:nvPicPr>
+          <p:blipFill>
+            <a:blip r:embed="rId3" cstate="print">
+              <a:extLst>
+                <a:ext uri="{BEBA8EAE-BF5A-486C-A8C5-ECC9F3942E4B}">
+                  <a14:imgProps xmlns:a14="http://schemas.microsoft.com/office/drawing/2010/main">
+                    <a14:imgLayer r:embed="rId4">
+                      <a14:imgEffect>
+                        <a14:colorTemperature colorTemp="11500"/>
+                      </a14:imgEffect>
+                      <a14:imgEffect>
+                        <a14:saturation sat="400000"/>
+                      </a14:imgEffect>
+                      <a14:imgEffect>
+                        <a14:brightnessContrast bright="100000" contrast="100000"/>
+                      </a14:imgEffect>
+                    </a14:imgLayer>
+                  </a14:imgProps>
+                </a:ext>
+                <a:ext uri="{28A0092B-C50C-407E-A947-70E740481C1C}">
+                  <a14:useLocalDpi xmlns:a14="http://schemas.microsoft.com/office/drawing/2010/main" val="0"/>
+                </a:ext>
+              </a:extLst>
+            </a:blip>
+            <a:stretch>
+              <a:fillRect/>
+            </a:stretch>
+          </p:blipFill>
+          <p:spPr>
+            <a:xfrm>
+              <a:off x="10218327" y="6309320"/>
+              <a:ext cx="280267" cy="280267"/>
+            </a:xfrm>
+            <a:prstGeom prst="rect">
+              <a:avLst/>
+            </a:prstGeom>
+          </p:spPr>
+        </p:pic>
+      </p:grpSp>
     </p:spTree>
     <p:extLst>
       <p:ext uri="{BB962C8B-B14F-4D97-AF65-F5344CB8AC3E}">
-        <p14:creationId xmlns:p14="http://schemas.microsoft.com/office/powerpoint/2010/main" val="2970436884"/>
+        <p14:creationId xmlns:p14="http://schemas.microsoft.com/office/powerpoint/2010/main" val="3742231344"/>
       </p:ext>
     </p:extLst>
   </p:cSld>

</xml_diff>